<commit_message>
Inserted the full stop in page 2, as it is necessary
</commit_message>
<xml_diff>
--- a/Day-1.pptx
+++ b/Day-1.pptx
@@ -5,18 +5,27 @@
     <p:sldMasterId id="2147483648" r:id="rId1"/>
   </p:sldMasterIdLst>
   <p:notesMasterIdLst>
-    <p:notesMasterId r:id="rId8"/>
+    <p:notesMasterId r:id="rId9"/>
   </p:notesMasterIdLst>
   <p:sldIdLst>
-    <p:sldId id="257" r:id="rId2"/>
-    <p:sldId id="338" r:id="rId3"/>
-    <p:sldId id="316" r:id="rId4"/>
-    <p:sldId id="346" r:id="rId5"/>
-    <p:sldId id="336" r:id="rId6"/>
-    <p:sldId id="337" r:id="rId7"/>
+    <p:sldId id="257" r:id="rId3"/>
+    <p:sldId id="338" r:id="rId4"/>
+    <p:sldId id="316" r:id="rId5"/>
+    <p:sldId id="346" r:id="rId6"/>
+    <p:sldId id="336" r:id="rId7"/>
+    <p:sldId id="337" r:id="rId8"/>
   </p:sldIdLst>
   <p:sldSz cx="18288000" cy="10287000"/>
   <p:notesSz cx="6858000" cy="9144000"/>
+  <p:embeddedFontLst>
+    <p:embeddedFont>
+      <p:font typeface="Calibri" panose="020F0502020204030204" charset="0"/>
+      <p:regular r:id="rId13"/>
+      <p:bold r:id="rId14"/>
+      <p:italic r:id="rId15"/>
+      <p:boldItalic r:id="rId16"/>
+    </p:embeddedFont>
+  </p:embeddedFontLst>
   <p:defaultTextStyle>
     <a:defPPr>
       <a:defRPr lang="en-US"/>
@@ -115,12 +124,12 @@
   <p:extLst>
     <p:ext uri="{EFAFB233-063F-42B5-8137-9DF3F51BA10A}">
       <p15:sldGuideLst xmlns:p15="http://schemas.microsoft.com/office/powerpoint/2012/main">
-        <p15:guide id="1" orient="horz" pos="2160">
+        <p15:guide id="1" orient="horz" pos="2160" userDrawn="1">
           <p15:clr>
             <a:srgbClr val="A4A3A4"/>
           </p15:clr>
         </p15:guide>
-        <p15:guide id="2" pos="2880">
+        <p15:guide id="2" pos="2880" userDrawn="1">
           <p15:clr>
             <a:srgbClr val="A4A3A4"/>
           </p15:clr>
@@ -213,7 +222,6 @@
           <a:p>
             <a:fld id="{B7268E1E-0E44-426D-905E-8AD9B19D2182}" type="datetimeFigureOut">
               <a:rPr lang="cs-CZ" smtClean="0"/>
-              <a:t>16.06.2025</a:t>
             </a:fld>
             <a:endParaRPr lang="cs-CZ"/>
           </a:p>
@@ -280,6 +288,7 @@
               <a:rPr lang="en-US"/>
               <a:t>Click to edit Master text styles</a:t>
             </a:r>
+            <a:endParaRPr lang="en-US"/>
           </a:p>
           <a:p>
             <a:pPr lvl="1"/>
@@ -287,6 +296,7 @@
               <a:rPr lang="en-US"/>
               <a:t>Second level</a:t>
             </a:r>
+            <a:endParaRPr lang="en-US"/>
           </a:p>
           <a:p>
             <a:pPr lvl="2"/>
@@ -294,6 +304,7 @@
               <a:rPr lang="en-US"/>
               <a:t>Third level</a:t>
             </a:r>
+            <a:endParaRPr lang="en-US"/>
           </a:p>
           <a:p>
             <a:pPr lvl="3"/>
@@ -301,6 +312,7 @@
               <a:rPr lang="en-US"/>
               <a:t>Fourth level</a:t>
             </a:r>
+            <a:endParaRPr lang="en-US"/>
           </a:p>
           <a:p>
             <a:pPr lvl="4"/>
@@ -372,18 +384,12 @@
           <a:p>
             <a:fld id="{871B2431-D351-4C6E-A3CF-9DFAC0E3E050}" type="slidenum">
               <a:rPr lang="cs-CZ" smtClean="0"/>
-              <a:t>‹#›</a:t>
             </a:fld>
             <a:endParaRPr lang="cs-CZ"/>
           </a:p>
         </p:txBody>
       </p:sp>
     </p:spTree>
-    <p:extLst>
-      <p:ext uri="{BB962C8B-B14F-4D97-AF65-F5344CB8AC3E}">
-        <p14:creationId xmlns:p14="http://schemas.microsoft.com/office/powerpoint/2010/main" val="1798889115"/>
-      </p:ext>
-    </p:extLst>
   </p:cSld>
   <p:clrMap bg1="lt1" tx1="dk1" bg2="lt2" tx2="dk2" accent1="accent1" accent2="accent2" accent3="accent3" accent4="accent4" accent5="accent5" accent6="accent6" hlink="hlink" folHlink="folHlink"/>
   <p:notesStyle>
@@ -522,6 +528,7 @@
               <a:rPr lang="en-US"/>
               <a:t>Click to edit Master title style</a:t>
             </a:r>
+            <a:endParaRPr lang="en-US"/>
           </a:p>
         </p:txBody>
       </p:sp>
@@ -640,6 +647,7 @@
               <a:rPr lang="en-US"/>
               <a:t>Click to edit Master subtitle style</a:t>
             </a:r>
+            <a:endParaRPr lang="en-US"/>
           </a:p>
         </p:txBody>
       </p:sp>
@@ -660,8 +668,6 @@
           <a:p>
             <a:fld id="{1D8BD707-D9CF-40AE-B4C6-C98DA3205C09}" type="datetimeFigureOut">
               <a:rPr lang="en-US" smtClean="0"/>
-              <a:pPr/>
-              <a:t>6/16/2025</a:t>
             </a:fld>
             <a:endParaRPr lang="en-US"/>
           </a:p>
@@ -703,8 +709,6 @@
           <a:p>
             <a:fld id="{B6F15528-21DE-4FAA-801E-634DDDAF4B2B}" type="slidenum">
               <a:rPr lang="en-US" smtClean="0"/>
-              <a:pPr/>
-              <a:t>‹#›</a:t>
             </a:fld>
             <a:endParaRPr lang="en-US"/>
           </a:p>
@@ -754,6 +758,7 @@
               <a:rPr lang="en-US"/>
               <a:t>Click to edit Master title style</a:t>
             </a:r>
+            <a:endParaRPr lang="en-US"/>
           </a:p>
         </p:txBody>
       </p:sp>
@@ -777,6 +782,7 @@
               <a:rPr lang="en-US"/>
               <a:t>Click to edit Master text styles</a:t>
             </a:r>
+            <a:endParaRPr lang="en-US"/>
           </a:p>
           <a:p>
             <a:pPr lvl="1"/>
@@ -784,6 +790,7 @@
               <a:rPr lang="en-US"/>
               <a:t>Second level</a:t>
             </a:r>
+            <a:endParaRPr lang="en-US"/>
           </a:p>
           <a:p>
             <a:pPr lvl="2"/>
@@ -791,6 +798,7 @@
               <a:rPr lang="en-US"/>
               <a:t>Third level</a:t>
             </a:r>
+            <a:endParaRPr lang="en-US"/>
           </a:p>
           <a:p>
             <a:pPr lvl="3"/>
@@ -798,6 +806,7 @@
               <a:rPr lang="en-US"/>
               <a:t>Fourth level</a:t>
             </a:r>
+            <a:endParaRPr lang="en-US"/>
           </a:p>
           <a:p>
             <a:pPr lvl="4"/>
@@ -805,6 +814,7 @@
               <a:rPr lang="en-US"/>
               <a:t>Fifth level</a:t>
             </a:r>
+            <a:endParaRPr lang="en-US"/>
           </a:p>
         </p:txBody>
       </p:sp>
@@ -825,8 +835,6 @@
           <a:p>
             <a:fld id="{1D8BD707-D9CF-40AE-B4C6-C98DA3205C09}" type="datetimeFigureOut">
               <a:rPr lang="en-US" smtClean="0"/>
-              <a:pPr/>
-              <a:t>6/16/2025</a:t>
             </a:fld>
             <a:endParaRPr lang="en-US"/>
           </a:p>
@@ -868,8 +876,6 @@
           <a:p>
             <a:fld id="{B6F15528-21DE-4FAA-801E-634DDDAF4B2B}" type="slidenum">
               <a:rPr lang="en-US" smtClean="0"/>
-              <a:pPr/>
-              <a:t>‹#›</a:t>
             </a:fld>
             <a:endParaRPr lang="en-US"/>
           </a:p>
@@ -924,6 +930,7 @@
               <a:rPr lang="en-US"/>
               <a:t>Click to edit Master title style</a:t>
             </a:r>
+            <a:endParaRPr lang="en-US"/>
           </a:p>
         </p:txBody>
       </p:sp>
@@ -952,6 +959,7 @@
               <a:rPr lang="en-US"/>
               <a:t>Click to edit Master text styles</a:t>
             </a:r>
+            <a:endParaRPr lang="en-US"/>
           </a:p>
           <a:p>
             <a:pPr lvl="1"/>
@@ -959,6 +967,7 @@
               <a:rPr lang="en-US"/>
               <a:t>Second level</a:t>
             </a:r>
+            <a:endParaRPr lang="en-US"/>
           </a:p>
           <a:p>
             <a:pPr lvl="2"/>
@@ -966,6 +975,7 @@
               <a:rPr lang="en-US"/>
               <a:t>Third level</a:t>
             </a:r>
+            <a:endParaRPr lang="en-US"/>
           </a:p>
           <a:p>
             <a:pPr lvl="3"/>
@@ -973,6 +983,7 @@
               <a:rPr lang="en-US"/>
               <a:t>Fourth level</a:t>
             </a:r>
+            <a:endParaRPr lang="en-US"/>
           </a:p>
           <a:p>
             <a:pPr lvl="4"/>
@@ -980,6 +991,7 @@
               <a:rPr lang="en-US"/>
               <a:t>Fifth level</a:t>
             </a:r>
+            <a:endParaRPr lang="en-US"/>
           </a:p>
         </p:txBody>
       </p:sp>
@@ -1000,8 +1012,6 @@
           <a:p>
             <a:fld id="{1D8BD707-D9CF-40AE-B4C6-C98DA3205C09}" type="datetimeFigureOut">
               <a:rPr lang="en-US" smtClean="0"/>
-              <a:pPr/>
-              <a:t>6/16/2025</a:t>
             </a:fld>
             <a:endParaRPr lang="en-US"/>
           </a:p>
@@ -1043,8 +1053,6 @@
           <a:p>
             <a:fld id="{B6F15528-21DE-4FAA-801E-634DDDAF4B2B}" type="slidenum">
               <a:rPr lang="en-US" smtClean="0"/>
-              <a:pPr/>
-              <a:t>‹#›</a:t>
             </a:fld>
             <a:endParaRPr lang="en-US"/>
           </a:p>
@@ -1094,6 +1102,7 @@
               <a:rPr lang="en-US"/>
               <a:t>Click to edit Master title style</a:t>
             </a:r>
+            <a:endParaRPr lang="en-US"/>
           </a:p>
         </p:txBody>
       </p:sp>
@@ -1117,6 +1126,7 @@
               <a:rPr lang="en-US"/>
               <a:t>Click to edit Master text styles</a:t>
             </a:r>
+            <a:endParaRPr lang="en-US"/>
           </a:p>
           <a:p>
             <a:pPr lvl="1"/>
@@ -1124,6 +1134,7 @@
               <a:rPr lang="en-US"/>
               <a:t>Second level</a:t>
             </a:r>
+            <a:endParaRPr lang="en-US"/>
           </a:p>
           <a:p>
             <a:pPr lvl="2"/>
@@ -1131,6 +1142,7 @@
               <a:rPr lang="en-US"/>
               <a:t>Third level</a:t>
             </a:r>
+            <a:endParaRPr lang="en-US"/>
           </a:p>
           <a:p>
             <a:pPr lvl="3"/>
@@ -1138,6 +1150,7 @@
               <a:rPr lang="en-US"/>
               <a:t>Fourth level</a:t>
             </a:r>
+            <a:endParaRPr lang="en-US"/>
           </a:p>
           <a:p>
             <a:pPr lvl="4"/>
@@ -1145,6 +1158,7 @@
               <a:rPr lang="en-US"/>
               <a:t>Fifth level</a:t>
             </a:r>
+            <a:endParaRPr lang="en-US"/>
           </a:p>
         </p:txBody>
       </p:sp>
@@ -1165,8 +1179,6 @@
           <a:p>
             <a:fld id="{1D8BD707-D9CF-40AE-B4C6-C98DA3205C09}" type="datetimeFigureOut">
               <a:rPr lang="en-US" smtClean="0"/>
-              <a:pPr/>
-              <a:t>6/16/2025</a:t>
             </a:fld>
             <a:endParaRPr lang="en-US"/>
           </a:p>
@@ -1208,8 +1220,6 @@
           <a:p>
             <a:fld id="{B6F15528-21DE-4FAA-801E-634DDDAF4B2B}" type="slidenum">
               <a:rPr lang="en-US" smtClean="0"/>
-              <a:pPr/>
-              <a:t>‹#›</a:t>
             </a:fld>
             <a:endParaRPr lang="en-US"/>
           </a:p>
@@ -1268,6 +1278,7 @@
               <a:rPr lang="en-US"/>
               <a:t>Click to edit Master title style</a:t>
             </a:r>
+            <a:endParaRPr lang="en-US"/>
           </a:p>
         </p:txBody>
       </p:sp>
@@ -1387,6 +1398,7 @@
               <a:rPr lang="en-US"/>
               <a:t>Click to edit Master text styles</a:t>
             </a:r>
+            <a:endParaRPr lang="en-US"/>
           </a:p>
         </p:txBody>
       </p:sp>
@@ -1407,8 +1419,6 @@
           <a:p>
             <a:fld id="{1D8BD707-D9CF-40AE-B4C6-C98DA3205C09}" type="datetimeFigureOut">
               <a:rPr lang="en-US" smtClean="0"/>
-              <a:pPr/>
-              <a:t>6/16/2025</a:t>
             </a:fld>
             <a:endParaRPr lang="en-US"/>
           </a:p>
@@ -1450,8 +1460,6 @@
           <a:p>
             <a:fld id="{B6F15528-21DE-4FAA-801E-634DDDAF4B2B}" type="slidenum">
               <a:rPr lang="en-US" smtClean="0"/>
-              <a:pPr/>
-              <a:t>‹#›</a:t>
             </a:fld>
             <a:endParaRPr lang="en-US"/>
           </a:p>
@@ -1501,6 +1509,7 @@
               <a:rPr lang="en-US"/>
               <a:t>Click to edit Master title style</a:t>
             </a:r>
+            <a:endParaRPr lang="en-US"/>
           </a:p>
         </p:txBody>
       </p:sp>
@@ -1557,6 +1566,7 @@
               <a:rPr lang="en-US"/>
               <a:t>Click to edit Master text styles</a:t>
             </a:r>
+            <a:endParaRPr lang="en-US"/>
           </a:p>
           <a:p>
             <a:pPr lvl="1"/>
@@ -1564,6 +1574,7 @@
               <a:rPr lang="en-US"/>
               <a:t>Second level</a:t>
             </a:r>
+            <a:endParaRPr lang="en-US"/>
           </a:p>
           <a:p>
             <a:pPr lvl="2"/>
@@ -1571,6 +1582,7 @@
               <a:rPr lang="en-US"/>
               <a:t>Third level</a:t>
             </a:r>
+            <a:endParaRPr lang="en-US"/>
           </a:p>
           <a:p>
             <a:pPr lvl="3"/>
@@ -1578,6 +1590,7 @@
               <a:rPr lang="en-US"/>
               <a:t>Fourth level</a:t>
             </a:r>
+            <a:endParaRPr lang="en-US"/>
           </a:p>
           <a:p>
             <a:pPr lvl="4"/>
@@ -1585,6 +1598,7 @@
               <a:rPr lang="en-US"/>
               <a:t>Fifth level</a:t>
             </a:r>
+            <a:endParaRPr lang="en-US"/>
           </a:p>
         </p:txBody>
       </p:sp>
@@ -1641,6 +1655,7 @@
               <a:rPr lang="en-US"/>
               <a:t>Click to edit Master text styles</a:t>
             </a:r>
+            <a:endParaRPr lang="en-US"/>
           </a:p>
           <a:p>
             <a:pPr lvl="1"/>
@@ -1648,6 +1663,7 @@
               <a:rPr lang="en-US"/>
               <a:t>Second level</a:t>
             </a:r>
+            <a:endParaRPr lang="en-US"/>
           </a:p>
           <a:p>
             <a:pPr lvl="2"/>
@@ -1655,6 +1671,7 @@
               <a:rPr lang="en-US"/>
               <a:t>Third level</a:t>
             </a:r>
+            <a:endParaRPr lang="en-US"/>
           </a:p>
           <a:p>
             <a:pPr lvl="3"/>
@@ -1662,6 +1679,7 @@
               <a:rPr lang="en-US"/>
               <a:t>Fourth level</a:t>
             </a:r>
+            <a:endParaRPr lang="en-US"/>
           </a:p>
           <a:p>
             <a:pPr lvl="4"/>
@@ -1669,6 +1687,7 @@
               <a:rPr lang="en-US"/>
               <a:t>Fifth level</a:t>
             </a:r>
+            <a:endParaRPr lang="en-US"/>
           </a:p>
         </p:txBody>
       </p:sp>
@@ -1689,8 +1708,6 @@
           <a:p>
             <a:fld id="{1D8BD707-D9CF-40AE-B4C6-C98DA3205C09}" type="datetimeFigureOut">
               <a:rPr lang="en-US" smtClean="0"/>
-              <a:pPr/>
-              <a:t>6/16/2025</a:t>
             </a:fld>
             <a:endParaRPr lang="en-US"/>
           </a:p>
@@ -1732,8 +1749,6 @@
           <a:p>
             <a:fld id="{B6F15528-21DE-4FAA-801E-634DDDAF4B2B}" type="slidenum">
               <a:rPr lang="en-US" smtClean="0"/>
-              <a:pPr/>
-              <a:t>‹#›</a:t>
             </a:fld>
             <a:endParaRPr lang="en-US"/>
           </a:p>
@@ -1787,6 +1802,7 @@
               <a:rPr lang="en-US"/>
               <a:t>Click to edit Master title style</a:t>
             </a:r>
+            <a:endParaRPr lang="en-US"/>
           </a:p>
         </p:txBody>
       </p:sp>
@@ -1852,6 +1868,7 @@
               <a:rPr lang="en-US"/>
               <a:t>Click to edit Master text styles</a:t>
             </a:r>
+            <a:endParaRPr lang="en-US"/>
           </a:p>
         </p:txBody>
       </p:sp>
@@ -1908,6 +1925,7 @@
               <a:rPr lang="en-US"/>
               <a:t>Click to edit Master text styles</a:t>
             </a:r>
+            <a:endParaRPr lang="en-US"/>
           </a:p>
           <a:p>
             <a:pPr lvl="1"/>
@@ -1915,6 +1933,7 @@
               <a:rPr lang="en-US"/>
               <a:t>Second level</a:t>
             </a:r>
+            <a:endParaRPr lang="en-US"/>
           </a:p>
           <a:p>
             <a:pPr lvl="2"/>
@@ -1922,6 +1941,7 @@
               <a:rPr lang="en-US"/>
               <a:t>Third level</a:t>
             </a:r>
+            <a:endParaRPr lang="en-US"/>
           </a:p>
           <a:p>
             <a:pPr lvl="3"/>
@@ -1929,6 +1949,7 @@
               <a:rPr lang="en-US"/>
               <a:t>Fourth level</a:t>
             </a:r>
+            <a:endParaRPr lang="en-US"/>
           </a:p>
           <a:p>
             <a:pPr lvl="4"/>
@@ -1936,6 +1957,7 @@
               <a:rPr lang="en-US"/>
               <a:t>Fifth level</a:t>
             </a:r>
+            <a:endParaRPr lang="en-US"/>
           </a:p>
         </p:txBody>
       </p:sp>
@@ -2001,6 +2023,7 @@
               <a:rPr lang="en-US"/>
               <a:t>Click to edit Master text styles</a:t>
             </a:r>
+            <a:endParaRPr lang="en-US"/>
           </a:p>
         </p:txBody>
       </p:sp>
@@ -2057,6 +2080,7 @@
               <a:rPr lang="en-US"/>
               <a:t>Click to edit Master text styles</a:t>
             </a:r>
+            <a:endParaRPr lang="en-US"/>
           </a:p>
           <a:p>
             <a:pPr lvl="1"/>
@@ -2064,6 +2088,7 @@
               <a:rPr lang="en-US"/>
               <a:t>Second level</a:t>
             </a:r>
+            <a:endParaRPr lang="en-US"/>
           </a:p>
           <a:p>
             <a:pPr lvl="2"/>
@@ -2071,6 +2096,7 @@
               <a:rPr lang="en-US"/>
               <a:t>Third level</a:t>
             </a:r>
+            <a:endParaRPr lang="en-US"/>
           </a:p>
           <a:p>
             <a:pPr lvl="3"/>
@@ -2078,6 +2104,7 @@
               <a:rPr lang="en-US"/>
               <a:t>Fourth level</a:t>
             </a:r>
+            <a:endParaRPr lang="en-US"/>
           </a:p>
           <a:p>
             <a:pPr lvl="4"/>
@@ -2085,6 +2112,7 @@
               <a:rPr lang="en-US"/>
               <a:t>Fifth level</a:t>
             </a:r>
+            <a:endParaRPr lang="en-US"/>
           </a:p>
         </p:txBody>
       </p:sp>
@@ -2105,8 +2133,6 @@
           <a:p>
             <a:fld id="{1D8BD707-D9CF-40AE-B4C6-C98DA3205C09}" type="datetimeFigureOut">
               <a:rPr lang="en-US" smtClean="0"/>
-              <a:pPr/>
-              <a:t>6/16/2025</a:t>
             </a:fld>
             <a:endParaRPr lang="en-US"/>
           </a:p>
@@ -2148,8 +2174,6 @@
           <a:p>
             <a:fld id="{B6F15528-21DE-4FAA-801E-634DDDAF4B2B}" type="slidenum">
               <a:rPr lang="en-US" smtClean="0"/>
-              <a:pPr/>
-              <a:t>‹#›</a:t>
             </a:fld>
             <a:endParaRPr lang="en-US"/>
           </a:p>
@@ -2199,6 +2223,7 @@
               <a:rPr lang="en-US"/>
               <a:t>Click to edit Master title style</a:t>
             </a:r>
+            <a:endParaRPr lang="en-US"/>
           </a:p>
         </p:txBody>
       </p:sp>
@@ -2219,8 +2244,6 @@
           <a:p>
             <a:fld id="{1D8BD707-D9CF-40AE-B4C6-C98DA3205C09}" type="datetimeFigureOut">
               <a:rPr lang="en-US" smtClean="0"/>
-              <a:pPr/>
-              <a:t>6/16/2025</a:t>
             </a:fld>
             <a:endParaRPr lang="en-US"/>
           </a:p>
@@ -2262,8 +2285,6 @@
           <a:p>
             <a:fld id="{B6F15528-21DE-4FAA-801E-634DDDAF4B2B}" type="slidenum">
               <a:rPr lang="en-US" smtClean="0"/>
-              <a:pPr/>
-              <a:t>‹#›</a:t>
             </a:fld>
             <a:endParaRPr lang="en-US"/>
           </a:p>
@@ -2311,8 +2332,6 @@
           <a:p>
             <a:fld id="{1D8BD707-D9CF-40AE-B4C6-C98DA3205C09}" type="datetimeFigureOut">
               <a:rPr lang="en-US" smtClean="0"/>
-              <a:pPr/>
-              <a:t>6/16/2025</a:t>
             </a:fld>
             <a:endParaRPr lang="en-US"/>
           </a:p>
@@ -2354,8 +2373,6 @@
           <a:p>
             <a:fld id="{B6F15528-21DE-4FAA-801E-634DDDAF4B2B}" type="slidenum">
               <a:rPr lang="en-US" smtClean="0"/>
-              <a:pPr/>
-              <a:t>‹#›</a:t>
             </a:fld>
             <a:endParaRPr lang="en-US"/>
           </a:p>
@@ -2414,6 +2431,7 @@
               <a:rPr lang="en-US"/>
               <a:t>Click to edit Master title style</a:t>
             </a:r>
+            <a:endParaRPr lang="en-US"/>
           </a:p>
         </p:txBody>
       </p:sp>
@@ -2470,6 +2488,7 @@
               <a:rPr lang="en-US"/>
               <a:t>Click to edit Master text styles</a:t>
             </a:r>
+            <a:endParaRPr lang="en-US"/>
           </a:p>
           <a:p>
             <a:pPr lvl="1"/>
@@ -2477,6 +2496,7 @@
               <a:rPr lang="en-US"/>
               <a:t>Second level</a:t>
             </a:r>
+            <a:endParaRPr lang="en-US"/>
           </a:p>
           <a:p>
             <a:pPr lvl="2"/>
@@ -2484,6 +2504,7 @@
               <a:rPr lang="en-US"/>
               <a:t>Third level</a:t>
             </a:r>
+            <a:endParaRPr lang="en-US"/>
           </a:p>
           <a:p>
             <a:pPr lvl="3"/>
@@ -2491,6 +2512,7 @@
               <a:rPr lang="en-US"/>
               <a:t>Fourth level</a:t>
             </a:r>
+            <a:endParaRPr lang="en-US"/>
           </a:p>
           <a:p>
             <a:pPr lvl="4"/>
@@ -2498,6 +2520,7 @@
               <a:rPr lang="en-US"/>
               <a:t>Fifth level</a:t>
             </a:r>
+            <a:endParaRPr lang="en-US"/>
           </a:p>
         </p:txBody>
       </p:sp>
@@ -2563,6 +2586,7 @@
               <a:rPr lang="en-US"/>
               <a:t>Click to edit Master text styles</a:t>
             </a:r>
+            <a:endParaRPr lang="en-US"/>
           </a:p>
         </p:txBody>
       </p:sp>
@@ -2583,8 +2607,6 @@
           <a:p>
             <a:fld id="{1D8BD707-D9CF-40AE-B4C6-C98DA3205C09}" type="datetimeFigureOut">
               <a:rPr lang="en-US" smtClean="0"/>
-              <a:pPr/>
-              <a:t>6/16/2025</a:t>
             </a:fld>
             <a:endParaRPr lang="en-US"/>
           </a:p>
@@ -2626,8 +2648,6 @@
           <a:p>
             <a:fld id="{B6F15528-21DE-4FAA-801E-634DDDAF4B2B}" type="slidenum">
               <a:rPr lang="en-US" smtClean="0"/>
-              <a:pPr/>
-              <a:t>‹#›</a:t>
             </a:fld>
             <a:endParaRPr lang="en-US"/>
           </a:p>
@@ -2686,6 +2706,7 @@
               <a:rPr lang="en-US"/>
               <a:t>Click to edit Master title style</a:t>
             </a:r>
+            <a:endParaRPr lang="en-US"/>
           </a:p>
         </p:txBody>
       </p:sp>
@@ -2812,6 +2833,7 @@
               <a:rPr lang="en-US"/>
               <a:t>Click to edit Master text styles</a:t>
             </a:r>
+            <a:endParaRPr lang="en-US"/>
           </a:p>
         </p:txBody>
       </p:sp>
@@ -2832,8 +2854,6 @@
           <a:p>
             <a:fld id="{1D8BD707-D9CF-40AE-B4C6-C98DA3205C09}" type="datetimeFigureOut">
               <a:rPr lang="en-US" smtClean="0"/>
-              <a:pPr/>
-              <a:t>6/16/2025</a:t>
             </a:fld>
             <a:endParaRPr lang="en-US"/>
           </a:p>
@@ -2875,8 +2895,6 @@
           <a:p>
             <a:fld id="{B6F15528-21DE-4FAA-801E-634DDDAF4B2B}" type="slidenum">
               <a:rPr lang="en-US" smtClean="0"/>
-              <a:pPr/>
-              <a:t>‹#›</a:t>
             </a:fld>
             <a:endParaRPr lang="en-US"/>
           </a:p>
@@ -2941,6 +2959,7 @@
               <a:rPr lang="en-US"/>
               <a:t>Click to edit Master title style</a:t>
             </a:r>
+            <a:endParaRPr lang="en-US"/>
           </a:p>
         </p:txBody>
       </p:sp>
@@ -2974,6 +2993,7 @@
               <a:rPr lang="en-US"/>
               <a:t>Click to edit Master text styles</a:t>
             </a:r>
+            <a:endParaRPr lang="en-US"/>
           </a:p>
           <a:p>
             <a:pPr lvl="1"/>
@@ -2981,6 +3001,7 @@
               <a:rPr lang="en-US"/>
               <a:t>Second level</a:t>
             </a:r>
+            <a:endParaRPr lang="en-US"/>
           </a:p>
           <a:p>
             <a:pPr lvl="2"/>
@@ -2988,6 +3009,7 @@
               <a:rPr lang="en-US"/>
               <a:t>Third level</a:t>
             </a:r>
+            <a:endParaRPr lang="en-US"/>
           </a:p>
           <a:p>
             <a:pPr lvl="3"/>
@@ -2995,6 +3017,7 @@
               <a:rPr lang="en-US"/>
               <a:t>Fourth level</a:t>
             </a:r>
+            <a:endParaRPr lang="en-US"/>
           </a:p>
           <a:p>
             <a:pPr lvl="4"/>
@@ -3002,6 +3025,7 @@
               <a:rPr lang="en-US"/>
               <a:t>Fifth level</a:t>
             </a:r>
+            <a:endParaRPr lang="en-US"/>
           </a:p>
         </p:txBody>
       </p:sp>
@@ -3040,8 +3064,6 @@
           <a:p>
             <a:fld id="{1D8BD707-D9CF-40AE-B4C6-C98DA3205C09}" type="datetimeFigureOut">
               <a:rPr lang="en-US" smtClean="0"/>
-              <a:pPr/>
-              <a:t>6/16/2025</a:t>
             </a:fld>
             <a:endParaRPr lang="en-US"/>
           </a:p>
@@ -3119,8 +3141,6 @@
           <a:p>
             <a:fld id="{B6F15528-21DE-4FAA-801E-634DDDAF4B2B}" type="slidenum">
               <a:rPr lang="en-US" smtClean="0"/>
-              <a:pPr/>
-              <a:t>‹#›</a:t>
             </a:fld>
             <a:endParaRPr lang="en-US"/>
           </a:p>
@@ -3164,7 +3184,7 @@
         <a:spcBef>
           <a:spcPct val="20000"/>
         </a:spcBef>
-        <a:buFont typeface="Arial" pitchFamily="34" charset="0"/>
+        <a:buFont typeface="Arial" panose="020B0604020202020204" pitchFamily="34" charset="0"/>
         <a:buChar char="•"/>
         <a:defRPr sz="3200" kern="1200">
           <a:solidFill>
@@ -3179,7 +3199,7 @@
         <a:spcBef>
           <a:spcPct val="20000"/>
         </a:spcBef>
-        <a:buFont typeface="Arial" pitchFamily="34" charset="0"/>
+        <a:buFont typeface="Arial" panose="020B0604020202020204" pitchFamily="34" charset="0"/>
         <a:buChar char="–"/>
         <a:defRPr sz="2800" kern="1200">
           <a:solidFill>
@@ -3194,7 +3214,7 @@
         <a:spcBef>
           <a:spcPct val="20000"/>
         </a:spcBef>
-        <a:buFont typeface="Arial" pitchFamily="34" charset="0"/>
+        <a:buFont typeface="Arial" panose="020B0604020202020204" pitchFamily="34" charset="0"/>
         <a:buChar char="•"/>
         <a:defRPr sz="2400" kern="1200">
           <a:solidFill>
@@ -3209,7 +3229,7 @@
         <a:spcBef>
           <a:spcPct val="20000"/>
         </a:spcBef>
-        <a:buFont typeface="Arial" pitchFamily="34" charset="0"/>
+        <a:buFont typeface="Arial" panose="020B0604020202020204" pitchFamily="34" charset="0"/>
         <a:buChar char="–"/>
         <a:defRPr sz="2000" kern="1200">
           <a:solidFill>
@@ -3224,7 +3244,7 @@
         <a:spcBef>
           <a:spcPct val="20000"/>
         </a:spcBef>
-        <a:buFont typeface="Arial" pitchFamily="34" charset="0"/>
+        <a:buFont typeface="Arial" panose="020B0604020202020204" pitchFamily="34" charset="0"/>
         <a:buChar char="»"/>
         <a:defRPr sz="2000" kern="1200">
           <a:solidFill>
@@ -3239,7 +3259,7 @@
         <a:spcBef>
           <a:spcPct val="20000"/>
         </a:spcBef>
-        <a:buFont typeface="Arial" pitchFamily="34" charset="0"/>
+        <a:buFont typeface="Arial" panose="020B0604020202020204" pitchFamily="34" charset="0"/>
         <a:buChar char="•"/>
         <a:defRPr sz="2000" kern="1200">
           <a:solidFill>
@@ -3254,7 +3274,7 @@
         <a:spcBef>
           <a:spcPct val="20000"/>
         </a:spcBef>
-        <a:buFont typeface="Arial" pitchFamily="34" charset="0"/>
+        <a:buFont typeface="Arial" panose="020B0604020202020204" pitchFamily="34" charset="0"/>
         <a:buChar char="•"/>
         <a:defRPr sz="2000" kern="1200">
           <a:solidFill>
@@ -3269,7 +3289,7 @@
         <a:spcBef>
           <a:spcPct val="20000"/>
         </a:spcBef>
-        <a:buFont typeface="Arial" pitchFamily="34" charset="0"/>
+        <a:buFont typeface="Arial" panose="020B0604020202020204" pitchFamily="34" charset="0"/>
         <a:buChar char="•"/>
         <a:defRPr sz="2000" kern="1200">
           <a:solidFill>
@@ -3284,7 +3304,7 @@
         <a:spcBef>
           <a:spcPct val="20000"/>
         </a:spcBef>
-        <a:buFont typeface="Arial" pitchFamily="34" charset="0"/>
+        <a:buFont typeface="Arial" panose="020B0604020202020204" pitchFamily="34" charset="0"/>
         <a:buChar char="•"/>
         <a:defRPr sz="2000" kern="1200">
           <a:solidFill>
@@ -3414,13 +3434,7 @@
       </p:grpSpPr>
       <p:sp>
         <p:nvSpPr>
-          <p:cNvPr id="20" name="Rectangle 19">
-            <a:extLst>
-              <a:ext uri="{FF2B5EF4-FFF2-40B4-BE49-F238E27FC236}">
-                <a16:creationId xmlns:a16="http://schemas.microsoft.com/office/drawing/2014/main" id="{CC3227FE-6E47-AADE-1D27-1C7463C22398}"/>
-              </a:ext>
-            </a:extLst>
-          </p:cNvPr>
+          <p:cNvPr id="20" name="Rectangle 19"/>
           <p:cNvSpPr/>
           <p:nvPr/>
         </p:nvSpPr>
@@ -3472,14 +3486,14 @@
           <p:nvPr/>
         </p:nvPicPr>
         <p:blipFill>
-          <a:blip r:embed="rId2">
+          <a:blip r:embed="rId1">
             <a:alphaModFix amt="6000"/>
             <a:extLst>
               <a:ext uri="{28A0092B-C50C-407E-A947-70E740481C1C}">
                 <a14:useLocalDpi xmlns:a14="http://schemas.microsoft.com/office/drawing/2010/main" val="0"/>
               </a:ext>
               <a:ext uri="{96DAC541-7B7A-43D3-8B79-37D633B846F1}">
-                <asvg:svgBlip xmlns:asvg="http://schemas.microsoft.com/office/drawing/2016/SVG/main" r:embed="rId3"/>
+                <asvg:svgBlip xmlns:asvg="http://schemas.microsoft.com/office/drawing/2016/SVG/main" r:embed="rId2"/>
               </a:ext>
             </a:extLst>
           </a:blip>
@@ -3507,14 +3521,14 @@
           <p:nvPr/>
         </p:nvPicPr>
         <p:blipFill>
-          <a:blip r:embed="rId2">
+          <a:blip r:embed="rId1">
             <a:alphaModFix amt="6000"/>
             <a:extLst>
               <a:ext uri="{28A0092B-C50C-407E-A947-70E740481C1C}">
                 <a14:useLocalDpi xmlns:a14="http://schemas.microsoft.com/office/drawing/2010/main" val="0"/>
               </a:ext>
               <a:ext uri="{96DAC541-7B7A-43D3-8B79-37D633B846F1}">
-                <asvg:svgBlip xmlns:asvg="http://schemas.microsoft.com/office/drawing/2016/SVG/main" r:embed="rId3"/>
+                <asvg:svgBlip xmlns:asvg="http://schemas.microsoft.com/office/drawing/2016/SVG/main" r:embed="rId2"/>
               </a:ext>
             </a:extLst>
           </a:blip>
@@ -3700,20 +3714,14 @@
       </p:grpSp>
       <p:pic>
         <p:nvPicPr>
-          <p:cNvPr id="15" name="Picture 14" descr="A picture containing computer, table, room&#10;&#10;Description automatically generated">
-            <a:extLst>
-              <a:ext uri="{FF2B5EF4-FFF2-40B4-BE49-F238E27FC236}">
-                <a16:creationId xmlns:a16="http://schemas.microsoft.com/office/drawing/2014/main" id="{9EAD1A31-BB59-D370-59A9-11CA8DD2AB9B}"/>
-              </a:ext>
-            </a:extLst>
-          </p:cNvPr>
+          <p:cNvPr id="15" name="Picture 14" descr="A picture containing computer, table, room&#10;&#10;Description automatically generated"/>
           <p:cNvPicPr>
             <a:picLocks noChangeAspect="1"/>
           </p:cNvPicPr>
           <p:nvPr/>
         </p:nvPicPr>
         <p:blipFill>
-          <a:blip r:embed="rId4">
+          <a:blip r:embed="rId3">
             <a:extLst>
               <a:ext uri="{28A0092B-C50C-407E-A947-70E740481C1C}">
                 <a14:useLocalDpi xmlns:a14="http://schemas.microsoft.com/office/drawing/2010/main" val="0"/>
@@ -4319,894 +4327,19 @@
           </a:custGeom>
           <a:ln w="28575">
             <a:noFill/>
-            <a:extLst>
-              <a:ext uri="{C807C97D-BFC1-408E-A445-0C87EB9F89A2}">
-                <ask:lineSketchStyleProps xmlns:ask="http://schemas.microsoft.com/office/drawing/2018/sketchyshapes" sd="2129859828">
-                  <a:custGeom>
-                    <a:avLst/>
-                    <a:gdLst>
-                      <a:gd name="connsiteX0" fmla="*/ 0 w 8009587"/>
-                      <a:gd name="connsiteY0" fmla="*/ 0 h 7732104"/>
-                      <a:gd name="connsiteX1" fmla="*/ 649667 w 8009587"/>
-                      <a:gd name="connsiteY1" fmla="*/ 0 h 7732104"/>
-                      <a:gd name="connsiteX2" fmla="*/ 1539620 w 8009587"/>
-                      <a:gd name="connsiteY2" fmla="*/ 0 h 7732104"/>
-                      <a:gd name="connsiteX3" fmla="*/ 2509670 w 8009587"/>
-                      <a:gd name="connsiteY3" fmla="*/ 0 h 7732104"/>
-                      <a:gd name="connsiteX4" fmla="*/ 3399625 w 8009587"/>
-                      <a:gd name="connsiteY4" fmla="*/ 0 h 7732104"/>
-                      <a:gd name="connsiteX5" fmla="*/ 4289578 w 8009587"/>
-                      <a:gd name="connsiteY5" fmla="*/ 0 h 7732104"/>
-                      <a:gd name="connsiteX6" fmla="*/ 5339725 w 8009587"/>
-                      <a:gd name="connsiteY6" fmla="*/ 0 h 7732104"/>
-                      <a:gd name="connsiteX7" fmla="*/ 5989390 w 8009587"/>
-                      <a:gd name="connsiteY7" fmla="*/ 0 h 7732104"/>
-                      <a:gd name="connsiteX8" fmla="*/ 6959441 w 8009587"/>
-                      <a:gd name="connsiteY8" fmla="*/ 0 h 7732104"/>
-                      <a:gd name="connsiteX9" fmla="*/ 8009587 w 8009587"/>
-                      <a:gd name="connsiteY9" fmla="*/ 0 h 7732104"/>
-                      <a:gd name="connsiteX10" fmla="*/ 8009587 w 8009587"/>
-                      <a:gd name="connsiteY10" fmla="*/ 936444 h 7732104"/>
-                      <a:gd name="connsiteX11" fmla="*/ 8009587 w 8009587"/>
-                      <a:gd name="connsiteY11" fmla="*/ 1563603 h 7732104"/>
-                      <a:gd name="connsiteX12" fmla="*/ 8009587 w 8009587"/>
-                      <a:gd name="connsiteY12" fmla="*/ 2577367 h 7732104"/>
-                      <a:gd name="connsiteX13" fmla="*/ 8009587 w 8009587"/>
-                      <a:gd name="connsiteY13" fmla="*/ 3591133 h 7732104"/>
-                      <a:gd name="connsiteX14" fmla="*/ 8009587 w 8009587"/>
-                      <a:gd name="connsiteY14" fmla="*/ 4218292 h 7732104"/>
-                      <a:gd name="connsiteX15" fmla="*/ 8009587 w 8009587"/>
-                      <a:gd name="connsiteY15" fmla="*/ 4845452 h 7732104"/>
-                      <a:gd name="connsiteX16" fmla="*/ 8009587 w 8009587"/>
-                      <a:gd name="connsiteY16" fmla="*/ 5549932 h 7732104"/>
-                      <a:gd name="connsiteX17" fmla="*/ 8009587 w 8009587"/>
-                      <a:gd name="connsiteY17" fmla="*/ 6177092 h 7732104"/>
-                      <a:gd name="connsiteX18" fmla="*/ 8009587 w 8009587"/>
-                      <a:gd name="connsiteY18" fmla="*/ 6804251 h 7732104"/>
-                      <a:gd name="connsiteX19" fmla="*/ 8009587 w 8009587"/>
-                      <a:gd name="connsiteY19" fmla="*/ 7732103 h 7732104"/>
-                      <a:gd name="connsiteX20" fmla="*/ 7199728 w 8009587"/>
-                      <a:gd name="connsiteY20" fmla="*/ 7732103 h 7732104"/>
-                      <a:gd name="connsiteX21" fmla="*/ 6389870 w 8009587"/>
-                      <a:gd name="connsiteY21" fmla="*/ 7732103 h 7732104"/>
-                      <a:gd name="connsiteX22" fmla="*/ 5580012 w 8009587"/>
-                      <a:gd name="connsiteY22" fmla="*/ 7732103 h 7732104"/>
-                      <a:gd name="connsiteX23" fmla="*/ 4529867 w 8009587"/>
-                      <a:gd name="connsiteY23" fmla="*/ 7732103 h 7732104"/>
-                      <a:gd name="connsiteX24" fmla="*/ 3479719 w 8009587"/>
-                      <a:gd name="connsiteY24" fmla="*/ 7732103 h 7732104"/>
-                      <a:gd name="connsiteX25" fmla="*/ 2509670 w 8009587"/>
-                      <a:gd name="connsiteY25" fmla="*/ 7732103 h 7732104"/>
-                      <a:gd name="connsiteX26" fmla="*/ 1699812 w 8009587"/>
-                      <a:gd name="connsiteY26" fmla="*/ 7732103 h 7732104"/>
-                      <a:gd name="connsiteX27" fmla="*/ 1050145 w 8009587"/>
-                      <a:gd name="connsiteY27" fmla="*/ 7732103 h 7732104"/>
-                      <a:gd name="connsiteX28" fmla="*/ 0 w 8009587"/>
-                      <a:gd name="connsiteY28" fmla="*/ 7732103 h 7732104"/>
-                      <a:gd name="connsiteX29" fmla="*/ 0 w 8009587"/>
-                      <a:gd name="connsiteY29" fmla="*/ 6950302 h 7732104"/>
-                      <a:gd name="connsiteX30" fmla="*/ 0 w 8009587"/>
-                      <a:gd name="connsiteY30" fmla="*/ 6091179 h 7732104"/>
-                      <a:gd name="connsiteX31" fmla="*/ 0 w 8009587"/>
-                      <a:gd name="connsiteY31" fmla="*/ 5309377 h 7732104"/>
-                      <a:gd name="connsiteX32" fmla="*/ 0 w 8009587"/>
-                      <a:gd name="connsiteY32" fmla="*/ 4450254 h 7732104"/>
-                      <a:gd name="connsiteX33" fmla="*/ 0 w 8009587"/>
-                      <a:gd name="connsiteY33" fmla="*/ 3591133 h 7732104"/>
-                      <a:gd name="connsiteX34" fmla="*/ 0 w 8009587"/>
-                      <a:gd name="connsiteY34" fmla="*/ 2654688 h 7732104"/>
-                      <a:gd name="connsiteX35" fmla="*/ 0 w 8009587"/>
-                      <a:gd name="connsiteY35" fmla="*/ 1795565 h 7732104"/>
-                      <a:gd name="connsiteX36" fmla="*/ 0 w 8009587"/>
-                      <a:gd name="connsiteY36" fmla="*/ 936444 h 7732104"/>
-                      <a:gd name="connsiteX37" fmla="*/ 0 w 8009587"/>
-                      <a:gd name="connsiteY37" fmla="*/ 0 h 7732104"/>
-                      <a:gd name="connsiteX0" fmla="*/ 0 w 8009587"/>
-                      <a:gd name="connsiteY0" fmla="*/ 0 h 7732104"/>
-                      <a:gd name="connsiteX1" fmla="*/ 1050145 w 8009587"/>
-                      <a:gd name="connsiteY1" fmla="*/ 0 h 7732104"/>
-                      <a:gd name="connsiteX2" fmla="*/ 1940099 w 8009587"/>
-                      <a:gd name="connsiteY2" fmla="*/ 0 h 7732104"/>
-                      <a:gd name="connsiteX3" fmla="*/ 2910150 w 8009587"/>
-                      <a:gd name="connsiteY3" fmla="*/ 0 h 7732104"/>
-                      <a:gd name="connsiteX4" fmla="*/ 3800103 w 8009587"/>
-                      <a:gd name="connsiteY4" fmla="*/ 0 h 7732104"/>
-                      <a:gd name="connsiteX5" fmla="*/ 4449770 w 8009587"/>
-                      <a:gd name="connsiteY5" fmla="*/ 0 h 7732104"/>
-                      <a:gd name="connsiteX6" fmla="*/ 5179532 w 8009587"/>
-                      <a:gd name="connsiteY6" fmla="*/ 0 h 7732104"/>
-                      <a:gd name="connsiteX7" fmla="*/ 5989390 w 8009587"/>
-                      <a:gd name="connsiteY7" fmla="*/ 0 h 7732104"/>
-                      <a:gd name="connsiteX8" fmla="*/ 7039536 w 8009587"/>
-                      <a:gd name="connsiteY8" fmla="*/ 0 h 7732104"/>
-                      <a:gd name="connsiteX9" fmla="*/ 8009587 w 8009587"/>
-                      <a:gd name="connsiteY9" fmla="*/ 0 h 7732104"/>
-                      <a:gd name="connsiteX10" fmla="*/ 8009587 w 8009587"/>
-                      <a:gd name="connsiteY10" fmla="*/ 1013764 h 7732104"/>
-                      <a:gd name="connsiteX11" fmla="*/ 8009587 w 8009587"/>
-                      <a:gd name="connsiteY11" fmla="*/ 1872887 h 7732104"/>
-                      <a:gd name="connsiteX12" fmla="*/ 8009587 w 8009587"/>
-                      <a:gd name="connsiteY12" fmla="*/ 2577367 h 7732104"/>
-                      <a:gd name="connsiteX13" fmla="*/ 8009587 w 8009587"/>
-                      <a:gd name="connsiteY13" fmla="*/ 3436490 h 7732104"/>
-                      <a:gd name="connsiteX14" fmla="*/ 8009587 w 8009587"/>
-                      <a:gd name="connsiteY14" fmla="*/ 4295613 h 7732104"/>
-                      <a:gd name="connsiteX15" fmla="*/ 8009587 w 8009587"/>
-                      <a:gd name="connsiteY15" fmla="*/ 4922772 h 7732104"/>
-                      <a:gd name="connsiteX16" fmla="*/ 8009587 w 8009587"/>
-                      <a:gd name="connsiteY16" fmla="*/ 5936538 h 7732104"/>
-                      <a:gd name="connsiteX17" fmla="*/ 8009587 w 8009587"/>
-                      <a:gd name="connsiteY17" fmla="*/ 6563696 h 7732104"/>
-                      <a:gd name="connsiteX18" fmla="*/ 8009587 w 8009587"/>
-                      <a:gd name="connsiteY18" fmla="*/ 7732103 h 7732104"/>
-                      <a:gd name="connsiteX19" fmla="*/ 7359919 w 8009587"/>
-                      <a:gd name="connsiteY19" fmla="*/ 7732103 h 7732104"/>
-                      <a:gd name="connsiteX20" fmla="*/ 6630157 w 8009587"/>
-                      <a:gd name="connsiteY20" fmla="*/ 7732103 h 7732104"/>
-                      <a:gd name="connsiteX21" fmla="*/ 5660108 w 8009587"/>
-                      <a:gd name="connsiteY21" fmla="*/ 7732103 h 7732104"/>
-                      <a:gd name="connsiteX22" fmla="*/ 4930345 w 8009587"/>
-                      <a:gd name="connsiteY22" fmla="*/ 7732103 h 7732104"/>
-                      <a:gd name="connsiteX23" fmla="*/ 4200583 w 8009587"/>
-                      <a:gd name="connsiteY23" fmla="*/ 7732103 h 7732104"/>
-                      <a:gd name="connsiteX24" fmla="*/ 3390725 w 8009587"/>
-                      <a:gd name="connsiteY24" fmla="*/ 7732103 h 7732104"/>
-                      <a:gd name="connsiteX25" fmla="*/ 2741058 w 8009587"/>
-                      <a:gd name="connsiteY25" fmla="*/ 7732103 h 7732104"/>
-                      <a:gd name="connsiteX26" fmla="*/ 1851105 w 8009587"/>
-                      <a:gd name="connsiteY26" fmla="*/ 7732103 h 7732104"/>
-                      <a:gd name="connsiteX27" fmla="*/ 1041245 w 8009587"/>
-                      <a:gd name="connsiteY27" fmla="*/ 7732103 h 7732104"/>
-                      <a:gd name="connsiteX28" fmla="*/ 0 w 8009587"/>
-                      <a:gd name="connsiteY28" fmla="*/ 7732103 h 7732104"/>
-                      <a:gd name="connsiteX29" fmla="*/ 0 w 8009587"/>
-                      <a:gd name="connsiteY29" fmla="*/ 6950302 h 7732104"/>
-                      <a:gd name="connsiteX30" fmla="*/ 0 w 8009587"/>
-                      <a:gd name="connsiteY30" fmla="*/ 6245822 h 7732104"/>
-                      <a:gd name="connsiteX31" fmla="*/ 0 w 8009587"/>
-                      <a:gd name="connsiteY31" fmla="*/ 5541340 h 7732104"/>
-                      <a:gd name="connsiteX32" fmla="*/ 0 w 8009587"/>
-                      <a:gd name="connsiteY32" fmla="*/ 4759539 h 7732104"/>
-                      <a:gd name="connsiteX33" fmla="*/ 0 w 8009587"/>
-                      <a:gd name="connsiteY33" fmla="*/ 3900416 h 7732104"/>
-                      <a:gd name="connsiteX34" fmla="*/ 0 w 8009587"/>
-                      <a:gd name="connsiteY34" fmla="*/ 3273257 h 7732104"/>
-                      <a:gd name="connsiteX35" fmla="*/ 0 w 8009587"/>
-                      <a:gd name="connsiteY35" fmla="*/ 2646097 h 7732104"/>
-                      <a:gd name="connsiteX36" fmla="*/ 0 w 8009587"/>
-                      <a:gd name="connsiteY36" fmla="*/ 1632332 h 7732104"/>
-                      <a:gd name="connsiteX37" fmla="*/ 0 w 8009587"/>
-                      <a:gd name="connsiteY37" fmla="*/ 1005172 h 7732104"/>
-                      <a:gd name="connsiteX38" fmla="*/ 0 w 8009587"/>
-                      <a:gd name="connsiteY38" fmla="*/ 0 h 7732104"/>
-                    </a:gdLst>
-                    <a:ahLst/>
-                    <a:cxnLst>
-                      <a:cxn ang="0">
-                        <a:pos x="connsiteX0" y="connsiteY0"/>
-                      </a:cxn>
-                      <a:cxn ang="0">
-                        <a:pos x="connsiteX1" y="connsiteY1"/>
-                      </a:cxn>
-                      <a:cxn ang="0">
-                        <a:pos x="connsiteX2" y="connsiteY2"/>
-                      </a:cxn>
-                      <a:cxn ang="0">
-                        <a:pos x="connsiteX3" y="connsiteY3"/>
-                      </a:cxn>
-                      <a:cxn ang="0">
-                        <a:pos x="connsiteX4" y="connsiteY4"/>
-                      </a:cxn>
-                      <a:cxn ang="0">
-                        <a:pos x="connsiteX5" y="connsiteY5"/>
-                      </a:cxn>
-                      <a:cxn ang="0">
-                        <a:pos x="connsiteX6" y="connsiteY6"/>
-                      </a:cxn>
-                      <a:cxn ang="0">
-                        <a:pos x="connsiteX7" y="connsiteY7"/>
-                      </a:cxn>
-                      <a:cxn ang="0">
-                        <a:pos x="connsiteX8" y="connsiteY8"/>
-                      </a:cxn>
-                      <a:cxn ang="0">
-                        <a:pos x="connsiteX9" y="connsiteY9"/>
-                      </a:cxn>
-                      <a:cxn ang="0">
-                        <a:pos x="connsiteX10" y="connsiteY10"/>
-                      </a:cxn>
-                      <a:cxn ang="0">
-                        <a:pos x="connsiteX11" y="connsiteY11"/>
-                      </a:cxn>
-                      <a:cxn ang="0">
-                        <a:pos x="connsiteX12" y="connsiteY12"/>
-                      </a:cxn>
-                      <a:cxn ang="0">
-                        <a:pos x="connsiteX13" y="connsiteY13"/>
-                      </a:cxn>
-                      <a:cxn ang="0">
-                        <a:pos x="connsiteX14" y="connsiteY14"/>
-                      </a:cxn>
-                      <a:cxn ang="0">
-                        <a:pos x="connsiteX15" y="connsiteY15"/>
-                      </a:cxn>
-                      <a:cxn ang="0">
-                        <a:pos x="connsiteX16" y="connsiteY16"/>
-                      </a:cxn>
-                      <a:cxn ang="0">
-                        <a:pos x="connsiteX17" y="connsiteY17"/>
-                      </a:cxn>
-                      <a:cxn ang="0">
-                        <a:pos x="connsiteX18" y="connsiteY18"/>
-                      </a:cxn>
-                      <a:cxn ang="0">
-                        <a:pos x="connsiteX19" y="connsiteY19"/>
-                      </a:cxn>
-                      <a:cxn ang="0">
-                        <a:pos x="connsiteX20" y="connsiteY20"/>
-                      </a:cxn>
-                      <a:cxn ang="0">
-                        <a:pos x="connsiteX21" y="connsiteY21"/>
-                      </a:cxn>
-                      <a:cxn ang="0">
-                        <a:pos x="connsiteX22" y="connsiteY22"/>
-                      </a:cxn>
-                      <a:cxn ang="0">
-                        <a:pos x="connsiteX23" y="connsiteY23"/>
-                      </a:cxn>
-                      <a:cxn ang="0">
-                        <a:pos x="connsiteX24" y="connsiteY24"/>
-                      </a:cxn>
-                      <a:cxn ang="0">
-                        <a:pos x="connsiteX25" y="connsiteY25"/>
-                      </a:cxn>
-                      <a:cxn ang="0">
-                        <a:pos x="connsiteX26" y="connsiteY26"/>
-                      </a:cxn>
-                      <a:cxn ang="0">
-                        <a:pos x="connsiteX27" y="connsiteY27"/>
-                      </a:cxn>
-                      <a:cxn ang="0">
-                        <a:pos x="connsiteX28" y="connsiteY28"/>
-                      </a:cxn>
-                      <a:cxn ang="0">
-                        <a:pos x="connsiteX29" y="connsiteY29"/>
-                      </a:cxn>
-                      <a:cxn ang="0">
-                        <a:pos x="connsiteX30" y="connsiteY30"/>
-                      </a:cxn>
-                      <a:cxn ang="0">
-                        <a:pos x="connsiteX31" y="connsiteY31"/>
-                      </a:cxn>
-                      <a:cxn ang="0">
-                        <a:pos x="connsiteX32" y="connsiteY32"/>
-                      </a:cxn>
-                      <a:cxn ang="0">
-                        <a:pos x="connsiteX33" y="connsiteY33"/>
-                      </a:cxn>
-                      <a:cxn ang="0">
-                        <a:pos x="connsiteX34" y="connsiteY34"/>
-                      </a:cxn>
-                      <a:cxn ang="0">
-                        <a:pos x="connsiteX35" y="connsiteY35"/>
-                      </a:cxn>
-                      <a:cxn ang="0">
-                        <a:pos x="connsiteX36" y="connsiteY36"/>
-                      </a:cxn>
-                      <a:cxn ang="0">
-                        <a:pos x="connsiteX37" y="connsiteY37"/>
-                      </a:cxn>
-                      <a:cxn ang="0">
-                        <a:pos x="connsiteX38" y="connsiteY38"/>
-                      </a:cxn>
-                    </a:cxnLst>
-                    <a:rect l="l" t="t" r="r" b="b"/>
-                    <a:pathLst>
-                      <a:path w="8009587" h="7732104" fill="none" extrusionOk="0">
-                        <a:moveTo>
-                          <a:pt x="0" y="0"/>
-                        </a:moveTo>
-                        <a:cubicBezTo>
-                          <a:pt x="206607" y="-57684"/>
-                          <a:pt x="387495" y="102252"/>
-                          <a:pt x="649667" y="0"/>
-                        </a:cubicBezTo>
-                        <a:cubicBezTo>
-                          <a:pt x="867863" y="-18822"/>
-                          <a:pt x="1221204" y="105829"/>
-                          <a:pt x="1539620" y="0"/>
-                        </a:cubicBezTo>
-                        <a:cubicBezTo>
-                          <a:pt x="1866283" y="-49346"/>
-                          <a:pt x="2254253" y="95323"/>
-                          <a:pt x="2509670" y="0"/>
-                        </a:cubicBezTo>
-                        <a:cubicBezTo>
-                          <a:pt x="2824184" y="-104554"/>
-                          <a:pt x="3215957" y="31911"/>
-                          <a:pt x="3399625" y="0"/>
-                        </a:cubicBezTo>
-                        <a:cubicBezTo>
-                          <a:pt x="3594582" y="-30595"/>
-                          <a:pt x="3871292" y="47684"/>
-                          <a:pt x="4289578" y="0"/>
-                        </a:cubicBezTo>
-                        <a:cubicBezTo>
-                          <a:pt x="4733431" y="30352"/>
-                          <a:pt x="4974990" y="51763"/>
-                          <a:pt x="5339725" y="0"/>
-                        </a:cubicBezTo>
-                        <a:cubicBezTo>
-                          <a:pt x="5744642" y="-73495"/>
-                          <a:pt x="5676832" y="87410"/>
-                          <a:pt x="5989390" y="0"/>
-                        </a:cubicBezTo>
-                        <a:cubicBezTo>
-                          <a:pt x="6263122" y="-77903"/>
-                          <a:pt x="6520555" y="56590"/>
-                          <a:pt x="6959441" y="0"/>
-                        </a:cubicBezTo>
-                        <a:cubicBezTo>
-                          <a:pt x="7373934" y="-47391"/>
-                          <a:pt x="7567163" y="39516"/>
-                          <a:pt x="8009587" y="0"/>
-                        </a:cubicBezTo>
-                        <a:cubicBezTo>
-                          <a:pt x="8122560" y="278527"/>
-                          <a:pt x="8042418" y="554138"/>
-                          <a:pt x="8009587" y="936444"/>
-                        </a:cubicBezTo>
-                        <a:cubicBezTo>
-                          <a:pt x="8009317" y="1375851"/>
-                          <a:pt x="8001544" y="1350346"/>
-                          <a:pt x="8009587" y="1563603"/>
-                        </a:cubicBezTo>
-                        <a:cubicBezTo>
-                          <a:pt x="8094161" y="1775772"/>
-                          <a:pt x="7870602" y="2222670"/>
-                          <a:pt x="8009587" y="2577367"/>
-                        </a:cubicBezTo>
-                        <a:cubicBezTo>
-                          <a:pt x="8094341" y="2906497"/>
-                          <a:pt x="7984209" y="3273141"/>
-                          <a:pt x="8009587" y="3591133"/>
-                        </a:cubicBezTo>
-                        <a:cubicBezTo>
-                          <a:pt x="8074855" y="3830765"/>
-                          <a:pt x="7964664" y="4114416"/>
-                          <a:pt x="8009587" y="4218292"/>
-                        </a:cubicBezTo>
-                        <a:cubicBezTo>
-                          <a:pt x="8075352" y="4367039"/>
-                          <a:pt x="7940453" y="4630635"/>
-                          <a:pt x="8009587" y="4845452"/>
-                        </a:cubicBezTo>
-                        <a:cubicBezTo>
-                          <a:pt x="8046725" y="5010839"/>
-                          <a:pt x="8023309" y="5239701"/>
-                          <a:pt x="8009587" y="5549932"/>
-                        </a:cubicBezTo>
-                        <a:cubicBezTo>
-                          <a:pt x="8046236" y="5862852"/>
-                          <a:pt x="7988541" y="5904532"/>
-                          <a:pt x="8009587" y="6177092"/>
-                        </a:cubicBezTo>
-                        <a:cubicBezTo>
-                          <a:pt x="8045963" y="6444300"/>
-                          <a:pt x="7984993" y="6607699"/>
-                          <a:pt x="8009587" y="6804251"/>
-                        </a:cubicBezTo>
-                        <a:cubicBezTo>
-                          <a:pt x="8096152" y="7007337"/>
-                          <a:pt x="8018555" y="7438181"/>
-                          <a:pt x="8009587" y="7732103"/>
-                        </a:cubicBezTo>
-                        <a:cubicBezTo>
-                          <a:pt x="7660403" y="7820512"/>
-                          <a:pt x="7583058" y="7718748"/>
-                          <a:pt x="7199728" y="7732103"/>
-                        </a:cubicBezTo>
-                        <a:cubicBezTo>
-                          <a:pt x="6844798" y="7731718"/>
-                          <a:pt x="6715247" y="7685430"/>
-                          <a:pt x="6389870" y="7732103"/>
-                        </a:cubicBezTo>
-                        <a:cubicBezTo>
-                          <a:pt x="6086422" y="7778682"/>
-                          <a:pt x="5886523" y="7718040"/>
-                          <a:pt x="5580012" y="7732103"/>
-                        </a:cubicBezTo>
-                        <a:cubicBezTo>
-                          <a:pt x="5311499" y="7740576"/>
-                          <a:pt x="4839942" y="7694484"/>
-                          <a:pt x="4529867" y="7732103"/>
-                        </a:cubicBezTo>
-                        <a:cubicBezTo>
-                          <a:pt x="4309363" y="7763688"/>
-                          <a:pt x="3728824" y="7785219"/>
-                          <a:pt x="3479719" y="7732103"/>
-                        </a:cubicBezTo>
-                        <a:cubicBezTo>
-                          <a:pt x="3230840" y="7776688"/>
-                          <a:pt x="2961393" y="7699939"/>
-                          <a:pt x="2509670" y="7732103"/>
-                        </a:cubicBezTo>
-                        <a:cubicBezTo>
-                          <a:pt x="2040520" y="7790835"/>
-                          <a:pt x="2028465" y="7682274"/>
-                          <a:pt x="1699812" y="7732103"/>
-                        </a:cubicBezTo>
-                        <a:cubicBezTo>
-                          <a:pt x="1407923" y="7809057"/>
-                          <a:pt x="1276017" y="7658401"/>
-                          <a:pt x="1050145" y="7732103"/>
-                        </a:cubicBezTo>
-                        <a:cubicBezTo>
-                          <a:pt x="880733" y="7807720"/>
-                          <a:pt x="263991" y="7624947"/>
-                          <a:pt x="0" y="7732103"/>
-                        </a:cubicBezTo>
-                        <a:cubicBezTo>
-                          <a:pt x="-7427" y="7464866"/>
-                          <a:pt x="-21519" y="7279342"/>
-                          <a:pt x="0" y="6950302"/>
-                        </a:cubicBezTo>
-                        <a:cubicBezTo>
-                          <a:pt x="-18232" y="6634188"/>
-                          <a:pt x="95597" y="6421987"/>
-                          <a:pt x="0" y="6091179"/>
-                        </a:cubicBezTo>
-                        <a:cubicBezTo>
-                          <a:pt x="-102747" y="5741224"/>
-                          <a:pt x="17410" y="5669709"/>
-                          <a:pt x="0" y="5309377"/>
-                        </a:cubicBezTo>
-                        <a:cubicBezTo>
-                          <a:pt x="-8302" y="4945276"/>
-                          <a:pt x="45412" y="4727216"/>
-                          <a:pt x="0" y="4450254"/>
-                        </a:cubicBezTo>
-                        <a:cubicBezTo>
-                          <a:pt x="-33076" y="4186115"/>
-                          <a:pt x="95037" y="3898181"/>
-                          <a:pt x="0" y="3591133"/>
-                        </a:cubicBezTo>
-                        <a:cubicBezTo>
-                          <a:pt x="-83368" y="3263057"/>
-                          <a:pt x="28143" y="2876088"/>
-                          <a:pt x="0" y="2654688"/>
-                        </a:cubicBezTo>
-                        <a:cubicBezTo>
-                          <a:pt x="9625" y="2413499"/>
-                          <a:pt x="35600" y="2081982"/>
-                          <a:pt x="0" y="1795565"/>
-                        </a:cubicBezTo>
-                        <a:cubicBezTo>
-                          <a:pt x="-63548" y="1550875"/>
-                          <a:pt x="40128" y="1337142"/>
-                          <a:pt x="0" y="936444"/>
-                        </a:cubicBezTo>
-                        <a:cubicBezTo>
-                          <a:pt x="-50131" y="492820"/>
-                          <a:pt x="134738" y="393848"/>
-                          <a:pt x="0" y="0"/>
-                        </a:cubicBezTo>
-                        <a:close/>
-                      </a:path>
-                      <a:path w="8009587" h="7732104" stroke="0" extrusionOk="0">
-                        <a:moveTo>
-                          <a:pt x="0" y="0"/>
-                        </a:moveTo>
-                        <a:cubicBezTo>
-                          <a:pt x="206118" y="-12750"/>
-                          <a:pt x="821694" y="61633"/>
-                          <a:pt x="1050145" y="0"/>
-                        </a:cubicBezTo>
-                        <a:cubicBezTo>
-                          <a:pt x="1306866" y="5063"/>
-                          <a:pt x="1643844" y="8387"/>
-                          <a:pt x="1940099" y="0"/>
-                        </a:cubicBezTo>
-                        <a:cubicBezTo>
-                          <a:pt x="2304155" y="27365"/>
-                          <a:pt x="2527434" y="172156"/>
-                          <a:pt x="2910150" y="0"/>
-                        </a:cubicBezTo>
-                        <a:cubicBezTo>
-                          <a:pt x="3254755" y="-114564"/>
-                          <a:pt x="3322027" y="14332"/>
-                          <a:pt x="3800103" y="0"/>
-                        </a:cubicBezTo>
-                        <a:cubicBezTo>
-                          <a:pt x="4211906" y="-32347"/>
-                          <a:pt x="4317994" y="-5431"/>
-                          <a:pt x="4449770" y="0"/>
-                        </a:cubicBezTo>
-                        <a:cubicBezTo>
-                          <a:pt x="4590281" y="-10233"/>
-                          <a:pt x="5012805" y="38411"/>
-                          <a:pt x="5179532" y="0"/>
-                        </a:cubicBezTo>
-                        <a:cubicBezTo>
-                          <a:pt x="5371737" y="-8228"/>
-                          <a:pt x="5811013" y="99074"/>
-                          <a:pt x="5989390" y="0"/>
-                        </a:cubicBezTo>
-                        <a:cubicBezTo>
-                          <a:pt x="6218437" y="-86712"/>
-                          <a:pt x="6592560" y="49219"/>
-                          <a:pt x="7039536" y="0"/>
-                        </a:cubicBezTo>
-                        <a:cubicBezTo>
-                          <a:pt x="7450977" y="-111745"/>
-                          <a:pt x="7622211" y="39344"/>
-                          <a:pt x="8009587" y="0"/>
-                        </a:cubicBezTo>
-                        <a:cubicBezTo>
-                          <a:pt x="8130091" y="306857"/>
-                          <a:pt x="8019689" y="545119"/>
-                          <a:pt x="8009587" y="1013764"/>
-                        </a:cubicBezTo>
-                        <a:cubicBezTo>
-                          <a:pt x="8042976" y="1433984"/>
-                          <a:pt x="7931424" y="1665160"/>
-                          <a:pt x="8009587" y="1872887"/>
-                        </a:cubicBezTo>
-                        <a:cubicBezTo>
-                          <a:pt x="8023607" y="2015122"/>
-                          <a:pt x="7961879" y="2250579"/>
-                          <a:pt x="8009587" y="2577367"/>
-                        </a:cubicBezTo>
-                        <a:cubicBezTo>
-                          <a:pt x="8059524" y="2819112"/>
-                          <a:pt x="7964496" y="3144502"/>
-                          <a:pt x="8009587" y="3436490"/>
-                        </a:cubicBezTo>
-                        <a:cubicBezTo>
-                          <a:pt x="8046404" y="3741830"/>
-                          <a:pt x="7919216" y="3909408"/>
-                          <a:pt x="8009587" y="4295613"/>
-                        </a:cubicBezTo>
-                        <a:cubicBezTo>
-                          <a:pt x="8080776" y="4673994"/>
-                          <a:pt x="7922368" y="4763853"/>
-                          <a:pt x="8009587" y="4922772"/>
-                        </a:cubicBezTo>
-                        <a:cubicBezTo>
-                          <a:pt x="8128435" y="5093774"/>
-                          <a:pt x="7831982" y="5695677"/>
-                          <a:pt x="8009587" y="5936538"/>
-                        </a:cubicBezTo>
-                        <a:cubicBezTo>
-                          <a:pt x="8166348" y="6193249"/>
-                          <a:pt x="7947365" y="6426063"/>
-                          <a:pt x="8009587" y="6563696"/>
-                        </a:cubicBezTo>
-                        <a:cubicBezTo>
-                          <a:pt x="8110352" y="6778458"/>
-                          <a:pt x="7862730" y="7248381"/>
-                          <a:pt x="8009587" y="7732103"/>
-                        </a:cubicBezTo>
-                        <a:cubicBezTo>
-                          <a:pt x="7843281" y="7828505"/>
-                          <a:pt x="7522376" y="7667672"/>
-                          <a:pt x="7359919" y="7732103"/>
-                        </a:cubicBezTo>
-                        <a:cubicBezTo>
-                          <a:pt x="7211203" y="7769408"/>
-                          <a:pt x="6874253" y="7643317"/>
-                          <a:pt x="6630157" y="7732103"/>
-                        </a:cubicBezTo>
-                        <a:cubicBezTo>
-                          <a:pt x="6375212" y="7760441"/>
-                          <a:pt x="6089886" y="7614364"/>
-                          <a:pt x="5660108" y="7732103"/>
-                        </a:cubicBezTo>
-                        <a:cubicBezTo>
-                          <a:pt x="5189113" y="7753140"/>
-                          <a:pt x="5138061" y="7695696"/>
-                          <a:pt x="4930345" y="7732103"/>
-                        </a:cubicBezTo>
-                        <a:cubicBezTo>
-                          <a:pt x="4727368" y="7806907"/>
-                          <a:pt x="4380739" y="7705763"/>
-                          <a:pt x="4200583" y="7732103"/>
-                        </a:cubicBezTo>
-                        <a:cubicBezTo>
-                          <a:pt x="4043396" y="7793918"/>
-                          <a:pt x="3809262" y="7649235"/>
-                          <a:pt x="3390725" y="7732103"/>
-                        </a:cubicBezTo>
-                        <a:cubicBezTo>
-                          <a:pt x="3003123" y="7785769"/>
-                          <a:pt x="3039193" y="7681877"/>
-                          <a:pt x="2741058" y="7732103"/>
-                        </a:cubicBezTo>
-                        <a:cubicBezTo>
-                          <a:pt x="2436494" y="7753631"/>
-                          <a:pt x="2072878" y="7737608"/>
-                          <a:pt x="1851105" y="7732103"/>
-                        </a:cubicBezTo>
-                        <a:cubicBezTo>
-                          <a:pt x="1589998" y="7776211"/>
-                          <a:pt x="1295868" y="7671688"/>
-                          <a:pt x="1041245" y="7732103"/>
-                        </a:cubicBezTo>
-                        <a:cubicBezTo>
-                          <a:pt x="791912" y="7758384"/>
-                          <a:pt x="288449" y="7703754"/>
-                          <a:pt x="0" y="7732103"/>
-                        </a:cubicBezTo>
-                        <a:cubicBezTo>
-                          <a:pt x="-124113" y="7363802"/>
-                          <a:pt x="-6292" y="7307559"/>
-                          <a:pt x="0" y="6950302"/>
-                        </a:cubicBezTo>
-                        <a:cubicBezTo>
-                          <a:pt x="-13926" y="6627319"/>
-                          <a:pt x="20623" y="6557905"/>
-                          <a:pt x="0" y="6245822"/>
-                        </a:cubicBezTo>
-                        <a:cubicBezTo>
-                          <a:pt x="-902" y="5926755"/>
-                          <a:pt x="45991" y="5830595"/>
-                          <a:pt x="0" y="5541340"/>
-                        </a:cubicBezTo>
-                        <a:cubicBezTo>
-                          <a:pt x="-46455" y="5247808"/>
-                          <a:pt x="32084" y="4969339"/>
-                          <a:pt x="0" y="4759539"/>
-                        </a:cubicBezTo>
-                        <a:cubicBezTo>
-                          <a:pt x="-10641" y="4598448"/>
-                          <a:pt x="41233" y="4246260"/>
-                          <a:pt x="0" y="3900416"/>
-                        </a:cubicBezTo>
-                        <a:cubicBezTo>
-                          <a:pt x="-13029" y="3551389"/>
-                          <a:pt x="10863" y="3566792"/>
-                          <a:pt x="0" y="3273257"/>
-                        </a:cubicBezTo>
-                        <a:cubicBezTo>
-                          <a:pt x="-13203" y="2979557"/>
-                          <a:pt x="71435" y="2951896"/>
-                          <a:pt x="0" y="2646097"/>
-                        </a:cubicBezTo>
-                        <a:cubicBezTo>
-                          <a:pt x="-19412" y="2322125"/>
-                          <a:pt x="37745" y="1950568"/>
-                          <a:pt x="0" y="1632332"/>
-                        </a:cubicBezTo>
-                        <a:cubicBezTo>
-                          <a:pt x="-63088" y="1310113"/>
-                          <a:pt x="-2429" y="1224851"/>
-                          <a:pt x="0" y="1005172"/>
-                        </a:cubicBezTo>
-                        <a:cubicBezTo>
-                          <a:pt x="38170" y="811156"/>
-                          <a:pt x="69904" y="317351"/>
-                          <a:pt x="0" y="0"/>
-                        </a:cubicBezTo>
-                        <a:close/>
-                      </a:path>
-                      <a:path w="8009587" h="7732104" fill="none" stroke="0" extrusionOk="0">
-                        <a:moveTo>
-                          <a:pt x="0" y="0"/>
-                        </a:moveTo>
-                        <a:cubicBezTo>
-                          <a:pt x="256055" y="-16313"/>
-                          <a:pt x="417195" y="68777"/>
-                          <a:pt x="649667" y="0"/>
-                        </a:cubicBezTo>
-                        <a:cubicBezTo>
-                          <a:pt x="874335" y="-59618"/>
-                          <a:pt x="1208690" y="64313"/>
-                          <a:pt x="1539620" y="0"/>
-                        </a:cubicBezTo>
-                        <a:cubicBezTo>
-                          <a:pt x="1922089" y="-73052"/>
-                          <a:pt x="2276745" y="78013"/>
-                          <a:pt x="2509670" y="0"/>
-                        </a:cubicBezTo>
-                        <a:cubicBezTo>
-                          <a:pt x="2776983" y="-115332"/>
-                          <a:pt x="3176286" y="40379"/>
-                          <a:pt x="3399625" y="0"/>
-                        </a:cubicBezTo>
-                        <a:cubicBezTo>
-                          <a:pt x="3580986" y="-45422"/>
-                          <a:pt x="3845279" y="8297"/>
-                          <a:pt x="4289578" y="0"/>
-                        </a:cubicBezTo>
-                        <a:cubicBezTo>
-                          <a:pt x="4708217" y="-18912"/>
-                          <a:pt x="4926818" y="46170"/>
-                          <a:pt x="5339725" y="0"/>
-                        </a:cubicBezTo>
-                        <a:cubicBezTo>
-                          <a:pt x="5773868" y="-51784"/>
-                          <a:pt x="5704174" y="77107"/>
-                          <a:pt x="5989390" y="0"/>
-                        </a:cubicBezTo>
-                        <a:cubicBezTo>
-                          <a:pt x="6278899" y="-55798"/>
-                          <a:pt x="6490254" y="53725"/>
-                          <a:pt x="6959441" y="0"/>
-                        </a:cubicBezTo>
-                        <a:cubicBezTo>
-                          <a:pt x="7426974" y="-26005"/>
-                          <a:pt x="7559556" y="23209"/>
-                          <a:pt x="8009587" y="0"/>
-                        </a:cubicBezTo>
-                        <a:cubicBezTo>
-                          <a:pt x="8048403" y="194921"/>
-                          <a:pt x="8084060" y="486769"/>
-                          <a:pt x="8009587" y="936444"/>
-                        </a:cubicBezTo>
-                        <a:cubicBezTo>
-                          <a:pt x="8010539" y="1377325"/>
-                          <a:pt x="8001355" y="1348811"/>
-                          <a:pt x="8009587" y="1563603"/>
-                        </a:cubicBezTo>
-                        <a:cubicBezTo>
-                          <a:pt x="7995756" y="1795232"/>
-                          <a:pt x="7918430" y="2245429"/>
-                          <a:pt x="8009587" y="2577367"/>
-                        </a:cubicBezTo>
-                        <a:cubicBezTo>
-                          <a:pt x="8135790" y="2888844"/>
-                          <a:pt x="7924300" y="3344928"/>
-                          <a:pt x="8009587" y="3591133"/>
-                        </a:cubicBezTo>
-                        <a:cubicBezTo>
-                          <a:pt x="8106750" y="3861806"/>
-                          <a:pt x="7984829" y="4081164"/>
-                          <a:pt x="8009587" y="4218292"/>
-                        </a:cubicBezTo>
-                        <a:cubicBezTo>
-                          <a:pt x="8037090" y="4367472"/>
-                          <a:pt x="7947694" y="4609115"/>
-                          <a:pt x="8009587" y="4845452"/>
-                        </a:cubicBezTo>
-                        <a:cubicBezTo>
-                          <a:pt x="8049968" y="5078479"/>
-                          <a:pt x="8007175" y="5256209"/>
-                          <a:pt x="8009587" y="5549932"/>
-                        </a:cubicBezTo>
-                        <a:cubicBezTo>
-                          <a:pt x="8051128" y="5873141"/>
-                          <a:pt x="7980747" y="5895501"/>
-                          <a:pt x="8009587" y="6177092"/>
-                        </a:cubicBezTo>
-                        <a:cubicBezTo>
-                          <a:pt x="8078373" y="6434357"/>
-                          <a:pt x="7976896" y="6574575"/>
-                          <a:pt x="8009587" y="6804251"/>
-                        </a:cubicBezTo>
-                        <a:cubicBezTo>
-                          <a:pt x="8019224" y="7093775"/>
-                          <a:pt x="8035005" y="7367781"/>
-                          <a:pt x="8009587" y="7732103"/>
-                        </a:cubicBezTo>
-                        <a:cubicBezTo>
-                          <a:pt x="7671624" y="7803010"/>
-                          <a:pt x="7577196" y="7739544"/>
-                          <a:pt x="7199728" y="7732103"/>
-                        </a:cubicBezTo>
-                        <a:cubicBezTo>
-                          <a:pt x="6813247" y="7737549"/>
-                          <a:pt x="6702610" y="7679995"/>
-                          <a:pt x="6389870" y="7732103"/>
-                        </a:cubicBezTo>
-                        <a:cubicBezTo>
-                          <a:pt x="6060702" y="7804784"/>
-                          <a:pt x="5857367" y="7764595"/>
-                          <a:pt x="5580012" y="7732103"/>
-                        </a:cubicBezTo>
-                        <a:cubicBezTo>
-                          <a:pt x="5246784" y="7807995"/>
-                          <a:pt x="4798455" y="7614225"/>
-                          <a:pt x="4529867" y="7732103"/>
-                        </a:cubicBezTo>
-                        <a:cubicBezTo>
-                          <a:pt x="4289885" y="7841223"/>
-                          <a:pt x="3756785" y="7712763"/>
-                          <a:pt x="3479719" y="7732103"/>
-                        </a:cubicBezTo>
-                        <a:cubicBezTo>
-                          <a:pt x="3252877" y="7706044"/>
-                          <a:pt x="3040153" y="7649367"/>
-                          <a:pt x="2509670" y="7732103"/>
-                        </a:cubicBezTo>
-                        <a:cubicBezTo>
-                          <a:pt x="1986113" y="7824242"/>
-                          <a:pt x="2017758" y="7648331"/>
-                          <a:pt x="1699812" y="7732103"/>
-                        </a:cubicBezTo>
-                        <a:cubicBezTo>
-                          <a:pt x="1393861" y="7791724"/>
-                          <a:pt x="1235124" y="7659666"/>
-                          <a:pt x="1050145" y="7732103"/>
-                        </a:cubicBezTo>
-                        <a:cubicBezTo>
-                          <a:pt x="854287" y="7761050"/>
-                          <a:pt x="245637" y="7704342"/>
-                          <a:pt x="0" y="7732103"/>
-                        </a:cubicBezTo>
-                        <a:cubicBezTo>
-                          <a:pt x="-48086" y="7420820"/>
-                          <a:pt x="26281" y="7230993"/>
-                          <a:pt x="0" y="6950302"/>
-                        </a:cubicBezTo>
-                        <a:cubicBezTo>
-                          <a:pt x="41767" y="6595050"/>
-                          <a:pt x="106400" y="6455212"/>
-                          <a:pt x="0" y="6091179"/>
-                        </a:cubicBezTo>
-                        <a:cubicBezTo>
-                          <a:pt x="-89898" y="5743304"/>
-                          <a:pt x="29544" y="5686892"/>
-                          <a:pt x="0" y="5309377"/>
-                        </a:cubicBezTo>
-                        <a:cubicBezTo>
-                          <a:pt x="-13699" y="4951383"/>
-                          <a:pt x="55085" y="4639802"/>
-                          <a:pt x="0" y="4450254"/>
-                        </a:cubicBezTo>
-                        <a:cubicBezTo>
-                          <a:pt x="-15325" y="4180492"/>
-                          <a:pt x="-14238" y="3965718"/>
-                          <a:pt x="0" y="3591133"/>
-                        </a:cubicBezTo>
-                        <a:cubicBezTo>
-                          <a:pt x="-10622" y="3302718"/>
-                          <a:pt x="-7325" y="2852466"/>
-                          <a:pt x="0" y="2654688"/>
-                        </a:cubicBezTo>
-                        <a:cubicBezTo>
-                          <a:pt x="29220" y="2472540"/>
-                          <a:pt x="26727" y="2001197"/>
-                          <a:pt x="0" y="1795565"/>
-                        </a:cubicBezTo>
-                        <a:cubicBezTo>
-                          <a:pt x="-29575" y="1529390"/>
-                          <a:pt x="50870" y="1320693"/>
-                          <a:pt x="0" y="936444"/>
-                        </a:cubicBezTo>
-                        <a:cubicBezTo>
-                          <a:pt x="-58535" y="505198"/>
-                          <a:pt x="76370" y="309012"/>
-                          <a:pt x="0" y="0"/>
-                        </a:cubicBezTo>
-                        <a:close/>
-                      </a:path>
-                    </a:pathLst>
-                  </a:custGeom>
-                  <ask:type>
-                    <ask:lineSketchScribble/>
-                  </ask:type>
-                </ask:lineSketchStyleProps>
-              </a:ext>
-            </a:extLst>
           </a:ln>
         </p:spPr>
       </p:pic>
       <p:pic>
         <p:nvPicPr>
-          <p:cNvPr id="16" name="Picture 15">
-            <a:extLst>
-              <a:ext uri="{FF2B5EF4-FFF2-40B4-BE49-F238E27FC236}">
-                <a16:creationId xmlns:a16="http://schemas.microsoft.com/office/drawing/2014/main" id="{9ED2D7F8-884F-D1C1-1CB0-8BF73C10ED09}"/>
-              </a:ext>
-            </a:extLst>
-          </p:cNvPr>
+          <p:cNvPr id="16" name="Picture 15"/>
           <p:cNvPicPr>
             <a:picLocks noChangeAspect="1"/>
           </p:cNvPicPr>
           <p:nvPr/>
         </p:nvPicPr>
         <p:blipFill>
-          <a:blip r:embed="rId5">
+          <a:blip r:embed="rId4">
             <a:extLst>
               <a:ext uri="{28A0092B-C50C-407E-A947-70E740481C1C}">
                 <a14:useLocalDpi xmlns:a14="http://schemas.microsoft.com/office/drawing/2010/main" val="0"/>
@@ -5229,16 +4362,8 @@
       </p:pic>
       <p:sp>
         <p:nvSpPr>
-          <p:cNvPr id="18" name="Title 1">
-            <a:extLst>
-              <a:ext uri="{FF2B5EF4-FFF2-40B4-BE49-F238E27FC236}">
-                <a16:creationId xmlns:a16="http://schemas.microsoft.com/office/drawing/2014/main" id="{7BF0F68A-D999-0EC7-3B61-7DB38AEF87ED}"/>
-              </a:ext>
-            </a:extLst>
-          </p:cNvPr>
-          <p:cNvSpPr txBox="1">
-            <a:spLocks/>
-          </p:cNvSpPr>
+          <p:cNvPr id="18" name="Title 1"/>
+          <p:cNvSpPr txBox="1"/>
           <p:nvPr/>
         </p:nvSpPr>
         <p:spPr>
@@ -5296,6 +4421,11 @@
               </a:rPr>
               <a:t> </a:t>
             </a:r>
+            <a:endParaRPr lang="en-IN" b="1" dirty="0">
+              <a:solidFill>
+                <a:srgbClr val="37352F"/>
+              </a:solidFill>
+            </a:endParaRPr>
           </a:p>
           <a:p>
             <a:pPr algn="l"/>
@@ -5307,18 +4437,17 @@
               </a:rPr>
               <a:t>Bootcamp</a:t>
             </a:r>
+            <a:endParaRPr lang="en-IN" sz="11500" b="1" dirty="0">
+              <a:solidFill>
+                <a:srgbClr val="37352F"/>
+              </a:solidFill>
+            </a:endParaRPr>
           </a:p>
         </p:txBody>
       </p:sp>
       <p:sp>
         <p:nvSpPr>
-          <p:cNvPr id="4" name="Rectangle 3">
-            <a:extLst>
-              <a:ext uri="{FF2B5EF4-FFF2-40B4-BE49-F238E27FC236}">
-                <a16:creationId xmlns:a16="http://schemas.microsoft.com/office/drawing/2014/main" id="{EA692D18-930D-423C-323C-369E1669292B}"/>
-              </a:ext>
-            </a:extLst>
-          </p:cNvPr>
+          <p:cNvPr id="4" name="Rectangle 3"/>
           <p:cNvSpPr/>
           <p:nvPr/>
         </p:nvSpPr>
@@ -5408,13 +4537,7 @@
   <p:cSld>
     <p:spTree>
       <p:nvGrpSpPr>
-        <p:cNvPr id="1" name="">
-          <a:extLst>
-            <a:ext uri="{FF2B5EF4-FFF2-40B4-BE49-F238E27FC236}">
-              <a16:creationId xmlns:a16="http://schemas.microsoft.com/office/drawing/2014/main" id="{1084D448-A07B-67B5-5D56-62F2A1BCA44A}"/>
-            </a:ext>
-          </a:extLst>
-        </p:cNvPr>
+        <p:cNvPr id="1" name=""/>
         <p:cNvGrpSpPr/>
         <p:nvPr/>
       </p:nvGrpSpPr>
@@ -5428,27 +4551,21 @@
       </p:grpSpPr>
       <p:pic>
         <p:nvPicPr>
-          <p:cNvPr id="2" name="Picture 2">
-            <a:extLst>
-              <a:ext uri="{FF2B5EF4-FFF2-40B4-BE49-F238E27FC236}">
-                <a16:creationId xmlns:a16="http://schemas.microsoft.com/office/drawing/2014/main" id="{AEEA1264-2001-8C45-AB6D-9F13A0530707}"/>
-              </a:ext>
-            </a:extLst>
-          </p:cNvPr>
+          <p:cNvPr id="2" name="Picture 2"/>
           <p:cNvPicPr>
             <a:picLocks noChangeAspect="1"/>
           </p:cNvPicPr>
           <p:nvPr/>
         </p:nvPicPr>
         <p:blipFill>
-          <a:blip r:embed="rId2">
+          <a:blip r:embed="rId1">
             <a:alphaModFix amt="6000"/>
             <a:extLst>
               <a:ext uri="{28A0092B-C50C-407E-A947-70E740481C1C}">
                 <a14:useLocalDpi xmlns:a14="http://schemas.microsoft.com/office/drawing/2010/main" val="0"/>
               </a:ext>
               <a:ext uri="{96DAC541-7B7A-43D3-8B79-37D633B846F1}">
-                <asvg:svgBlip xmlns:asvg="http://schemas.microsoft.com/office/drawing/2016/SVG/main" r:embed="rId3"/>
+                <asvg:svgBlip xmlns:asvg="http://schemas.microsoft.com/office/drawing/2016/SVG/main" r:embed="rId2"/>
               </a:ext>
             </a:extLst>
           </a:blip>
@@ -5469,27 +4586,21 @@
       </p:pic>
       <p:pic>
         <p:nvPicPr>
-          <p:cNvPr id="3" name="Picture 3">
-            <a:extLst>
-              <a:ext uri="{FF2B5EF4-FFF2-40B4-BE49-F238E27FC236}">
-                <a16:creationId xmlns:a16="http://schemas.microsoft.com/office/drawing/2014/main" id="{555F57C7-5935-82B3-14BB-556AAE973227}"/>
-              </a:ext>
-            </a:extLst>
-          </p:cNvPr>
+          <p:cNvPr id="3" name="Picture 3"/>
           <p:cNvPicPr>
             <a:picLocks noChangeAspect="1"/>
           </p:cNvPicPr>
           <p:nvPr/>
         </p:nvPicPr>
         <p:blipFill>
-          <a:blip r:embed="rId2">
+          <a:blip r:embed="rId1">
             <a:alphaModFix amt="6000"/>
             <a:extLst>
               <a:ext uri="{28A0092B-C50C-407E-A947-70E740481C1C}">
                 <a14:useLocalDpi xmlns:a14="http://schemas.microsoft.com/office/drawing/2010/main" val="0"/>
               </a:ext>
               <a:ext uri="{96DAC541-7B7A-43D3-8B79-37D633B846F1}">
-                <asvg:svgBlip xmlns:asvg="http://schemas.microsoft.com/office/drawing/2016/SVG/main" r:embed="rId3"/>
+                <asvg:svgBlip xmlns:asvg="http://schemas.microsoft.com/office/drawing/2016/SVG/main" r:embed="rId2"/>
               </a:ext>
             </a:extLst>
           </a:blip>
@@ -5510,13 +4621,7 @@
       </p:pic>
       <p:grpSp>
         <p:nvGrpSpPr>
-          <p:cNvPr id="4" name="Group 4">
-            <a:extLst>
-              <a:ext uri="{FF2B5EF4-FFF2-40B4-BE49-F238E27FC236}">
-                <a16:creationId xmlns:a16="http://schemas.microsoft.com/office/drawing/2014/main" id="{20C9F9C1-B465-BE04-E608-E67C5C6B3FF2}"/>
-              </a:ext>
-            </a:extLst>
-          </p:cNvPr>
+          <p:cNvPr id="4" name="Group 4"/>
           <p:cNvGrpSpPr/>
           <p:nvPr/>
         </p:nvGrpSpPr>
@@ -5535,13 +4640,7 @@
         </p:grpSpPr>
         <p:sp>
           <p:nvSpPr>
-            <p:cNvPr id="5" name="Freeform 5">
-              <a:extLst>
-                <a:ext uri="{FF2B5EF4-FFF2-40B4-BE49-F238E27FC236}">
-                  <a16:creationId xmlns:a16="http://schemas.microsoft.com/office/drawing/2014/main" id="{49EDAAD6-6564-2E67-AEC6-6BA08EB6788A}"/>
-                </a:ext>
-              </a:extLst>
-            </p:cNvPr>
+            <p:cNvPr id="5" name="Freeform 5"/>
             <p:cNvSpPr/>
             <p:nvPr/>
           </p:nvSpPr>
@@ -5580,13 +4679,7 @@
       </p:grpSp>
       <p:grpSp>
         <p:nvGrpSpPr>
-          <p:cNvPr id="6" name="Group 6">
-            <a:extLst>
-              <a:ext uri="{FF2B5EF4-FFF2-40B4-BE49-F238E27FC236}">
-                <a16:creationId xmlns:a16="http://schemas.microsoft.com/office/drawing/2014/main" id="{25CC0091-13A7-DCA2-465D-AEB3E8297CC6}"/>
-              </a:ext>
-            </a:extLst>
-          </p:cNvPr>
+          <p:cNvPr id="6" name="Group 6"/>
           <p:cNvGrpSpPr/>
           <p:nvPr/>
         </p:nvGrpSpPr>
@@ -5600,13 +4693,7 @@
         </p:grpSpPr>
         <p:sp>
           <p:nvSpPr>
-            <p:cNvPr id="7" name="Freeform 7">
-              <a:extLst>
-                <a:ext uri="{FF2B5EF4-FFF2-40B4-BE49-F238E27FC236}">
-                  <a16:creationId xmlns:a16="http://schemas.microsoft.com/office/drawing/2014/main" id="{831B48AE-FB52-3795-C0C3-535B4B213B98}"/>
-                </a:ext>
-              </a:extLst>
-            </p:cNvPr>
+            <p:cNvPr id="7" name="Freeform 7"/>
             <p:cNvSpPr/>
             <p:nvPr/>
           </p:nvSpPr>
@@ -5647,13 +4734,7 @@
       </p:grpSp>
       <p:grpSp>
         <p:nvGrpSpPr>
-          <p:cNvPr id="8" name="Group 8">
-            <a:extLst>
-              <a:ext uri="{FF2B5EF4-FFF2-40B4-BE49-F238E27FC236}">
-                <a16:creationId xmlns:a16="http://schemas.microsoft.com/office/drawing/2014/main" id="{E0EA6614-0C4F-C239-C467-DB97B836B539}"/>
-              </a:ext>
-            </a:extLst>
-          </p:cNvPr>
+          <p:cNvPr id="8" name="Group 8"/>
           <p:cNvGrpSpPr/>
           <p:nvPr/>
         </p:nvGrpSpPr>
@@ -5667,13 +4748,7 @@
         </p:grpSpPr>
         <p:sp>
           <p:nvSpPr>
-            <p:cNvPr id="9" name="Freeform 9">
-              <a:extLst>
-                <a:ext uri="{FF2B5EF4-FFF2-40B4-BE49-F238E27FC236}">
-                  <a16:creationId xmlns:a16="http://schemas.microsoft.com/office/drawing/2014/main" id="{9644509F-0080-CA98-203C-6B82C18C128C}"/>
-                </a:ext>
-              </a:extLst>
-            </p:cNvPr>
+            <p:cNvPr id="9" name="Freeform 9"/>
             <p:cNvSpPr/>
             <p:nvPr/>
           </p:nvSpPr>
@@ -5714,13 +4789,7 @@
       </p:grpSp>
       <p:grpSp>
         <p:nvGrpSpPr>
-          <p:cNvPr id="10" name="Group 10">
-            <a:extLst>
-              <a:ext uri="{FF2B5EF4-FFF2-40B4-BE49-F238E27FC236}">
-                <a16:creationId xmlns:a16="http://schemas.microsoft.com/office/drawing/2014/main" id="{D4B1872A-6BC7-38C0-B43E-61115AD42207}"/>
-              </a:ext>
-            </a:extLst>
-          </p:cNvPr>
+          <p:cNvPr id="10" name="Group 10"/>
           <p:cNvGrpSpPr/>
           <p:nvPr/>
         </p:nvGrpSpPr>
@@ -5734,13 +4803,7 @@
         </p:grpSpPr>
         <p:sp>
           <p:nvSpPr>
-            <p:cNvPr id="11" name="Freeform 11">
-              <a:extLst>
-                <a:ext uri="{FF2B5EF4-FFF2-40B4-BE49-F238E27FC236}">
-                  <a16:creationId xmlns:a16="http://schemas.microsoft.com/office/drawing/2014/main" id="{79B4F9F2-38C3-4FCD-9F3E-E0F1EB798287}"/>
-                </a:ext>
-              </a:extLst>
-            </p:cNvPr>
+            <p:cNvPr id="11" name="Freeform 11"/>
             <p:cNvSpPr/>
             <p:nvPr/>
           </p:nvSpPr>
@@ -5781,13 +4844,7 @@
       </p:grpSp>
       <p:grpSp>
         <p:nvGrpSpPr>
-          <p:cNvPr id="12" name="Group 12">
-            <a:extLst>
-              <a:ext uri="{FF2B5EF4-FFF2-40B4-BE49-F238E27FC236}">
-                <a16:creationId xmlns:a16="http://schemas.microsoft.com/office/drawing/2014/main" id="{307B9065-9349-DB52-D6B9-F179E710030B}"/>
-              </a:ext>
-            </a:extLst>
-          </p:cNvPr>
+          <p:cNvPr id="12" name="Group 12"/>
           <p:cNvGrpSpPr/>
           <p:nvPr/>
         </p:nvGrpSpPr>
@@ -5801,13 +4858,7 @@
         </p:grpSpPr>
         <p:sp>
           <p:nvSpPr>
-            <p:cNvPr id="13" name="Freeform 13">
-              <a:extLst>
-                <a:ext uri="{FF2B5EF4-FFF2-40B4-BE49-F238E27FC236}">
-                  <a16:creationId xmlns:a16="http://schemas.microsoft.com/office/drawing/2014/main" id="{6768973D-71D6-2A32-B938-FB5F432933E9}"/>
-                </a:ext>
-              </a:extLst>
-            </p:cNvPr>
+            <p:cNvPr id="13" name="Freeform 13"/>
             <p:cNvSpPr/>
             <p:nvPr/>
           </p:nvSpPr>
@@ -5848,13 +4899,7 @@
       </p:grpSp>
       <p:sp>
         <p:nvSpPr>
-          <p:cNvPr id="17" name="TextBox 16">
-            <a:extLst>
-              <a:ext uri="{FF2B5EF4-FFF2-40B4-BE49-F238E27FC236}">
-                <a16:creationId xmlns:a16="http://schemas.microsoft.com/office/drawing/2014/main" id="{3416F110-99DC-99BE-3C7E-495B025C7A45}"/>
-              </a:ext>
-            </a:extLst>
-          </p:cNvPr>
+          <p:cNvPr id="17" name="TextBox 16"/>
           <p:cNvSpPr txBox="1"/>
           <p:nvPr/>
         </p:nvSpPr>
@@ -5894,6 +4939,11 @@
               </a:rPr>
               <a:t>What is Git and Why Do We Need It</a:t>
             </a:r>
+            <a:endParaRPr lang="en-US" sz="3600" b="1" dirty="0">
+              <a:solidFill>
+                <a:schemeClr val="bg1"/>
+              </a:solidFill>
+            </a:endParaRPr>
           </a:p>
           <a:p>
             <a:pPr marL="285750" indent="-285750">
@@ -5955,13 +5005,7 @@
       </p:sp>
       <p:sp>
         <p:nvSpPr>
-          <p:cNvPr id="19" name="TextBox 18">
-            <a:extLst>
-              <a:ext uri="{FF2B5EF4-FFF2-40B4-BE49-F238E27FC236}">
-                <a16:creationId xmlns:a16="http://schemas.microsoft.com/office/drawing/2014/main" id="{A06EC6B3-4654-8A10-BA68-F5BFE661811A}"/>
-              </a:ext>
-            </a:extLst>
-          </p:cNvPr>
+          <p:cNvPr id="19" name="TextBox 18"/>
           <p:cNvSpPr txBox="1"/>
           <p:nvPr/>
         </p:nvSpPr>
@@ -6004,20 +5048,14 @@
       </p:sp>
       <p:pic>
         <p:nvPicPr>
-          <p:cNvPr id="15" name="Picture 14" descr="A picture containing computer, table, room&#10;&#10;Description automatically generated">
-            <a:extLst>
-              <a:ext uri="{FF2B5EF4-FFF2-40B4-BE49-F238E27FC236}">
-                <a16:creationId xmlns:a16="http://schemas.microsoft.com/office/drawing/2014/main" id="{D65A4C73-0EE8-66E1-3A02-173131AF7E33}"/>
-              </a:ext>
-            </a:extLst>
-          </p:cNvPr>
+          <p:cNvPr id="15" name="Picture 14" descr="A picture containing computer, table, room&#10;&#10;Description automatically generated"/>
           <p:cNvPicPr>
             <a:picLocks noChangeAspect="1"/>
           </p:cNvPicPr>
           <p:nvPr/>
         </p:nvPicPr>
         <p:blipFill>
-          <a:blip r:embed="rId4">
+          <a:blip r:embed="rId3">
             <a:extLst>
               <a:ext uri="{28A0092B-C50C-407E-A947-70E740481C1C}">
                 <a14:useLocalDpi xmlns:a14="http://schemas.microsoft.com/office/drawing/2010/main" val="0"/>
@@ -6623,894 +5661,19 @@
           </a:custGeom>
           <a:ln w="28575">
             <a:noFill/>
-            <a:extLst>
-              <a:ext uri="{C807C97D-BFC1-408E-A445-0C87EB9F89A2}">
-                <ask:lineSketchStyleProps xmlns:ask="http://schemas.microsoft.com/office/drawing/2018/sketchyshapes" sd="2129859828">
-                  <a:custGeom>
-                    <a:avLst/>
-                    <a:gdLst>
-                      <a:gd name="connsiteX0" fmla="*/ 0 w 7537732"/>
-                      <a:gd name="connsiteY0" fmla="*/ 0 h 7276596"/>
-                      <a:gd name="connsiteX1" fmla="*/ 611394 w 7537732"/>
-                      <a:gd name="connsiteY1" fmla="*/ 0 h 7276596"/>
-                      <a:gd name="connsiteX2" fmla="*/ 1448919 w 7537732"/>
-                      <a:gd name="connsiteY2" fmla="*/ 0 h 7276596"/>
-                      <a:gd name="connsiteX3" fmla="*/ 2361822 w 7537732"/>
-                      <a:gd name="connsiteY3" fmla="*/ 0 h 7276596"/>
-                      <a:gd name="connsiteX4" fmla="*/ 3199349 w 7537732"/>
-                      <a:gd name="connsiteY4" fmla="*/ 0 h 7276596"/>
-                      <a:gd name="connsiteX5" fmla="*/ 4036873 w 7537732"/>
-                      <a:gd name="connsiteY5" fmla="*/ 0 h 7276596"/>
-                      <a:gd name="connsiteX6" fmla="*/ 5025155 w 7537732"/>
-                      <a:gd name="connsiteY6" fmla="*/ 0 h 7276596"/>
-                      <a:gd name="connsiteX7" fmla="*/ 5636548 w 7537732"/>
-                      <a:gd name="connsiteY7" fmla="*/ 0 h 7276596"/>
-                      <a:gd name="connsiteX8" fmla="*/ 6549451 w 7537732"/>
-                      <a:gd name="connsiteY8" fmla="*/ 0 h 7276596"/>
-                      <a:gd name="connsiteX9" fmla="*/ 7537732 w 7537732"/>
-                      <a:gd name="connsiteY9" fmla="*/ 0 h 7276596"/>
-                      <a:gd name="connsiteX10" fmla="*/ 7537732 w 7537732"/>
-                      <a:gd name="connsiteY10" fmla="*/ 881277 h 7276596"/>
-                      <a:gd name="connsiteX11" fmla="*/ 7537732 w 7537732"/>
-                      <a:gd name="connsiteY11" fmla="*/ 1471489 h 7276596"/>
-                      <a:gd name="connsiteX12" fmla="*/ 7537732 w 7537732"/>
-                      <a:gd name="connsiteY12" fmla="*/ 2425531 h 7276596"/>
-                      <a:gd name="connsiteX13" fmla="*/ 7537732 w 7537732"/>
-                      <a:gd name="connsiteY13" fmla="*/ 3379575 h 7276596"/>
-                      <a:gd name="connsiteX14" fmla="*/ 7537732 w 7537732"/>
-                      <a:gd name="connsiteY14" fmla="*/ 3969787 h 7276596"/>
-                      <a:gd name="connsiteX15" fmla="*/ 7537732 w 7537732"/>
-                      <a:gd name="connsiteY15" fmla="*/ 4560000 h 7276596"/>
-                      <a:gd name="connsiteX16" fmla="*/ 7537732 w 7537732"/>
-                      <a:gd name="connsiteY16" fmla="*/ 5222978 h 7276596"/>
-                      <a:gd name="connsiteX17" fmla="*/ 7537732 w 7537732"/>
-                      <a:gd name="connsiteY17" fmla="*/ 5813192 h 7276596"/>
-                      <a:gd name="connsiteX18" fmla="*/ 7537732 w 7537732"/>
-                      <a:gd name="connsiteY18" fmla="*/ 6403404 h 7276596"/>
-                      <a:gd name="connsiteX19" fmla="*/ 7537732 w 7537732"/>
-                      <a:gd name="connsiteY19" fmla="*/ 7276596 h 7276596"/>
-                      <a:gd name="connsiteX20" fmla="*/ 6775583 w 7537732"/>
-                      <a:gd name="connsiteY20" fmla="*/ 7276596 h 7276596"/>
-                      <a:gd name="connsiteX21" fmla="*/ 6013435 w 7537732"/>
-                      <a:gd name="connsiteY21" fmla="*/ 7276596 h 7276596"/>
-                      <a:gd name="connsiteX22" fmla="*/ 5251286 w 7537732"/>
-                      <a:gd name="connsiteY22" fmla="*/ 7276596 h 7276596"/>
-                      <a:gd name="connsiteX23" fmla="*/ 4263006 w 7537732"/>
-                      <a:gd name="connsiteY23" fmla="*/ 7276596 h 7276596"/>
-                      <a:gd name="connsiteX24" fmla="*/ 3274725 w 7537732"/>
-                      <a:gd name="connsiteY24" fmla="*/ 7276596 h 7276596"/>
-                      <a:gd name="connsiteX25" fmla="*/ 2361822 w 7537732"/>
-                      <a:gd name="connsiteY25" fmla="*/ 7276596 h 7276596"/>
-                      <a:gd name="connsiteX26" fmla="*/ 1599674 w 7537732"/>
-                      <a:gd name="connsiteY26" fmla="*/ 7276596 h 7276596"/>
-                      <a:gd name="connsiteX27" fmla="*/ 988280 w 7537732"/>
-                      <a:gd name="connsiteY27" fmla="*/ 7276596 h 7276596"/>
-                      <a:gd name="connsiteX28" fmla="*/ 0 w 7537732"/>
-                      <a:gd name="connsiteY28" fmla="*/ 7276596 h 7276596"/>
-                      <a:gd name="connsiteX29" fmla="*/ 0 w 7537732"/>
-                      <a:gd name="connsiteY29" fmla="*/ 6540851 h 7276596"/>
-                      <a:gd name="connsiteX30" fmla="*/ 0 w 7537732"/>
-                      <a:gd name="connsiteY30" fmla="*/ 5732340 h 7276596"/>
-                      <a:gd name="connsiteX31" fmla="*/ 0 w 7537732"/>
-                      <a:gd name="connsiteY31" fmla="*/ 4996595 h 7276596"/>
-                      <a:gd name="connsiteX32" fmla="*/ 0 w 7537732"/>
-                      <a:gd name="connsiteY32" fmla="*/ 4188084 h 7276596"/>
-                      <a:gd name="connsiteX33" fmla="*/ 0 w 7537732"/>
-                      <a:gd name="connsiteY33" fmla="*/ 3379575 h 7276596"/>
-                      <a:gd name="connsiteX34" fmla="*/ 0 w 7537732"/>
-                      <a:gd name="connsiteY34" fmla="*/ 2498297 h 7276596"/>
-                      <a:gd name="connsiteX35" fmla="*/ 0 w 7537732"/>
-                      <a:gd name="connsiteY35" fmla="*/ 1689786 h 7276596"/>
-                      <a:gd name="connsiteX36" fmla="*/ 0 w 7537732"/>
-                      <a:gd name="connsiteY36" fmla="*/ 881277 h 7276596"/>
-                      <a:gd name="connsiteX37" fmla="*/ 0 w 7537732"/>
-                      <a:gd name="connsiteY37" fmla="*/ 0 h 7276596"/>
-                      <a:gd name="connsiteX0" fmla="*/ 0 w 7537732"/>
-                      <a:gd name="connsiteY0" fmla="*/ 0 h 7276596"/>
-                      <a:gd name="connsiteX1" fmla="*/ 988280 w 7537732"/>
-                      <a:gd name="connsiteY1" fmla="*/ 0 h 7276596"/>
-                      <a:gd name="connsiteX2" fmla="*/ 1825806 w 7537732"/>
-                      <a:gd name="connsiteY2" fmla="*/ 0 h 7276596"/>
-                      <a:gd name="connsiteX3" fmla="*/ 2738710 w 7537732"/>
-                      <a:gd name="connsiteY3" fmla="*/ 0 h 7276596"/>
-                      <a:gd name="connsiteX4" fmla="*/ 3576234 w 7537732"/>
-                      <a:gd name="connsiteY4" fmla="*/ 0 h 7276596"/>
-                      <a:gd name="connsiteX5" fmla="*/ 4187629 w 7537732"/>
-                      <a:gd name="connsiteY5" fmla="*/ 0 h 7276596"/>
-                      <a:gd name="connsiteX6" fmla="*/ 4874399 w 7537732"/>
-                      <a:gd name="connsiteY6" fmla="*/ 0 h 7276596"/>
-                      <a:gd name="connsiteX7" fmla="*/ 5636548 w 7537732"/>
-                      <a:gd name="connsiteY7" fmla="*/ 0 h 7276596"/>
-                      <a:gd name="connsiteX8" fmla="*/ 6624828 w 7537732"/>
-                      <a:gd name="connsiteY8" fmla="*/ 0 h 7276596"/>
-                      <a:gd name="connsiteX9" fmla="*/ 7537732 w 7537732"/>
-                      <a:gd name="connsiteY9" fmla="*/ 0 h 7276596"/>
-                      <a:gd name="connsiteX10" fmla="*/ 7537732 w 7537732"/>
-                      <a:gd name="connsiteY10" fmla="*/ 954042 h 7276596"/>
-                      <a:gd name="connsiteX11" fmla="*/ 7537732 w 7537732"/>
-                      <a:gd name="connsiteY11" fmla="*/ 1762553 h 7276596"/>
-                      <a:gd name="connsiteX12" fmla="*/ 7537732 w 7537732"/>
-                      <a:gd name="connsiteY12" fmla="*/ 2425531 h 7276596"/>
-                      <a:gd name="connsiteX13" fmla="*/ 7537732 w 7537732"/>
-                      <a:gd name="connsiteY13" fmla="*/ 3234042 h 7276596"/>
-                      <a:gd name="connsiteX14" fmla="*/ 7537732 w 7537732"/>
-                      <a:gd name="connsiteY14" fmla="*/ 4042553 h 7276596"/>
-                      <a:gd name="connsiteX15" fmla="*/ 7537732 w 7537732"/>
-                      <a:gd name="connsiteY15" fmla="*/ 4632765 h 7276596"/>
-                      <a:gd name="connsiteX16" fmla="*/ 7537732 w 7537732"/>
-                      <a:gd name="connsiteY16" fmla="*/ 5586809 h 7276596"/>
-                      <a:gd name="connsiteX17" fmla="*/ 7537732 w 7537732"/>
-                      <a:gd name="connsiteY17" fmla="*/ 6177021 h 7276596"/>
-                      <a:gd name="connsiteX18" fmla="*/ 7537732 w 7537732"/>
-                      <a:gd name="connsiteY18" fmla="*/ 7276596 h 7276596"/>
-                      <a:gd name="connsiteX19" fmla="*/ 6926337 w 7537732"/>
-                      <a:gd name="connsiteY19" fmla="*/ 7276596 h 7276596"/>
-                      <a:gd name="connsiteX20" fmla="*/ 6239566 w 7537732"/>
-                      <a:gd name="connsiteY20" fmla="*/ 7276596 h 7276596"/>
-                      <a:gd name="connsiteX21" fmla="*/ 5326664 w 7537732"/>
-                      <a:gd name="connsiteY21" fmla="*/ 7276596 h 7276596"/>
-                      <a:gd name="connsiteX22" fmla="*/ 4639892 w 7537732"/>
-                      <a:gd name="connsiteY22" fmla="*/ 7276596 h 7276596"/>
-                      <a:gd name="connsiteX23" fmla="*/ 3953121 w 7537732"/>
-                      <a:gd name="connsiteY23" fmla="*/ 7276596 h 7276596"/>
-                      <a:gd name="connsiteX24" fmla="*/ 3190973 w 7537732"/>
-                      <a:gd name="connsiteY24" fmla="*/ 7276596 h 7276596"/>
-                      <a:gd name="connsiteX25" fmla="*/ 2579578 w 7537732"/>
-                      <a:gd name="connsiteY25" fmla="*/ 7276596 h 7276596"/>
-                      <a:gd name="connsiteX26" fmla="*/ 1742054 w 7537732"/>
-                      <a:gd name="connsiteY26" fmla="*/ 7276596 h 7276596"/>
-                      <a:gd name="connsiteX27" fmla="*/ 979904 w 7537732"/>
-                      <a:gd name="connsiteY27" fmla="*/ 7276596 h 7276596"/>
-                      <a:gd name="connsiteX28" fmla="*/ 0 w 7537732"/>
-                      <a:gd name="connsiteY28" fmla="*/ 7276596 h 7276596"/>
-                      <a:gd name="connsiteX29" fmla="*/ 0 w 7537732"/>
-                      <a:gd name="connsiteY29" fmla="*/ 6540851 h 7276596"/>
-                      <a:gd name="connsiteX30" fmla="*/ 0 w 7537732"/>
-                      <a:gd name="connsiteY30" fmla="*/ 5877873 h 7276596"/>
-                      <a:gd name="connsiteX31" fmla="*/ 0 w 7537732"/>
-                      <a:gd name="connsiteY31" fmla="*/ 5214893 h 7276596"/>
-                      <a:gd name="connsiteX32" fmla="*/ 0 w 7537732"/>
-                      <a:gd name="connsiteY32" fmla="*/ 4479148 h 7276596"/>
-                      <a:gd name="connsiteX33" fmla="*/ 0 w 7537732"/>
-                      <a:gd name="connsiteY33" fmla="*/ 3670637 h 7276596"/>
-                      <a:gd name="connsiteX34" fmla="*/ 0 w 7537732"/>
-                      <a:gd name="connsiteY34" fmla="*/ 3080425 h 7276596"/>
-                      <a:gd name="connsiteX35" fmla="*/ 0 w 7537732"/>
-                      <a:gd name="connsiteY35" fmla="*/ 2490212 h 7276596"/>
-                      <a:gd name="connsiteX36" fmla="*/ 0 w 7537732"/>
-                      <a:gd name="connsiteY36" fmla="*/ 1536170 h 7276596"/>
-                      <a:gd name="connsiteX37" fmla="*/ 0 w 7537732"/>
-                      <a:gd name="connsiteY37" fmla="*/ 945956 h 7276596"/>
-                      <a:gd name="connsiteX38" fmla="*/ 0 w 7537732"/>
-                      <a:gd name="connsiteY38" fmla="*/ 0 h 7276596"/>
-                    </a:gdLst>
-                    <a:ahLst/>
-                    <a:cxnLst>
-                      <a:cxn ang="0">
-                        <a:pos x="connsiteX0" y="connsiteY0"/>
-                      </a:cxn>
-                      <a:cxn ang="0">
-                        <a:pos x="connsiteX1" y="connsiteY1"/>
-                      </a:cxn>
-                      <a:cxn ang="0">
-                        <a:pos x="connsiteX2" y="connsiteY2"/>
-                      </a:cxn>
-                      <a:cxn ang="0">
-                        <a:pos x="connsiteX3" y="connsiteY3"/>
-                      </a:cxn>
-                      <a:cxn ang="0">
-                        <a:pos x="connsiteX4" y="connsiteY4"/>
-                      </a:cxn>
-                      <a:cxn ang="0">
-                        <a:pos x="connsiteX5" y="connsiteY5"/>
-                      </a:cxn>
-                      <a:cxn ang="0">
-                        <a:pos x="connsiteX6" y="connsiteY6"/>
-                      </a:cxn>
-                      <a:cxn ang="0">
-                        <a:pos x="connsiteX7" y="connsiteY7"/>
-                      </a:cxn>
-                      <a:cxn ang="0">
-                        <a:pos x="connsiteX8" y="connsiteY8"/>
-                      </a:cxn>
-                      <a:cxn ang="0">
-                        <a:pos x="connsiteX9" y="connsiteY9"/>
-                      </a:cxn>
-                      <a:cxn ang="0">
-                        <a:pos x="connsiteX10" y="connsiteY10"/>
-                      </a:cxn>
-                      <a:cxn ang="0">
-                        <a:pos x="connsiteX11" y="connsiteY11"/>
-                      </a:cxn>
-                      <a:cxn ang="0">
-                        <a:pos x="connsiteX12" y="connsiteY12"/>
-                      </a:cxn>
-                      <a:cxn ang="0">
-                        <a:pos x="connsiteX13" y="connsiteY13"/>
-                      </a:cxn>
-                      <a:cxn ang="0">
-                        <a:pos x="connsiteX14" y="connsiteY14"/>
-                      </a:cxn>
-                      <a:cxn ang="0">
-                        <a:pos x="connsiteX15" y="connsiteY15"/>
-                      </a:cxn>
-                      <a:cxn ang="0">
-                        <a:pos x="connsiteX16" y="connsiteY16"/>
-                      </a:cxn>
-                      <a:cxn ang="0">
-                        <a:pos x="connsiteX17" y="connsiteY17"/>
-                      </a:cxn>
-                      <a:cxn ang="0">
-                        <a:pos x="connsiteX18" y="connsiteY18"/>
-                      </a:cxn>
-                      <a:cxn ang="0">
-                        <a:pos x="connsiteX19" y="connsiteY19"/>
-                      </a:cxn>
-                      <a:cxn ang="0">
-                        <a:pos x="connsiteX20" y="connsiteY20"/>
-                      </a:cxn>
-                      <a:cxn ang="0">
-                        <a:pos x="connsiteX21" y="connsiteY21"/>
-                      </a:cxn>
-                      <a:cxn ang="0">
-                        <a:pos x="connsiteX22" y="connsiteY22"/>
-                      </a:cxn>
-                      <a:cxn ang="0">
-                        <a:pos x="connsiteX23" y="connsiteY23"/>
-                      </a:cxn>
-                      <a:cxn ang="0">
-                        <a:pos x="connsiteX24" y="connsiteY24"/>
-                      </a:cxn>
-                      <a:cxn ang="0">
-                        <a:pos x="connsiteX25" y="connsiteY25"/>
-                      </a:cxn>
-                      <a:cxn ang="0">
-                        <a:pos x="connsiteX26" y="connsiteY26"/>
-                      </a:cxn>
-                      <a:cxn ang="0">
-                        <a:pos x="connsiteX27" y="connsiteY27"/>
-                      </a:cxn>
-                      <a:cxn ang="0">
-                        <a:pos x="connsiteX28" y="connsiteY28"/>
-                      </a:cxn>
-                      <a:cxn ang="0">
-                        <a:pos x="connsiteX29" y="connsiteY29"/>
-                      </a:cxn>
-                      <a:cxn ang="0">
-                        <a:pos x="connsiteX30" y="connsiteY30"/>
-                      </a:cxn>
-                      <a:cxn ang="0">
-                        <a:pos x="connsiteX31" y="connsiteY31"/>
-                      </a:cxn>
-                      <a:cxn ang="0">
-                        <a:pos x="connsiteX32" y="connsiteY32"/>
-                      </a:cxn>
-                      <a:cxn ang="0">
-                        <a:pos x="connsiteX33" y="connsiteY33"/>
-                      </a:cxn>
-                      <a:cxn ang="0">
-                        <a:pos x="connsiteX34" y="connsiteY34"/>
-                      </a:cxn>
-                      <a:cxn ang="0">
-                        <a:pos x="connsiteX35" y="connsiteY35"/>
-                      </a:cxn>
-                      <a:cxn ang="0">
-                        <a:pos x="connsiteX36" y="connsiteY36"/>
-                      </a:cxn>
-                      <a:cxn ang="0">
-                        <a:pos x="connsiteX37" y="connsiteY37"/>
-                      </a:cxn>
-                      <a:cxn ang="0">
-                        <a:pos x="connsiteX38" y="connsiteY38"/>
-                      </a:cxn>
-                    </a:cxnLst>
-                    <a:rect l="l" t="t" r="r" b="b"/>
-                    <a:pathLst>
-                      <a:path w="7537732" h="7276596" fill="none" extrusionOk="0">
-                        <a:moveTo>
-                          <a:pt x="0" y="0"/>
-                        </a:moveTo>
-                        <a:cubicBezTo>
-                          <a:pt x="198595" y="-69482"/>
-                          <a:pt x="355267" y="107590"/>
-                          <a:pt x="611394" y="0"/>
-                        </a:cubicBezTo>
-                        <a:cubicBezTo>
-                          <a:pt x="810218" y="812"/>
-                          <a:pt x="1141976" y="87952"/>
-                          <a:pt x="1448919" y="0"/>
-                        </a:cubicBezTo>
-                        <a:cubicBezTo>
-                          <a:pt x="1702839" y="-36721"/>
-                          <a:pt x="2143598" y="132067"/>
-                          <a:pt x="2361822" y="0"/>
-                        </a:cubicBezTo>
-                        <a:cubicBezTo>
-                          <a:pt x="2638183" y="-87782"/>
-                          <a:pt x="3068695" y="41752"/>
-                          <a:pt x="3199349" y="0"/>
-                        </a:cubicBezTo>
-                        <a:cubicBezTo>
-                          <a:pt x="3429988" y="-29362"/>
-                          <a:pt x="3651770" y="77218"/>
-                          <a:pt x="4036873" y="0"/>
-                        </a:cubicBezTo>
-                        <a:cubicBezTo>
-                          <a:pt x="4454266" y="27713"/>
-                          <a:pt x="4673166" y="49165"/>
-                          <a:pt x="5025155" y="0"/>
-                        </a:cubicBezTo>
-                        <a:cubicBezTo>
-                          <a:pt x="5398010" y="-82175"/>
-                          <a:pt x="5346872" y="80187"/>
-                          <a:pt x="5636548" y="0"/>
-                        </a:cubicBezTo>
-                        <a:cubicBezTo>
-                          <a:pt x="5897550" y="-71903"/>
-                          <a:pt x="6134993" y="54559"/>
-                          <a:pt x="6549451" y="0"/>
-                        </a:cubicBezTo>
-                        <a:cubicBezTo>
-                          <a:pt x="6940717" y="-44394"/>
-                          <a:pt x="7123290" y="40027"/>
-                          <a:pt x="7537732" y="0"/>
-                        </a:cubicBezTo>
-                        <a:cubicBezTo>
-                          <a:pt x="7646699" y="287969"/>
-                          <a:pt x="7568052" y="520530"/>
-                          <a:pt x="7537732" y="881277"/>
-                        </a:cubicBezTo>
-                        <a:cubicBezTo>
-                          <a:pt x="7535627" y="1293241"/>
-                          <a:pt x="7527638" y="1273451"/>
-                          <a:pt x="7537732" y="1471489"/>
-                        </a:cubicBezTo>
-                        <a:cubicBezTo>
-                          <a:pt x="7564517" y="1672531"/>
-                          <a:pt x="7415967" y="2102576"/>
-                          <a:pt x="7537732" y="2425531"/>
-                        </a:cubicBezTo>
-                        <a:cubicBezTo>
-                          <a:pt x="7609048" y="2760179"/>
-                          <a:pt x="7505001" y="3087537"/>
-                          <a:pt x="7537732" y="3379575"/>
-                        </a:cubicBezTo>
-                        <a:cubicBezTo>
-                          <a:pt x="7609490" y="3626245"/>
-                          <a:pt x="7495341" y="3863830"/>
-                          <a:pt x="7537732" y="3969787"/>
-                        </a:cubicBezTo>
-                        <a:cubicBezTo>
-                          <a:pt x="7615112" y="4119806"/>
-                          <a:pt x="7462537" y="4356025"/>
-                          <a:pt x="7537732" y="4560000"/>
-                        </a:cubicBezTo>
-                        <a:cubicBezTo>
-                          <a:pt x="7575798" y="4729558"/>
-                          <a:pt x="7522464" y="4930431"/>
-                          <a:pt x="7537732" y="5222978"/>
-                        </a:cubicBezTo>
-                        <a:cubicBezTo>
-                          <a:pt x="7560999" y="5525436"/>
-                          <a:pt x="7523962" y="5551884"/>
-                          <a:pt x="7537732" y="5813192"/>
-                        </a:cubicBezTo>
-                        <a:cubicBezTo>
-                          <a:pt x="7580901" y="6094625"/>
-                          <a:pt x="7517957" y="6247665"/>
-                          <a:pt x="7537732" y="6403404"/>
-                        </a:cubicBezTo>
-                        <a:cubicBezTo>
-                          <a:pt x="7622818" y="6594584"/>
-                          <a:pt x="7547873" y="7011209"/>
-                          <a:pt x="7537732" y="7276596"/>
-                        </a:cubicBezTo>
-                        <a:cubicBezTo>
-                          <a:pt x="7208540" y="7361152"/>
-                          <a:pt x="7130901" y="7252015"/>
-                          <a:pt x="6775583" y="7276596"/>
-                        </a:cubicBezTo>
-                        <a:cubicBezTo>
-                          <a:pt x="6441211" y="7276252"/>
-                          <a:pt x="6340686" y="7237033"/>
-                          <a:pt x="6013435" y="7276596"/>
-                        </a:cubicBezTo>
-                        <a:cubicBezTo>
-                          <a:pt x="5751827" y="7316086"/>
-                          <a:pt x="5581039" y="7274008"/>
-                          <a:pt x="5251286" y="7276596"/>
-                        </a:cubicBezTo>
-                        <a:cubicBezTo>
-                          <a:pt x="5016704" y="7279781"/>
-                          <a:pt x="4553775" y="7240257"/>
-                          <a:pt x="4263006" y="7276596"/>
-                        </a:cubicBezTo>
-                        <a:cubicBezTo>
-                          <a:pt x="4056565" y="7305131"/>
-                          <a:pt x="3513447" y="7316278"/>
-                          <a:pt x="3274725" y="7276596"/>
-                        </a:cubicBezTo>
-                        <a:cubicBezTo>
-                          <a:pt x="3022608" y="7292290"/>
-                          <a:pt x="2797228" y="7230476"/>
-                          <a:pt x="2361822" y="7276596"/>
-                        </a:cubicBezTo>
-                        <a:cubicBezTo>
-                          <a:pt x="1923595" y="7326753"/>
-                          <a:pt x="1913974" y="7231157"/>
-                          <a:pt x="1599674" y="7276596"/>
-                        </a:cubicBezTo>
-                        <a:cubicBezTo>
-                          <a:pt x="1329727" y="7359088"/>
-                          <a:pt x="1194961" y="7218041"/>
-                          <a:pt x="988280" y="7276596"/>
-                        </a:cubicBezTo>
-                        <a:cubicBezTo>
-                          <a:pt x="800901" y="7335652"/>
-                          <a:pt x="234772" y="7200244"/>
-                          <a:pt x="0" y="7276596"/>
-                        </a:cubicBezTo>
-                        <a:cubicBezTo>
-                          <a:pt x="11802" y="7027365"/>
-                          <a:pt x="-24337" y="6853890"/>
-                          <a:pt x="0" y="6540851"/>
-                        </a:cubicBezTo>
-                        <a:cubicBezTo>
-                          <a:pt x="-16963" y="6243433"/>
-                          <a:pt x="61953" y="6021735"/>
-                          <a:pt x="0" y="5732340"/>
-                        </a:cubicBezTo>
-                        <a:cubicBezTo>
-                          <a:pt x="-91735" y="5389588"/>
-                          <a:pt x="15446" y="5332269"/>
-                          <a:pt x="0" y="4996595"/>
-                        </a:cubicBezTo>
-                        <a:cubicBezTo>
-                          <a:pt x="2642" y="4668005"/>
-                          <a:pt x="45467" y="4453138"/>
-                          <a:pt x="0" y="4188084"/>
-                        </a:cubicBezTo>
-                        <a:cubicBezTo>
-                          <a:pt x="-52239" y="3886395"/>
-                          <a:pt x="88210" y="3668828"/>
-                          <a:pt x="0" y="3379575"/>
-                        </a:cubicBezTo>
-                        <a:cubicBezTo>
-                          <a:pt x="-78660" y="3070752"/>
-                          <a:pt x="25262" y="2704725"/>
-                          <a:pt x="0" y="2498297"/>
-                        </a:cubicBezTo>
-                        <a:cubicBezTo>
-                          <a:pt x="-1282" y="2298158"/>
-                          <a:pt x="33597" y="1962767"/>
-                          <a:pt x="0" y="1689786"/>
-                        </a:cubicBezTo>
-                        <a:cubicBezTo>
-                          <a:pt x="-66657" y="1463940"/>
-                          <a:pt x="38670" y="1234266"/>
-                          <a:pt x="0" y="881277"/>
-                        </a:cubicBezTo>
-                        <a:cubicBezTo>
-                          <a:pt x="-58626" y="441678"/>
-                          <a:pt x="130449" y="378185"/>
-                          <a:pt x="0" y="0"/>
-                        </a:cubicBezTo>
-                        <a:close/>
-                      </a:path>
-                      <a:path w="7537732" h="7276596" stroke="0" extrusionOk="0">
-                        <a:moveTo>
-                          <a:pt x="0" y="0"/>
-                        </a:moveTo>
-                        <a:cubicBezTo>
-                          <a:pt x="184487" y="-1076"/>
-                          <a:pt x="776845" y="64668"/>
-                          <a:pt x="988280" y="0"/>
-                        </a:cubicBezTo>
-                        <a:cubicBezTo>
-                          <a:pt x="1236527" y="28187"/>
-                          <a:pt x="1599268" y="7225"/>
-                          <a:pt x="1825806" y="0"/>
-                        </a:cubicBezTo>
-                        <a:cubicBezTo>
-                          <a:pt x="2168500" y="25817"/>
-                          <a:pt x="2394828" y="127378"/>
-                          <a:pt x="2738710" y="0"/>
-                        </a:cubicBezTo>
-                        <a:cubicBezTo>
-                          <a:pt x="3054375" y="-132454"/>
-                          <a:pt x="3157967" y="26042"/>
-                          <a:pt x="3576234" y="0"/>
-                        </a:cubicBezTo>
-                        <a:cubicBezTo>
-                          <a:pt x="3977597" y="-30621"/>
-                          <a:pt x="4051682" y="3155"/>
-                          <a:pt x="4187629" y="0"/>
-                        </a:cubicBezTo>
-                        <a:cubicBezTo>
-                          <a:pt x="4292194" y="-28750"/>
-                          <a:pt x="4727523" y="-1831"/>
-                          <a:pt x="4874399" y="0"/>
-                        </a:cubicBezTo>
-                        <a:cubicBezTo>
-                          <a:pt x="5038178" y="-34787"/>
-                          <a:pt x="5435580" y="62304"/>
-                          <a:pt x="5636548" y="0"/>
-                        </a:cubicBezTo>
-                        <a:cubicBezTo>
-                          <a:pt x="5853150" y="-93889"/>
-                          <a:pt x="6195768" y="28727"/>
-                          <a:pt x="6624828" y="0"/>
-                        </a:cubicBezTo>
-                        <a:cubicBezTo>
-                          <a:pt x="7005314" y="-114474"/>
-                          <a:pt x="7174801" y="43014"/>
-                          <a:pt x="7537732" y="0"/>
-                        </a:cubicBezTo>
-                        <a:cubicBezTo>
-                          <a:pt x="7652134" y="297575"/>
-                          <a:pt x="7540386" y="540679"/>
-                          <a:pt x="7537732" y="954042"/>
-                        </a:cubicBezTo>
-                        <a:cubicBezTo>
-                          <a:pt x="7562303" y="1342338"/>
-                          <a:pt x="7457167" y="1557950"/>
-                          <a:pt x="7537732" y="1762553"/>
-                        </a:cubicBezTo>
-                        <a:cubicBezTo>
-                          <a:pt x="7572055" y="1914866"/>
-                          <a:pt x="7493106" y="2116910"/>
-                          <a:pt x="7537732" y="2425531"/>
-                        </a:cubicBezTo>
-                        <a:cubicBezTo>
-                          <a:pt x="7585292" y="2658959"/>
-                          <a:pt x="7485079" y="2967120"/>
-                          <a:pt x="7537732" y="3234042"/>
-                        </a:cubicBezTo>
-                        <a:cubicBezTo>
-                          <a:pt x="7599251" y="3535786"/>
-                          <a:pt x="7461401" y="3675368"/>
-                          <a:pt x="7537732" y="4042553"/>
-                        </a:cubicBezTo>
-                        <a:cubicBezTo>
-                          <a:pt x="7605569" y="4397070"/>
-                          <a:pt x="7450567" y="4488803"/>
-                          <a:pt x="7537732" y="4632765"/>
-                        </a:cubicBezTo>
-                        <a:cubicBezTo>
-                          <a:pt x="7645572" y="4794268"/>
-                          <a:pt x="7394520" y="5356563"/>
-                          <a:pt x="7537732" y="5586809"/>
-                        </a:cubicBezTo>
-                        <a:cubicBezTo>
-                          <a:pt x="7659805" y="5824472"/>
-                          <a:pt x="7485748" y="6041372"/>
-                          <a:pt x="7537732" y="6177021"/>
-                        </a:cubicBezTo>
-                        <a:cubicBezTo>
-                          <a:pt x="7639977" y="6387288"/>
-                          <a:pt x="7343169" y="6846234"/>
-                          <a:pt x="7537732" y="7276596"/>
-                        </a:cubicBezTo>
-                        <a:cubicBezTo>
-                          <a:pt x="7345627" y="7343341"/>
-                          <a:pt x="7070529" y="7205969"/>
-                          <a:pt x="6926337" y="7276596"/>
-                        </a:cubicBezTo>
-                        <a:cubicBezTo>
-                          <a:pt x="6778320" y="7313007"/>
-                          <a:pt x="6461043" y="7197180"/>
-                          <a:pt x="6239566" y="7276596"/>
-                        </a:cubicBezTo>
-                        <a:cubicBezTo>
-                          <a:pt x="5993614" y="7298224"/>
-                          <a:pt x="5745253" y="7203628"/>
-                          <a:pt x="5326664" y="7276596"/>
-                        </a:cubicBezTo>
-                        <a:cubicBezTo>
-                          <a:pt x="4889423" y="7307053"/>
-                          <a:pt x="4826913" y="7255553"/>
-                          <a:pt x="4639892" y="7276596"/>
-                        </a:cubicBezTo>
-                        <a:cubicBezTo>
-                          <a:pt x="4448436" y="7345542"/>
-                          <a:pt x="4156419" y="7244414"/>
-                          <a:pt x="3953121" y="7276596"/>
-                        </a:cubicBezTo>
-                        <a:cubicBezTo>
-                          <a:pt x="3814799" y="7354569"/>
-                          <a:pt x="3590213" y="7183519"/>
-                          <a:pt x="3190973" y="7276596"/>
-                        </a:cubicBezTo>
-                        <a:cubicBezTo>
-                          <a:pt x="2821632" y="7320883"/>
-                          <a:pt x="2862069" y="7229297"/>
-                          <a:pt x="2579578" y="7276596"/>
-                        </a:cubicBezTo>
-                        <a:cubicBezTo>
-                          <a:pt x="2299170" y="7306100"/>
-                          <a:pt x="1985259" y="7303752"/>
-                          <a:pt x="1742054" y="7276596"/>
-                        </a:cubicBezTo>
-                        <a:cubicBezTo>
-                          <a:pt x="1516421" y="7303344"/>
-                          <a:pt x="1212735" y="7251917"/>
-                          <a:pt x="979904" y="7276596"/>
-                        </a:cubicBezTo>
-                        <a:cubicBezTo>
-                          <a:pt x="741880" y="7321065"/>
-                          <a:pt x="267350" y="7257090"/>
-                          <a:pt x="0" y="7276596"/>
-                        </a:cubicBezTo>
-                        <a:cubicBezTo>
-                          <a:pt x="-94409" y="6931212"/>
-                          <a:pt x="-5773" y="6876825"/>
-                          <a:pt x="0" y="6540851"/>
-                        </a:cubicBezTo>
-                        <a:cubicBezTo>
-                          <a:pt x="-15739" y="6249423"/>
-                          <a:pt x="28445" y="6175820"/>
-                          <a:pt x="0" y="5877873"/>
-                        </a:cubicBezTo>
-                        <a:cubicBezTo>
-                          <a:pt x="9878" y="5570570"/>
-                          <a:pt x="43454" y="5486001"/>
-                          <a:pt x="0" y="5214893"/>
-                        </a:cubicBezTo>
-                        <a:cubicBezTo>
-                          <a:pt x="-46806" y="4949465"/>
-                          <a:pt x="30776" y="4678447"/>
-                          <a:pt x="0" y="4479148"/>
-                        </a:cubicBezTo>
-                        <a:cubicBezTo>
-                          <a:pt x="-17301" y="4314398"/>
-                          <a:pt x="99461" y="3972514"/>
-                          <a:pt x="0" y="3670637"/>
-                        </a:cubicBezTo>
-                        <a:cubicBezTo>
-                          <a:pt x="-11838" y="3342599"/>
-                          <a:pt x="10211" y="3356678"/>
-                          <a:pt x="0" y="3080425"/>
-                        </a:cubicBezTo>
-                        <a:cubicBezTo>
-                          <a:pt x="-23309" y="2808370"/>
-                          <a:pt x="73677" y="2775958"/>
-                          <a:pt x="0" y="2490212"/>
-                        </a:cubicBezTo>
-                        <a:cubicBezTo>
-                          <a:pt x="-40220" y="2193221"/>
-                          <a:pt x="30559" y="1840442"/>
-                          <a:pt x="0" y="1536170"/>
-                        </a:cubicBezTo>
-                        <a:cubicBezTo>
-                          <a:pt x="-59280" y="1232733"/>
-                          <a:pt x="6886" y="1149696"/>
-                          <a:pt x="0" y="945956"/>
-                        </a:cubicBezTo>
-                        <a:cubicBezTo>
-                          <a:pt x="-18151" y="754666"/>
-                          <a:pt x="53639" y="280963"/>
-                          <a:pt x="0" y="0"/>
-                        </a:cubicBezTo>
-                        <a:close/>
-                      </a:path>
-                      <a:path w="7537732" h="7276596" fill="none" stroke="0" extrusionOk="0">
-                        <a:moveTo>
-                          <a:pt x="0" y="0"/>
-                        </a:moveTo>
-                        <a:cubicBezTo>
-                          <a:pt x="217706" y="-27869"/>
-                          <a:pt x="399041" y="60611"/>
-                          <a:pt x="611394" y="0"/>
-                        </a:cubicBezTo>
-                        <a:cubicBezTo>
-                          <a:pt x="805504" y="-39035"/>
-                          <a:pt x="1158165" y="71395"/>
-                          <a:pt x="1448919" y="0"/>
-                        </a:cubicBezTo>
-                        <a:cubicBezTo>
-                          <a:pt x="1799708" y="-63144"/>
-                          <a:pt x="2185918" y="73974"/>
-                          <a:pt x="2361822" y="0"/>
-                        </a:cubicBezTo>
-                        <a:cubicBezTo>
-                          <a:pt x="2612709" y="-98814"/>
-                          <a:pt x="2981326" y="40231"/>
-                          <a:pt x="3199349" y="0"/>
-                        </a:cubicBezTo>
-                        <a:cubicBezTo>
-                          <a:pt x="3359942" y="-63265"/>
-                          <a:pt x="3626893" y="12023"/>
-                          <a:pt x="4036873" y="0"/>
-                        </a:cubicBezTo>
-                        <a:cubicBezTo>
-                          <a:pt x="4407157" y="-21718"/>
-                          <a:pt x="4653811" y="7860"/>
-                          <a:pt x="5025155" y="0"/>
-                        </a:cubicBezTo>
-                        <a:cubicBezTo>
-                          <a:pt x="5449027" y="-46352"/>
-                          <a:pt x="5360499" y="86190"/>
-                          <a:pt x="5636548" y="0"/>
-                        </a:cubicBezTo>
-                        <a:cubicBezTo>
-                          <a:pt x="5925007" y="-5072"/>
-                          <a:pt x="6111865" y="49779"/>
-                          <a:pt x="6549451" y="0"/>
-                        </a:cubicBezTo>
-                        <a:cubicBezTo>
-                          <a:pt x="6962548" y="-37140"/>
-                          <a:pt x="7104795" y="-3872"/>
-                          <a:pt x="7537732" y="0"/>
-                        </a:cubicBezTo>
-                        <a:cubicBezTo>
-                          <a:pt x="7600992" y="193470"/>
-                          <a:pt x="7569202" y="461880"/>
-                          <a:pt x="7537732" y="881277"/>
-                        </a:cubicBezTo>
-                        <a:cubicBezTo>
-                          <a:pt x="7537235" y="1295330"/>
-                          <a:pt x="7529163" y="1268880"/>
-                          <a:pt x="7537732" y="1471489"/>
-                        </a:cubicBezTo>
-                        <a:cubicBezTo>
-                          <a:pt x="7495838" y="1713473"/>
-                          <a:pt x="7450275" y="2129657"/>
-                          <a:pt x="7537732" y="2425531"/>
-                        </a:cubicBezTo>
-                        <a:cubicBezTo>
-                          <a:pt x="7648915" y="2716174"/>
-                          <a:pt x="7452764" y="3178531"/>
-                          <a:pt x="7537732" y="3379575"/>
-                        </a:cubicBezTo>
-                        <a:cubicBezTo>
-                          <a:pt x="7617304" y="3635577"/>
-                          <a:pt x="7516719" y="3840560"/>
-                          <a:pt x="7537732" y="3969787"/>
-                        </a:cubicBezTo>
-                        <a:cubicBezTo>
-                          <a:pt x="7536042" y="4131246"/>
-                          <a:pt x="7479113" y="4336935"/>
-                          <a:pt x="7537732" y="4560000"/>
-                        </a:cubicBezTo>
-                        <a:cubicBezTo>
-                          <a:pt x="7566725" y="4807943"/>
-                          <a:pt x="7540857" y="4949164"/>
-                          <a:pt x="7537732" y="5222978"/>
-                        </a:cubicBezTo>
-                        <a:cubicBezTo>
-                          <a:pt x="7577418" y="5529787"/>
-                          <a:pt x="7512351" y="5542231"/>
-                          <a:pt x="7537732" y="5813192"/>
-                        </a:cubicBezTo>
-                        <a:cubicBezTo>
-                          <a:pt x="7600340" y="6055576"/>
-                          <a:pt x="7503128" y="6173067"/>
-                          <a:pt x="7537732" y="6403404"/>
-                        </a:cubicBezTo>
-                        <a:cubicBezTo>
-                          <a:pt x="7552104" y="6646149"/>
-                          <a:pt x="7569993" y="6936155"/>
-                          <a:pt x="7537732" y="7276596"/>
-                        </a:cubicBezTo>
-                        <a:cubicBezTo>
-                          <a:pt x="7219494" y="7343518"/>
-                          <a:pt x="7138541" y="7277549"/>
-                          <a:pt x="6775583" y="7276596"/>
-                        </a:cubicBezTo>
-                        <a:cubicBezTo>
-                          <a:pt x="6415775" y="7288739"/>
-                          <a:pt x="6289854" y="7204845"/>
-                          <a:pt x="6013435" y="7276596"/>
-                        </a:cubicBezTo>
-                        <a:cubicBezTo>
-                          <a:pt x="5704887" y="7342859"/>
-                          <a:pt x="5517895" y="7293952"/>
-                          <a:pt x="5251286" y="7276596"/>
-                        </a:cubicBezTo>
-                        <a:cubicBezTo>
-                          <a:pt x="4937933" y="7347605"/>
-                          <a:pt x="4518133" y="7147216"/>
-                          <a:pt x="4263006" y="7276596"/>
-                        </a:cubicBezTo>
-                        <a:cubicBezTo>
-                          <a:pt x="4047500" y="7392270"/>
-                          <a:pt x="3534989" y="7260462"/>
-                          <a:pt x="3274725" y="7276596"/>
-                        </a:cubicBezTo>
-                        <a:cubicBezTo>
-                          <a:pt x="3031015" y="7273340"/>
-                          <a:pt x="2866965" y="7198735"/>
-                          <a:pt x="2361822" y="7276596"/>
-                        </a:cubicBezTo>
-                        <a:cubicBezTo>
-                          <a:pt x="1867294" y="7363743"/>
-                          <a:pt x="1894177" y="7204895"/>
-                          <a:pt x="1599674" y="7276596"/>
-                        </a:cubicBezTo>
-                        <a:cubicBezTo>
-                          <a:pt x="1282454" y="7342583"/>
-                          <a:pt x="1188449" y="7222729"/>
-                          <a:pt x="988280" y="7276596"/>
-                        </a:cubicBezTo>
-                        <a:cubicBezTo>
-                          <a:pt x="825000" y="7276053"/>
-                          <a:pt x="252094" y="7277074"/>
-                          <a:pt x="0" y="7276596"/>
-                        </a:cubicBezTo>
-                        <a:cubicBezTo>
-                          <a:pt x="-41714" y="7012938"/>
-                          <a:pt x="18983" y="6811809"/>
-                          <a:pt x="0" y="6540851"/>
-                        </a:cubicBezTo>
-                        <a:cubicBezTo>
-                          <a:pt x="14517" y="6232456"/>
-                          <a:pt x="99893" y="6100125"/>
-                          <a:pt x="0" y="5732340"/>
-                        </a:cubicBezTo>
-                        <a:cubicBezTo>
-                          <a:pt x="-67675" y="5396431"/>
-                          <a:pt x="34531" y="5341277"/>
-                          <a:pt x="0" y="4996595"/>
-                        </a:cubicBezTo>
-                        <a:cubicBezTo>
-                          <a:pt x="-8295" y="4671642"/>
-                          <a:pt x="54068" y="4362381"/>
-                          <a:pt x="0" y="4188084"/>
-                        </a:cubicBezTo>
-                        <a:cubicBezTo>
-                          <a:pt x="-3474" y="3906036"/>
-                          <a:pt x="-14620" y="3733132"/>
-                          <a:pt x="0" y="3379575"/>
-                        </a:cubicBezTo>
-                        <a:cubicBezTo>
-                          <a:pt x="-27055" y="3096717"/>
-                          <a:pt x="-16294" y="2687777"/>
-                          <a:pt x="0" y="2498297"/>
-                        </a:cubicBezTo>
-                        <a:cubicBezTo>
-                          <a:pt x="32055" y="2328020"/>
-                          <a:pt x="24166" y="1876415"/>
-                          <a:pt x="0" y="1689786"/>
-                        </a:cubicBezTo>
-                        <a:cubicBezTo>
-                          <a:pt x="-7692" y="1428046"/>
-                          <a:pt x="51945" y="1229351"/>
-                          <a:pt x="0" y="881277"/>
-                        </a:cubicBezTo>
-                        <a:cubicBezTo>
-                          <a:pt x="-50986" y="477256"/>
-                          <a:pt x="98686" y="320268"/>
-                          <a:pt x="0" y="0"/>
-                        </a:cubicBezTo>
-                        <a:close/>
-                      </a:path>
-                    </a:pathLst>
-                  </a:custGeom>
-                  <ask:type>
-                    <ask:lineSketchScribble/>
-                  </ask:type>
-                </ask:lineSketchStyleProps>
-              </a:ext>
-            </a:extLst>
           </a:ln>
         </p:spPr>
       </p:pic>
       <p:pic>
         <p:nvPicPr>
-          <p:cNvPr id="14" name="Picture 13">
-            <a:extLst>
-              <a:ext uri="{FF2B5EF4-FFF2-40B4-BE49-F238E27FC236}">
-                <a16:creationId xmlns:a16="http://schemas.microsoft.com/office/drawing/2014/main" id="{6346425E-3133-4A44-55C4-D0799B06532E}"/>
-              </a:ext>
-            </a:extLst>
-          </p:cNvPr>
+          <p:cNvPr id="14" name="Picture 13"/>
           <p:cNvPicPr>
             <a:picLocks noChangeAspect="1"/>
           </p:cNvPicPr>
           <p:nvPr/>
         </p:nvPicPr>
         <p:blipFill>
-          <a:blip r:embed="rId5">
+          <a:blip r:embed="rId4">
             <a:extLst>
               <a:ext uri="{28A0092B-C50C-407E-A947-70E740481C1C}">
                 <a14:useLocalDpi xmlns:a14="http://schemas.microsoft.com/office/drawing/2010/main" val="0"/>
@@ -7532,11 +5695,6 @@
         </p:spPr>
       </p:pic>
     </p:spTree>
-    <p:extLst>
-      <p:ext uri="{BB962C8B-B14F-4D97-AF65-F5344CB8AC3E}">
-        <p14:creationId xmlns:p14="http://schemas.microsoft.com/office/powerpoint/2010/main" val="160482399"/>
-      </p:ext>
-    </p:extLst>
   </p:cSld>
   <p:clrMapOvr>
     <a:masterClrMapping/>
@@ -7570,14 +5728,14 @@
           <p:nvPr/>
         </p:nvPicPr>
         <p:blipFill>
-          <a:blip r:embed="rId2">
+          <a:blip r:embed="rId1">
             <a:alphaModFix amt="6000"/>
             <a:extLst>
               <a:ext uri="{28A0092B-C50C-407E-A947-70E740481C1C}">
                 <a14:useLocalDpi xmlns:a14="http://schemas.microsoft.com/office/drawing/2010/main" val="0"/>
               </a:ext>
               <a:ext uri="{96DAC541-7B7A-43D3-8B79-37D633B846F1}">
-                <asvg:svgBlip xmlns:asvg="http://schemas.microsoft.com/office/drawing/2016/SVG/main" r:embed="rId3"/>
+                <asvg:svgBlip xmlns:asvg="http://schemas.microsoft.com/office/drawing/2016/SVG/main" r:embed="rId2"/>
               </a:ext>
             </a:extLst>
           </a:blip>
@@ -7605,14 +5763,14 @@
           <p:nvPr/>
         </p:nvPicPr>
         <p:blipFill>
-          <a:blip r:embed="rId2" cstate="print">
+          <a:blip r:embed="rId1" cstate="print">
             <a:alphaModFix amt="6000"/>
             <a:extLst>
               <a:ext uri="{28A0092B-C50C-407E-A947-70E740481C1C}">
                 <a14:useLocalDpi xmlns:a14="http://schemas.microsoft.com/office/drawing/2010/main" val="0"/>
               </a:ext>
               <a:ext uri="{96DAC541-7B7A-43D3-8B79-37D633B846F1}">
-                <asvg:svgBlip xmlns:asvg="http://schemas.microsoft.com/office/drawing/2016/SVG/main" r:embed="rId3"/>
+                <asvg:svgBlip xmlns:asvg="http://schemas.microsoft.com/office/drawing/2016/SVG/main" r:embed="rId2"/>
               </a:ext>
             </a:extLst>
           </a:blip>
@@ -7908,13 +6066,7 @@
       </p:grpSp>
       <p:sp>
         <p:nvSpPr>
-          <p:cNvPr id="16" name="TextBox 15">
-            <a:extLst>
-              <a:ext uri="{FF2B5EF4-FFF2-40B4-BE49-F238E27FC236}">
-                <a16:creationId xmlns:a16="http://schemas.microsoft.com/office/drawing/2014/main" id="{07F97D94-3FF9-950A-FFE1-A267F491BF58}"/>
-              </a:ext>
-            </a:extLst>
-          </p:cNvPr>
+          <p:cNvPr id="16" name="TextBox 15"/>
           <p:cNvSpPr txBox="1"/>
           <p:nvPr/>
         </p:nvSpPr>
@@ -7944,20 +6096,14 @@
       </p:sp>
       <p:pic>
         <p:nvPicPr>
-          <p:cNvPr id="14" name="Picture 13">
-            <a:extLst>
-              <a:ext uri="{FF2B5EF4-FFF2-40B4-BE49-F238E27FC236}">
-                <a16:creationId xmlns:a16="http://schemas.microsoft.com/office/drawing/2014/main" id="{094E265E-AA0F-ACFA-D851-6AD8B351DDCB}"/>
-              </a:ext>
-            </a:extLst>
-          </p:cNvPr>
+          <p:cNvPr id="14" name="Picture 13"/>
           <p:cNvPicPr>
             <a:picLocks noChangeAspect="1"/>
           </p:cNvPicPr>
           <p:nvPr/>
         </p:nvPicPr>
         <p:blipFill>
-          <a:blip r:embed="rId4">
+          <a:blip r:embed="rId3">
             <a:extLst>
               <a:ext uri="{28A0092B-C50C-407E-A947-70E740481C1C}">
                 <a14:useLocalDpi xmlns:a14="http://schemas.microsoft.com/office/drawing/2010/main" val="0"/>
@@ -7980,20 +6126,14 @@
       </p:pic>
       <p:sp>
         <p:nvSpPr>
-          <p:cNvPr id="15" name="TextBox 14">
-            <a:extLst>
-              <a:ext uri="{FF2B5EF4-FFF2-40B4-BE49-F238E27FC236}">
-                <a16:creationId xmlns:a16="http://schemas.microsoft.com/office/drawing/2014/main" id="{1ACBC4FA-173F-AB44-EE38-D4DCA5B1E517}"/>
-              </a:ext>
-            </a:extLst>
-          </p:cNvPr>
+          <p:cNvPr id="15" name="TextBox 14"/>
           <p:cNvSpPr txBox="1"/>
           <p:nvPr/>
         </p:nvSpPr>
         <p:spPr>
           <a:xfrm>
             <a:off x="1028700" y="2163626"/>
-            <a:ext cx="15482659" cy="5632311"/>
+            <a:ext cx="15482659" cy="5631180"/>
           </a:xfrm>
           <a:prstGeom prst="rect">
             <a:avLst/>
@@ -8014,6 +6154,7 @@
               <a:rPr lang="en-US" sz="4000" dirty="0"/>
               <a:t>It is  a open-source solution.</a:t>
             </a:r>
+            <a:endParaRPr lang="en-US" sz="4000" dirty="0"/>
           </a:p>
           <a:p>
             <a:pPr marL="514350" indent="-514350">
@@ -8028,6 +6169,11 @@
               </a:rPr>
               <a:t>Git is a version control system that lets you manage and keep track of your source code history. </a:t>
             </a:r>
+            <a:endParaRPr lang="en-US" sz="4000" dirty="0">
+              <a:solidFill>
+                <a:srgbClr val="202124"/>
+              </a:solidFill>
+            </a:endParaRPr>
           </a:p>
           <a:p>
             <a:pPr marL="514350" indent="-514350">
@@ -8043,9 +6189,10 @@
               <a:t>GitHub is a cloud-based hosting service that lets you manage Git repositories</a:t>
             </a:r>
             <a:r>
-              <a:rPr lang="en-US" sz="4000" dirty="0"/>
-              <a:t> </a:t>
-            </a:r>
+              <a:rPr lang="en-IN" altLang="en-US" sz="4000" dirty="0"/>
+              <a:t>.</a:t>
+            </a:r>
+            <a:endParaRPr lang="en-US" sz="4000" dirty="0"/>
           </a:p>
           <a:p>
             <a:pPr marL="514350" indent="-514350">
@@ -8065,11 +6212,6 @@
         </p:txBody>
       </p:sp>
     </p:spTree>
-    <p:extLst>
-      <p:ext uri="{BB962C8B-B14F-4D97-AF65-F5344CB8AC3E}">
-        <p14:creationId xmlns:p14="http://schemas.microsoft.com/office/powerpoint/2010/main" val="198137797"/>
-      </p:ext>
-    </p:extLst>
   </p:cSld>
   <p:clrMapOvr>
     <a:masterClrMapping/>
@@ -8078,670 +6220,6 @@
 </file>
 
 <file path=ppt/slides/slide4.xml><?xml version="1.0" encoding="utf-8"?>
-<p:sld xmlns:a="http://schemas.openxmlformats.org/drawingml/2006/main" xmlns:r="http://schemas.openxmlformats.org/officeDocument/2006/relationships" xmlns:p="http://schemas.openxmlformats.org/presentationml/2006/main">
-  <p:cSld>
-    <p:spTree>
-      <p:nvGrpSpPr>
-        <p:cNvPr id="1" name="">
-          <a:extLst>
-            <a:ext uri="{FF2B5EF4-FFF2-40B4-BE49-F238E27FC236}">
-              <a16:creationId xmlns:a16="http://schemas.microsoft.com/office/drawing/2014/main" id="{79C56555-99C7-CAF7-E2A4-41065E1D3255}"/>
-            </a:ext>
-          </a:extLst>
-        </p:cNvPr>
-        <p:cNvGrpSpPr/>
-        <p:nvPr/>
-      </p:nvGrpSpPr>
-      <p:grpSpPr>
-        <a:xfrm>
-          <a:off x="0" y="0"/>
-          <a:ext cx="0" cy="0"/>
-          <a:chOff x="0" y="0"/>
-          <a:chExt cx="0" cy="0"/>
-        </a:xfrm>
-      </p:grpSpPr>
-      <p:pic>
-        <p:nvPicPr>
-          <p:cNvPr id="2" name="Picture 2">
-            <a:extLst>
-              <a:ext uri="{FF2B5EF4-FFF2-40B4-BE49-F238E27FC236}">
-                <a16:creationId xmlns:a16="http://schemas.microsoft.com/office/drawing/2014/main" id="{E48201FD-4A3A-C580-4984-93D256DE563A}"/>
-              </a:ext>
-            </a:extLst>
-          </p:cNvPr>
-          <p:cNvPicPr>
-            <a:picLocks noChangeAspect="1"/>
-          </p:cNvPicPr>
-          <p:nvPr/>
-        </p:nvPicPr>
-        <p:blipFill>
-          <a:blip r:embed="rId2">
-            <a:alphaModFix amt="6000"/>
-            <a:extLst>
-              <a:ext uri="{28A0092B-C50C-407E-A947-70E740481C1C}">
-                <a14:useLocalDpi xmlns:a14="http://schemas.microsoft.com/office/drawing/2010/main" val="0"/>
-              </a:ext>
-              <a:ext uri="{96DAC541-7B7A-43D3-8B79-37D633B846F1}">
-                <asvg:svgBlip xmlns:asvg="http://schemas.microsoft.com/office/drawing/2016/SVG/main" r:embed="rId3"/>
-              </a:ext>
-            </a:extLst>
-          </a:blip>
-          <a:srcRect/>
-          <a:stretch>
-            <a:fillRect/>
-          </a:stretch>
-        </p:blipFill>
-        <p:spPr>
-          <a:xfrm flipH="1">
-            <a:off x="-19630" y="0"/>
-            <a:ext cx="2327622" cy="2327622"/>
-          </a:xfrm>
-          <a:prstGeom prst="rect">
-            <a:avLst/>
-          </a:prstGeom>
-        </p:spPr>
-      </p:pic>
-      <p:pic>
-        <p:nvPicPr>
-          <p:cNvPr id="3" name="Picture 3">
-            <a:extLst>
-              <a:ext uri="{FF2B5EF4-FFF2-40B4-BE49-F238E27FC236}">
-                <a16:creationId xmlns:a16="http://schemas.microsoft.com/office/drawing/2014/main" id="{A15DC0E0-1FF7-C477-0061-F005B65EFADE}"/>
-              </a:ext>
-            </a:extLst>
-          </p:cNvPr>
-          <p:cNvPicPr>
-            <a:picLocks noChangeAspect="1"/>
-          </p:cNvPicPr>
-          <p:nvPr/>
-        </p:nvPicPr>
-        <p:blipFill>
-          <a:blip r:embed="rId2" cstate="print">
-            <a:alphaModFix amt="6000"/>
-            <a:extLst>
-              <a:ext uri="{28A0092B-C50C-407E-A947-70E740481C1C}">
-                <a14:useLocalDpi xmlns:a14="http://schemas.microsoft.com/office/drawing/2010/main" val="0"/>
-              </a:ext>
-              <a:ext uri="{96DAC541-7B7A-43D3-8B79-37D633B846F1}">
-                <asvg:svgBlip xmlns:asvg="http://schemas.microsoft.com/office/drawing/2016/SVG/main" r:embed="rId3"/>
-              </a:ext>
-            </a:extLst>
-          </a:blip>
-          <a:srcRect/>
-          <a:stretch>
-            <a:fillRect/>
-          </a:stretch>
-        </p:blipFill>
-        <p:spPr>
-          <a:xfrm flipH="1">
-            <a:off x="16145912" y="8144912"/>
-            <a:ext cx="2142088" cy="2142088"/>
-          </a:xfrm>
-          <a:prstGeom prst="rect">
-            <a:avLst/>
-          </a:prstGeom>
-        </p:spPr>
-      </p:pic>
-      <p:grpSp>
-        <p:nvGrpSpPr>
-          <p:cNvPr id="4" name="Group 4">
-            <a:extLst>
-              <a:ext uri="{FF2B5EF4-FFF2-40B4-BE49-F238E27FC236}">
-                <a16:creationId xmlns:a16="http://schemas.microsoft.com/office/drawing/2014/main" id="{B30EF3E8-553D-2813-1A22-FCB59097BCEA}"/>
-              </a:ext>
-            </a:extLst>
-          </p:cNvPr>
-          <p:cNvGrpSpPr/>
-          <p:nvPr/>
-        </p:nvGrpSpPr>
-        <p:grpSpPr>
-          <a:xfrm>
-            <a:off x="17503442" y="0"/>
-            <a:ext cx="784558" cy="1829535"/>
-            <a:chOff x="0" y="0"/>
-            <a:chExt cx="286209" cy="667420"/>
-          </a:xfrm>
-        </p:grpSpPr>
-        <p:sp>
-          <p:nvSpPr>
-            <p:cNvPr id="5" name="Freeform 5">
-              <a:extLst>
-                <a:ext uri="{FF2B5EF4-FFF2-40B4-BE49-F238E27FC236}">
-                  <a16:creationId xmlns:a16="http://schemas.microsoft.com/office/drawing/2014/main" id="{BFE1BE85-4DE1-4B58-0132-594CF02C921D}"/>
-                </a:ext>
-              </a:extLst>
-            </p:cNvPr>
-            <p:cNvSpPr/>
-            <p:nvPr/>
-          </p:nvSpPr>
-          <p:spPr>
-            <a:xfrm>
-              <a:off x="0" y="0"/>
-              <a:ext cx="286209" cy="667419"/>
-            </a:xfrm>
-            <a:custGeom>
-              <a:avLst/>
-              <a:gdLst/>
-              <a:ahLst/>
-              <a:cxnLst/>
-              <a:rect l="l" t="t" r="r" b="b"/>
-              <a:pathLst>
-                <a:path w="286209" h="667419">
-                  <a:moveTo>
-                    <a:pt x="0" y="0"/>
-                  </a:moveTo>
-                  <a:lnTo>
-                    <a:pt x="286209" y="0"/>
-                  </a:lnTo>
-                  <a:lnTo>
-                    <a:pt x="286209" y="667419"/>
-                  </a:lnTo>
-                  <a:lnTo>
-                    <a:pt x="0" y="667419"/>
-                  </a:lnTo>
-                  <a:close/>
-                </a:path>
-              </a:pathLst>
-            </a:custGeom>
-            <a:solidFill>
-              <a:srgbClr val="FF9D8F"/>
-            </a:solidFill>
-          </p:spPr>
-        </p:sp>
-      </p:grpSp>
-      <p:grpSp>
-        <p:nvGrpSpPr>
-          <p:cNvPr id="6" name="Group 6">
-            <a:extLst>
-              <a:ext uri="{FF2B5EF4-FFF2-40B4-BE49-F238E27FC236}">
-                <a16:creationId xmlns:a16="http://schemas.microsoft.com/office/drawing/2014/main" id="{77B98026-8080-B244-CD4F-606C0E1C39BA}"/>
-              </a:ext>
-            </a:extLst>
-          </p:cNvPr>
-          <p:cNvGrpSpPr/>
-          <p:nvPr/>
-        </p:nvGrpSpPr>
-        <p:grpSpPr>
-          <a:xfrm>
-            <a:off x="17503442" y="8909397"/>
-            <a:ext cx="784558" cy="2755206"/>
-            <a:chOff x="0" y="0"/>
-            <a:chExt cx="286209" cy="1005107"/>
-          </a:xfrm>
-        </p:grpSpPr>
-        <p:sp>
-          <p:nvSpPr>
-            <p:cNvPr id="7" name="Freeform 7">
-              <a:extLst>
-                <a:ext uri="{FF2B5EF4-FFF2-40B4-BE49-F238E27FC236}">
-                  <a16:creationId xmlns:a16="http://schemas.microsoft.com/office/drawing/2014/main" id="{42680AD2-D329-4BC7-032A-14A2AB7D8945}"/>
-                </a:ext>
-              </a:extLst>
-            </p:cNvPr>
-            <p:cNvSpPr/>
-            <p:nvPr/>
-          </p:nvSpPr>
-          <p:spPr>
-            <a:xfrm>
-              <a:off x="0" y="0"/>
-              <a:ext cx="286209" cy="1005107"/>
-            </a:xfrm>
-            <a:custGeom>
-              <a:avLst/>
-              <a:gdLst/>
-              <a:ahLst/>
-              <a:cxnLst/>
-              <a:rect l="l" t="t" r="r" b="b"/>
-              <a:pathLst>
-                <a:path w="286209" h="1005107">
-                  <a:moveTo>
-                    <a:pt x="0" y="0"/>
-                  </a:moveTo>
-                  <a:lnTo>
-                    <a:pt x="286209" y="0"/>
-                  </a:lnTo>
-                  <a:lnTo>
-                    <a:pt x="286209" y="1005107"/>
-                  </a:lnTo>
-                  <a:lnTo>
-                    <a:pt x="0" y="1005107"/>
-                  </a:lnTo>
-                  <a:close/>
-                </a:path>
-              </a:pathLst>
-            </a:custGeom>
-            <a:solidFill>
-              <a:srgbClr val="FFEAEA"/>
-            </a:solidFill>
-          </p:spPr>
-        </p:sp>
-      </p:grpSp>
-      <p:grpSp>
-        <p:nvGrpSpPr>
-          <p:cNvPr id="8" name="Group 8">
-            <a:extLst>
-              <a:ext uri="{FF2B5EF4-FFF2-40B4-BE49-F238E27FC236}">
-                <a16:creationId xmlns:a16="http://schemas.microsoft.com/office/drawing/2014/main" id="{4771062C-4892-2552-0238-B1892707B87A}"/>
-              </a:ext>
-            </a:extLst>
-          </p:cNvPr>
-          <p:cNvGrpSpPr/>
-          <p:nvPr/>
-        </p:nvGrpSpPr>
-        <p:grpSpPr>
-          <a:xfrm>
-            <a:off x="0" y="8494608"/>
-            <a:ext cx="1795264" cy="1792392"/>
-            <a:chOff x="0" y="0"/>
-            <a:chExt cx="6350000" cy="6339840"/>
-          </a:xfrm>
-        </p:grpSpPr>
-        <p:sp>
-          <p:nvSpPr>
-            <p:cNvPr id="9" name="Freeform 9">
-              <a:extLst>
-                <a:ext uri="{FF2B5EF4-FFF2-40B4-BE49-F238E27FC236}">
-                  <a16:creationId xmlns:a16="http://schemas.microsoft.com/office/drawing/2014/main" id="{767BA0CA-971B-C478-4032-BA956FB924AE}"/>
-                </a:ext>
-              </a:extLst>
-            </p:cNvPr>
-            <p:cNvSpPr/>
-            <p:nvPr/>
-          </p:nvSpPr>
-          <p:spPr>
-            <a:xfrm>
-              <a:off x="0" y="0"/>
-              <a:ext cx="6350000" cy="6339840"/>
-            </a:xfrm>
-            <a:custGeom>
-              <a:avLst/>
-              <a:gdLst/>
-              <a:ahLst/>
-              <a:cxnLst/>
-              <a:rect l="l" t="t" r="r" b="b"/>
-              <a:pathLst>
-                <a:path w="6350000" h="6339840">
-                  <a:moveTo>
-                    <a:pt x="6350000" y="6339840"/>
-                  </a:moveTo>
-                  <a:lnTo>
-                    <a:pt x="0" y="6339840"/>
-                  </a:lnTo>
-                  <a:lnTo>
-                    <a:pt x="0" y="0"/>
-                  </a:lnTo>
-                  <a:lnTo>
-                    <a:pt x="6350000" y="6339840"/>
-                  </a:lnTo>
-                  <a:close/>
-                </a:path>
-              </a:pathLst>
-            </a:custGeom>
-            <a:solidFill>
-              <a:srgbClr val="E6F0FF"/>
-            </a:solidFill>
-          </p:spPr>
-        </p:sp>
-      </p:grpSp>
-      <p:grpSp>
-        <p:nvGrpSpPr>
-          <p:cNvPr id="10" name="Group 10">
-            <a:extLst>
-              <a:ext uri="{FF2B5EF4-FFF2-40B4-BE49-F238E27FC236}">
-                <a16:creationId xmlns:a16="http://schemas.microsoft.com/office/drawing/2014/main" id="{812C336F-2A42-D58F-5D2B-47F28DDFA155}"/>
-              </a:ext>
-            </a:extLst>
-          </p:cNvPr>
-          <p:cNvGrpSpPr/>
-          <p:nvPr/>
-        </p:nvGrpSpPr>
-        <p:grpSpPr>
-          <a:xfrm rot="5400000">
-            <a:off x="-21066" y="0"/>
-            <a:ext cx="1795264" cy="1792392"/>
-            <a:chOff x="0" y="0"/>
-            <a:chExt cx="6350000" cy="6339840"/>
-          </a:xfrm>
-        </p:grpSpPr>
-        <p:sp>
-          <p:nvSpPr>
-            <p:cNvPr id="11" name="Freeform 11">
-              <a:extLst>
-                <a:ext uri="{FF2B5EF4-FFF2-40B4-BE49-F238E27FC236}">
-                  <a16:creationId xmlns:a16="http://schemas.microsoft.com/office/drawing/2014/main" id="{8D73369B-8DDB-577F-8345-69956BE92E01}"/>
-                </a:ext>
-              </a:extLst>
-            </p:cNvPr>
-            <p:cNvSpPr/>
-            <p:nvPr/>
-          </p:nvSpPr>
-          <p:spPr>
-            <a:xfrm>
-              <a:off x="0" y="0"/>
-              <a:ext cx="6350000" cy="6339840"/>
-            </a:xfrm>
-            <a:custGeom>
-              <a:avLst/>
-              <a:gdLst/>
-              <a:ahLst/>
-              <a:cxnLst/>
-              <a:rect l="l" t="t" r="r" b="b"/>
-              <a:pathLst>
-                <a:path w="6350000" h="6339840">
-                  <a:moveTo>
-                    <a:pt x="6350000" y="6339840"/>
-                  </a:moveTo>
-                  <a:lnTo>
-                    <a:pt x="0" y="6339840"/>
-                  </a:lnTo>
-                  <a:lnTo>
-                    <a:pt x="0" y="0"/>
-                  </a:lnTo>
-                  <a:lnTo>
-                    <a:pt x="6350000" y="6339840"/>
-                  </a:lnTo>
-                  <a:close/>
-                </a:path>
-              </a:pathLst>
-            </a:custGeom>
-            <a:solidFill>
-              <a:srgbClr val="E6F0FF"/>
-            </a:solidFill>
-          </p:spPr>
-        </p:sp>
-      </p:grpSp>
-      <p:grpSp>
-        <p:nvGrpSpPr>
-          <p:cNvPr id="12" name="Group 12">
-            <a:extLst>
-              <a:ext uri="{FF2B5EF4-FFF2-40B4-BE49-F238E27FC236}">
-                <a16:creationId xmlns:a16="http://schemas.microsoft.com/office/drawing/2014/main" id="{3092DB14-A896-3E76-6FB6-592F1672AA8C}"/>
-              </a:ext>
-            </a:extLst>
-          </p:cNvPr>
-          <p:cNvGrpSpPr/>
-          <p:nvPr/>
-        </p:nvGrpSpPr>
-        <p:grpSpPr>
-          <a:xfrm>
-            <a:off x="1028700" y="1363120"/>
-            <a:ext cx="6140876" cy="545718"/>
-            <a:chOff x="0" y="0"/>
-            <a:chExt cx="1876837" cy="166788"/>
-          </a:xfrm>
-        </p:grpSpPr>
-        <p:sp>
-          <p:nvSpPr>
-            <p:cNvPr id="13" name="Freeform 13">
-              <a:extLst>
-                <a:ext uri="{FF2B5EF4-FFF2-40B4-BE49-F238E27FC236}">
-                  <a16:creationId xmlns:a16="http://schemas.microsoft.com/office/drawing/2014/main" id="{F566AA5A-CAF1-7C21-A3C0-32110F27BF71}"/>
-                </a:ext>
-              </a:extLst>
-            </p:cNvPr>
-            <p:cNvSpPr/>
-            <p:nvPr/>
-          </p:nvSpPr>
-          <p:spPr>
-            <a:xfrm>
-              <a:off x="0" y="0"/>
-              <a:ext cx="1876837" cy="166788"/>
-            </a:xfrm>
-            <a:custGeom>
-              <a:avLst/>
-              <a:gdLst/>
-              <a:ahLst/>
-              <a:cxnLst/>
-              <a:rect l="l" t="t" r="r" b="b"/>
-              <a:pathLst>
-                <a:path w="1876837" h="166788">
-                  <a:moveTo>
-                    <a:pt x="0" y="0"/>
-                  </a:moveTo>
-                  <a:lnTo>
-                    <a:pt x="1876837" y="0"/>
-                  </a:lnTo>
-                  <a:lnTo>
-                    <a:pt x="1876837" y="166788"/>
-                  </a:lnTo>
-                  <a:lnTo>
-                    <a:pt x="0" y="166788"/>
-                  </a:lnTo>
-                  <a:close/>
-                </a:path>
-              </a:pathLst>
-            </a:custGeom>
-            <a:solidFill>
-              <a:srgbClr val="FFCFCF"/>
-            </a:solidFill>
-          </p:spPr>
-        </p:sp>
-      </p:grpSp>
-      <p:sp>
-        <p:nvSpPr>
-          <p:cNvPr id="16" name="TextBox 15">
-            <a:extLst>
-              <a:ext uri="{FF2B5EF4-FFF2-40B4-BE49-F238E27FC236}">
-                <a16:creationId xmlns:a16="http://schemas.microsoft.com/office/drawing/2014/main" id="{1A867031-752F-5AA7-BF0F-E31895D0A931}"/>
-              </a:ext>
-            </a:extLst>
-          </p:cNvPr>
-          <p:cNvSpPr txBox="1"/>
-          <p:nvPr/>
-        </p:nvSpPr>
-        <p:spPr>
-          <a:xfrm>
-            <a:off x="1028700" y="1257494"/>
-            <a:ext cx="6156438" cy="769441"/>
-          </a:xfrm>
-          <a:prstGeom prst="rect">
-            <a:avLst/>
-          </a:prstGeom>
-          <a:noFill/>
-        </p:spPr>
-        <p:txBody>
-          <a:bodyPr wrap="square" rtlCol="0">
-            <a:spAutoFit/>
-          </a:bodyPr>
-          <a:lstStyle/>
-          <a:p>
-            <a:r>
-              <a:rPr lang="en-US" sz="4400" b="1" dirty="0"/>
-              <a:t>Setup GitHub</a:t>
-            </a:r>
-            <a:endParaRPr lang="en-IN" sz="4400" b="1" dirty="0"/>
-          </a:p>
-        </p:txBody>
-      </p:sp>
-      <p:pic>
-        <p:nvPicPr>
-          <p:cNvPr id="14" name="Picture 13">
-            <a:extLst>
-              <a:ext uri="{FF2B5EF4-FFF2-40B4-BE49-F238E27FC236}">
-                <a16:creationId xmlns:a16="http://schemas.microsoft.com/office/drawing/2014/main" id="{9224B7FF-85D6-72D3-7D49-80367E9D446A}"/>
-              </a:ext>
-            </a:extLst>
-          </p:cNvPr>
-          <p:cNvPicPr>
-            <a:picLocks noChangeAspect="1"/>
-          </p:cNvPicPr>
-          <p:nvPr/>
-        </p:nvPicPr>
-        <p:blipFill>
-          <a:blip r:embed="rId4">
-            <a:extLst>
-              <a:ext uri="{28A0092B-C50C-407E-A947-70E740481C1C}">
-                <a14:useLocalDpi xmlns:a14="http://schemas.microsoft.com/office/drawing/2010/main" val="0"/>
-              </a:ext>
-            </a:extLst>
-          </a:blip>
-          <a:stretch>
-            <a:fillRect/>
-          </a:stretch>
-        </p:blipFill>
-        <p:spPr>
-          <a:xfrm>
-            <a:off x="14325600" y="721160"/>
-            <a:ext cx="2668328" cy="1072668"/>
-          </a:xfrm>
-          <a:prstGeom prst="rect">
-            <a:avLst/>
-          </a:prstGeom>
-        </p:spPr>
-      </p:pic>
-      <p:sp>
-        <p:nvSpPr>
-          <p:cNvPr id="17" name="TextBox 16">
-            <a:extLst>
-              <a:ext uri="{FF2B5EF4-FFF2-40B4-BE49-F238E27FC236}">
-                <a16:creationId xmlns:a16="http://schemas.microsoft.com/office/drawing/2014/main" id="{D5DE2973-473D-F800-2191-A0659F113095}"/>
-              </a:ext>
-            </a:extLst>
-          </p:cNvPr>
-          <p:cNvSpPr txBox="1"/>
-          <p:nvPr/>
-        </p:nvSpPr>
-        <p:spPr>
-          <a:xfrm>
-            <a:off x="1028700" y="2225822"/>
-            <a:ext cx="13771996" cy="5632311"/>
-          </a:xfrm>
-          <a:prstGeom prst="rect">
-            <a:avLst/>
-          </a:prstGeom>
-          <a:noFill/>
-        </p:spPr>
-        <p:txBody>
-          <a:bodyPr wrap="square">
-            <a:spAutoFit/>
-          </a:bodyPr>
-          <a:lstStyle/>
-          <a:p>
-            <a:pPr marL="428625" indent="-428625">
-              <a:buFont typeface="Wingdings" panose="05000000000000000000" pitchFamily="2" charset="2"/>
-              <a:buChar char="§"/>
-            </a:pPr>
-            <a:r>
-              <a:rPr lang="en-US" sz="4000" dirty="0"/>
-              <a:t>Create an account on </a:t>
-            </a:r>
-            <a:r>
-              <a:rPr lang="en-US" sz="4000" dirty="0" err="1"/>
-              <a:t>Github</a:t>
-            </a:r>
-            <a:r>
-              <a:rPr lang="en-IN" sz="4000" dirty="0"/>
-              <a:t>: </a:t>
-            </a:r>
-            <a:r>
-              <a:rPr lang="en-IN" sz="4000" dirty="0">
-                <a:hlinkClick r:id="rId5"/>
-              </a:rPr>
-              <a:t>https://github.com/</a:t>
-            </a:r>
-            <a:endParaRPr lang="en-IN" sz="4000" dirty="0"/>
-          </a:p>
-          <a:p>
-            <a:pPr marL="428625" indent="-428625">
-              <a:buFont typeface="Wingdings" panose="05000000000000000000" pitchFamily="2" charset="2"/>
-              <a:buChar char="§"/>
-            </a:pPr>
-            <a:r>
-              <a:rPr lang="en-IN" sz="4000" dirty="0"/>
-              <a:t>Install Git: https://git-scm.com/downloads</a:t>
-            </a:r>
-          </a:p>
-          <a:p>
-            <a:pPr marL="428625" indent="-428625">
-              <a:buFont typeface="Wingdings" panose="05000000000000000000" pitchFamily="2" charset="2"/>
-              <a:buChar char="§"/>
-            </a:pPr>
-            <a:r>
-              <a:rPr lang="en-IN" sz="4000" dirty="0"/>
-              <a:t> Create a repository on GitHub.</a:t>
-            </a:r>
-          </a:p>
-          <a:p>
-            <a:pPr marL="428625" indent="-428625">
-              <a:buFont typeface="Wingdings" panose="05000000000000000000" pitchFamily="2" charset="2"/>
-              <a:buChar char="§"/>
-            </a:pPr>
-            <a:r>
-              <a:rPr lang="en-IN" sz="4000" dirty="0"/>
-              <a:t>Add you local code to GitHub, using git bash (Commands are already mentioned on the page, when  you create  a repository).</a:t>
-            </a:r>
-          </a:p>
-          <a:p>
-            <a:pPr marL="428625" indent="-428625">
-              <a:buFont typeface="Wingdings" panose="05000000000000000000" pitchFamily="2" charset="2"/>
-              <a:buChar char="§"/>
-            </a:pPr>
-            <a:r>
-              <a:rPr lang="en-IN" sz="4000" b="1"/>
-              <a:t>Documentation</a:t>
-            </a:r>
-            <a:r>
-              <a:rPr lang="en-IN" sz="4000"/>
-              <a:t> </a:t>
-            </a:r>
-            <a:r>
-              <a:rPr lang="en-IN" sz="4000" dirty="0"/>
-              <a:t>https://docs.github.com/en/get-started/getting-started-with-git/setting-your-username-in-git</a:t>
-            </a:r>
-          </a:p>
-          <a:p>
-            <a:pPr marL="428625" indent="-428625">
-              <a:buFont typeface="Wingdings" panose="05000000000000000000" pitchFamily="2" charset="2"/>
-              <a:buChar char="§"/>
-            </a:pPr>
-            <a:endParaRPr lang="en-US" sz="4000" dirty="0"/>
-          </a:p>
-        </p:txBody>
-      </p:sp>
-      <p:pic>
-        <p:nvPicPr>
-          <p:cNvPr id="18" name="Picture 17">
-            <a:extLst>
-              <a:ext uri="{FF2B5EF4-FFF2-40B4-BE49-F238E27FC236}">
-                <a16:creationId xmlns:a16="http://schemas.microsoft.com/office/drawing/2014/main" id="{ADFD06C3-123C-42B5-C84A-9B73187C6A5A}"/>
-              </a:ext>
-            </a:extLst>
-          </p:cNvPr>
-          <p:cNvPicPr>
-            <a:picLocks noChangeAspect="1"/>
-          </p:cNvPicPr>
-          <p:nvPr/>
-        </p:nvPicPr>
-        <p:blipFill>
-          <a:blip r:embed="rId6"/>
-          <a:stretch>
-            <a:fillRect/>
-          </a:stretch>
-        </p:blipFill>
-        <p:spPr>
-          <a:xfrm>
-            <a:off x="1174661" y="7430505"/>
-            <a:ext cx="8056298" cy="1290638"/>
-          </a:xfrm>
-          <a:prstGeom prst="rect">
-            <a:avLst/>
-          </a:prstGeom>
-        </p:spPr>
-      </p:pic>
-    </p:spTree>
-    <p:extLst>
-      <p:ext uri="{BB962C8B-B14F-4D97-AF65-F5344CB8AC3E}">
-        <p14:creationId xmlns:p14="http://schemas.microsoft.com/office/powerpoint/2010/main" val="3939712591"/>
-      </p:ext>
-    </p:extLst>
-  </p:cSld>
-  <p:clrMapOvr>
-    <a:masterClrMapping/>
-  </p:clrMapOvr>
-</p:sld>
-</file>
-
-<file path=ppt/slides/slide5.xml><?xml version="1.0" encoding="utf-8"?>
 <p:sld xmlns:a="http://schemas.openxmlformats.org/drawingml/2006/main" xmlns:r="http://schemas.openxmlformats.org/officeDocument/2006/relationships" xmlns:p="http://schemas.openxmlformats.org/presentationml/2006/main">
   <p:cSld>
     <p:spTree>
@@ -8767,14 +6245,14 @@
           <p:nvPr/>
         </p:nvPicPr>
         <p:blipFill>
-          <a:blip r:embed="rId2">
+          <a:blip r:embed="rId1">
             <a:alphaModFix amt="6000"/>
             <a:extLst>
               <a:ext uri="{28A0092B-C50C-407E-A947-70E740481C1C}">
                 <a14:useLocalDpi xmlns:a14="http://schemas.microsoft.com/office/drawing/2010/main" val="0"/>
               </a:ext>
               <a:ext uri="{96DAC541-7B7A-43D3-8B79-37D633B846F1}">
-                <asvg:svgBlip xmlns:asvg="http://schemas.microsoft.com/office/drawing/2016/SVG/main" r:embed="rId3"/>
+                <asvg:svgBlip xmlns:asvg="http://schemas.microsoft.com/office/drawing/2016/SVG/main" r:embed="rId2"/>
               </a:ext>
             </a:extLst>
           </a:blip>
@@ -8802,14 +6280,14 @@
           <p:nvPr/>
         </p:nvPicPr>
         <p:blipFill>
-          <a:blip r:embed="rId2" cstate="print">
+          <a:blip r:embed="rId1" cstate="print">
             <a:alphaModFix amt="6000"/>
             <a:extLst>
               <a:ext uri="{28A0092B-C50C-407E-A947-70E740481C1C}">
                 <a14:useLocalDpi xmlns:a14="http://schemas.microsoft.com/office/drawing/2010/main" val="0"/>
               </a:ext>
               <a:ext uri="{96DAC541-7B7A-43D3-8B79-37D633B846F1}">
-                <asvg:svgBlip xmlns:asvg="http://schemas.microsoft.com/office/drawing/2016/SVG/main" r:embed="rId3"/>
+                <asvg:svgBlip xmlns:asvg="http://schemas.microsoft.com/office/drawing/2016/SVG/main" r:embed="rId2"/>
               </a:ext>
             </a:extLst>
           </a:blip>
@@ -9057,7 +6535,7 @@
         <p:grpSpPr>
           <a:xfrm>
             <a:off x="1028700" y="1363120"/>
-            <a:ext cx="1943100" cy="606300"/>
+            <a:ext cx="6140876" cy="545718"/>
             <a:chOff x="0" y="0"/>
             <a:chExt cx="1876837" cy="166788"/>
           </a:xfrm>
@@ -9105,20 +6583,14 @@
       </p:grpSp>
       <p:sp>
         <p:nvSpPr>
-          <p:cNvPr id="16" name="TextBox 15">
-            <a:extLst>
-              <a:ext uri="{FF2B5EF4-FFF2-40B4-BE49-F238E27FC236}">
-                <a16:creationId xmlns:a16="http://schemas.microsoft.com/office/drawing/2014/main" id="{07F97D94-3FF9-950A-FFE1-A267F491BF58}"/>
-              </a:ext>
-            </a:extLst>
-          </p:cNvPr>
+          <p:cNvPr id="16" name="TextBox 15"/>
           <p:cNvSpPr txBox="1"/>
           <p:nvPr/>
         </p:nvSpPr>
         <p:spPr>
           <a:xfrm>
-            <a:off x="1060018" y="1245321"/>
-            <a:ext cx="1792392" cy="769441"/>
+            <a:off x="1028700" y="1257494"/>
+            <a:ext cx="6156438" cy="769441"/>
           </a:xfrm>
           <a:prstGeom prst="rect">
             <a:avLst/>
@@ -9132,78 +6604,23 @@
           <a:lstStyle/>
           <a:p>
             <a:r>
-              <a:rPr lang="en-US" sz="4400" b="1" dirty="0">
-                <a:solidFill>
-                  <a:schemeClr val="tx1">
-                    <a:lumMod val="95000"/>
-                    <a:lumOff val="5000"/>
-                  </a:schemeClr>
-                </a:solidFill>
-              </a:rPr>
-              <a:t>Q &amp; A</a:t>
-            </a:r>
-            <a:endParaRPr lang="en-IN" sz="4200" b="1" dirty="0">
-              <a:solidFill>
-                <a:schemeClr val="tx1">
-                  <a:lumMod val="95000"/>
-                  <a:lumOff val="5000"/>
-                </a:schemeClr>
-              </a:solidFill>
-            </a:endParaRPr>
+              <a:rPr lang="en-US" sz="4400" b="1" dirty="0"/>
+              <a:t>Setup GitHub</a:t>
+            </a:r>
+            <a:endParaRPr lang="en-IN" sz="4400" b="1" dirty="0"/>
           </a:p>
         </p:txBody>
       </p:sp>
       <p:pic>
         <p:nvPicPr>
-          <p:cNvPr id="14" name="Picture 13" descr="A drawing of a cartoon character&#10;&#10;Description automatically generated">
-            <a:extLst>
-              <a:ext uri="{FF2B5EF4-FFF2-40B4-BE49-F238E27FC236}">
-                <a16:creationId xmlns:a16="http://schemas.microsoft.com/office/drawing/2014/main" id="{8AE6D6FC-8F9F-B509-A82B-491E950097A2}"/>
-              </a:ext>
-            </a:extLst>
-          </p:cNvPr>
-          <p:cNvPicPr>
-            <a:picLocks noChangeAspect="1"/>
-          </p:cNvPicPr>
-          <p:nvPr/>
-        </p:nvPicPr>
-        <p:blipFill rotWithShape="1">
-          <a:blip r:embed="rId4">
-            <a:extLst>
-              <a:ext uri="{28A0092B-C50C-407E-A947-70E740481C1C}">
-                <a14:useLocalDpi xmlns:a14="http://schemas.microsoft.com/office/drawing/2010/main" val="0"/>
-              </a:ext>
-            </a:extLst>
-          </a:blip>
-          <a:srcRect l="3457" r="446" b="-1"/>
-          <a:stretch/>
-        </p:blipFill>
-        <p:spPr>
-          <a:xfrm>
-            <a:off x="3695700" y="2037622"/>
-            <a:ext cx="10896600" cy="8249378"/>
-          </a:xfrm>
-          <a:prstGeom prst="rect">
-            <a:avLst/>
-          </a:prstGeom>
-        </p:spPr>
-      </p:pic>
-      <p:pic>
-        <p:nvPicPr>
-          <p:cNvPr id="15" name="Picture 14">
-            <a:extLst>
-              <a:ext uri="{FF2B5EF4-FFF2-40B4-BE49-F238E27FC236}">
-                <a16:creationId xmlns:a16="http://schemas.microsoft.com/office/drawing/2014/main" id="{B89F78B6-2555-81CE-190D-048880ADE5AB}"/>
-              </a:ext>
-            </a:extLst>
-          </p:cNvPr>
+          <p:cNvPr id="14" name="Picture 13"/>
           <p:cNvPicPr>
             <a:picLocks noChangeAspect="1"/>
           </p:cNvPicPr>
           <p:nvPr/>
         </p:nvPicPr>
         <p:blipFill>
-          <a:blip r:embed="rId5">
+          <a:blip r:embed="rId3">
             <a:extLst>
               <a:ext uri="{28A0092B-C50C-407E-A947-70E740481C1C}">
                 <a14:useLocalDpi xmlns:a14="http://schemas.microsoft.com/office/drawing/2010/main" val="0"/>
@@ -9224,12 +6641,613 @@
           </a:prstGeom>
         </p:spPr>
       </p:pic>
+      <p:sp>
+        <p:nvSpPr>
+          <p:cNvPr id="17" name="TextBox 16"/>
+          <p:cNvSpPr txBox="1"/>
+          <p:nvPr/>
+        </p:nvSpPr>
+        <p:spPr>
+          <a:xfrm>
+            <a:off x="1028700" y="2225822"/>
+            <a:ext cx="13771996" cy="5632311"/>
+          </a:xfrm>
+          <a:prstGeom prst="rect">
+            <a:avLst/>
+          </a:prstGeom>
+          <a:noFill/>
+        </p:spPr>
+        <p:txBody>
+          <a:bodyPr wrap="square">
+            <a:spAutoFit/>
+          </a:bodyPr>
+          <a:lstStyle/>
+          <a:p>
+            <a:pPr marL="428625" indent="-428625">
+              <a:buFont typeface="Wingdings" panose="05000000000000000000" pitchFamily="2" charset="2"/>
+              <a:buChar char="§"/>
+            </a:pPr>
+            <a:r>
+              <a:rPr lang="en-US" sz="4000" dirty="0"/>
+              <a:t>Create an account on </a:t>
+            </a:r>
+            <a:r>
+              <a:rPr lang="en-US" sz="4000" dirty="0" err="1"/>
+              <a:t>Github</a:t>
+            </a:r>
+            <a:r>
+              <a:rPr lang="en-IN" sz="4000" dirty="0"/>
+              <a:t>: </a:t>
+            </a:r>
+            <a:r>
+              <a:rPr lang="en-IN" sz="4000" dirty="0">
+                <a:hlinkClick r:id="rId4"/>
+              </a:rPr>
+              <a:t>https://github.com/</a:t>
+            </a:r>
+            <a:endParaRPr lang="en-IN" sz="4000" dirty="0"/>
+          </a:p>
+          <a:p>
+            <a:pPr marL="428625" indent="-428625">
+              <a:buFont typeface="Wingdings" panose="05000000000000000000" pitchFamily="2" charset="2"/>
+              <a:buChar char="§"/>
+            </a:pPr>
+            <a:r>
+              <a:rPr lang="en-IN" sz="4000" dirty="0"/>
+              <a:t>Install Git: https://git-scm.com/downloads</a:t>
+            </a:r>
+            <a:endParaRPr lang="en-IN" sz="4000" dirty="0"/>
+          </a:p>
+          <a:p>
+            <a:pPr marL="428625" indent="-428625">
+              <a:buFont typeface="Wingdings" panose="05000000000000000000" pitchFamily="2" charset="2"/>
+              <a:buChar char="§"/>
+            </a:pPr>
+            <a:r>
+              <a:rPr lang="en-IN" sz="4000" dirty="0"/>
+              <a:t> Create a repository on GitHub.</a:t>
+            </a:r>
+            <a:endParaRPr lang="en-IN" sz="4000" dirty="0"/>
+          </a:p>
+          <a:p>
+            <a:pPr marL="428625" indent="-428625">
+              <a:buFont typeface="Wingdings" panose="05000000000000000000" pitchFamily="2" charset="2"/>
+              <a:buChar char="§"/>
+            </a:pPr>
+            <a:r>
+              <a:rPr lang="en-IN" sz="4000" dirty="0"/>
+              <a:t>Add you local code to GitHub, using git bash (Commands are already mentioned on the page, when  you create  a repository).</a:t>
+            </a:r>
+            <a:endParaRPr lang="en-IN" sz="4000" dirty="0"/>
+          </a:p>
+          <a:p>
+            <a:pPr marL="428625" indent="-428625">
+              <a:buFont typeface="Wingdings" panose="05000000000000000000" pitchFamily="2" charset="2"/>
+              <a:buChar char="§"/>
+            </a:pPr>
+            <a:r>
+              <a:rPr lang="en-IN" sz="4000" b="1"/>
+              <a:t>Documentation</a:t>
+            </a:r>
+            <a:r>
+              <a:rPr lang="en-IN" sz="4000"/>
+              <a:t> </a:t>
+            </a:r>
+            <a:r>
+              <a:rPr lang="en-IN" sz="4000" dirty="0"/>
+              <a:t>https://docs.github.com/en/get-started/getting-started-with-git/setting-your-username-in-git</a:t>
+            </a:r>
+            <a:endParaRPr lang="en-IN" sz="4000" dirty="0"/>
+          </a:p>
+          <a:p>
+            <a:pPr marL="428625" indent="-428625">
+              <a:buFont typeface="Wingdings" panose="05000000000000000000" pitchFamily="2" charset="2"/>
+              <a:buChar char="§"/>
+            </a:pPr>
+            <a:endParaRPr lang="en-US" sz="4000" dirty="0"/>
+          </a:p>
+        </p:txBody>
+      </p:sp>
+      <p:pic>
+        <p:nvPicPr>
+          <p:cNvPr id="18" name="Picture 17"/>
+          <p:cNvPicPr>
+            <a:picLocks noChangeAspect="1"/>
+          </p:cNvPicPr>
+          <p:nvPr/>
+        </p:nvPicPr>
+        <p:blipFill>
+          <a:blip r:embed="rId5"/>
+          <a:stretch>
+            <a:fillRect/>
+          </a:stretch>
+        </p:blipFill>
+        <p:spPr>
+          <a:xfrm>
+            <a:off x="1174661" y="7430505"/>
+            <a:ext cx="8056298" cy="1290638"/>
+          </a:xfrm>
+          <a:prstGeom prst="rect">
+            <a:avLst/>
+          </a:prstGeom>
+        </p:spPr>
+      </p:pic>
     </p:spTree>
-    <p:extLst>
-      <p:ext uri="{BB962C8B-B14F-4D97-AF65-F5344CB8AC3E}">
-        <p14:creationId xmlns:p14="http://schemas.microsoft.com/office/powerpoint/2010/main" val="4174312757"/>
-      </p:ext>
-    </p:extLst>
+  </p:cSld>
+  <p:clrMapOvr>
+    <a:masterClrMapping/>
+  </p:clrMapOvr>
+</p:sld>
+</file>
+
+<file path=ppt/slides/slide5.xml><?xml version="1.0" encoding="utf-8"?>
+<p:sld xmlns:a="http://schemas.openxmlformats.org/drawingml/2006/main" xmlns:r="http://schemas.openxmlformats.org/officeDocument/2006/relationships" xmlns:p="http://schemas.openxmlformats.org/presentationml/2006/main">
+  <p:cSld>
+    <p:spTree>
+      <p:nvGrpSpPr>
+        <p:cNvPr id="1" name=""/>
+        <p:cNvGrpSpPr/>
+        <p:nvPr/>
+      </p:nvGrpSpPr>
+      <p:grpSpPr>
+        <a:xfrm>
+          <a:off x="0" y="0"/>
+          <a:ext cx="0" cy="0"/>
+          <a:chOff x="0" y="0"/>
+          <a:chExt cx="0" cy="0"/>
+        </a:xfrm>
+      </p:grpSpPr>
+      <p:pic>
+        <p:nvPicPr>
+          <p:cNvPr id="2" name="Picture 2"/>
+          <p:cNvPicPr>
+            <a:picLocks noChangeAspect="1"/>
+          </p:cNvPicPr>
+          <p:nvPr/>
+        </p:nvPicPr>
+        <p:blipFill>
+          <a:blip r:embed="rId1">
+            <a:alphaModFix amt="6000"/>
+            <a:extLst>
+              <a:ext uri="{28A0092B-C50C-407E-A947-70E740481C1C}">
+                <a14:useLocalDpi xmlns:a14="http://schemas.microsoft.com/office/drawing/2010/main" val="0"/>
+              </a:ext>
+              <a:ext uri="{96DAC541-7B7A-43D3-8B79-37D633B846F1}">
+                <asvg:svgBlip xmlns:asvg="http://schemas.microsoft.com/office/drawing/2016/SVG/main" r:embed="rId2"/>
+              </a:ext>
+            </a:extLst>
+          </a:blip>
+          <a:srcRect/>
+          <a:stretch>
+            <a:fillRect/>
+          </a:stretch>
+        </p:blipFill>
+        <p:spPr>
+          <a:xfrm flipH="1">
+            <a:off x="-19630" y="0"/>
+            <a:ext cx="2327622" cy="2327622"/>
+          </a:xfrm>
+          <a:prstGeom prst="rect">
+            <a:avLst/>
+          </a:prstGeom>
+        </p:spPr>
+      </p:pic>
+      <p:pic>
+        <p:nvPicPr>
+          <p:cNvPr id="3" name="Picture 3"/>
+          <p:cNvPicPr>
+            <a:picLocks noChangeAspect="1"/>
+          </p:cNvPicPr>
+          <p:nvPr/>
+        </p:nvPicPr>
+        <p:blipFill>
+          <a:blip r:embed="rId1" cstate="print">
+            <a:alphaModFix amt="6000"/>
+            <a:extLst>
+              <a:ext uri="{28A0092B-C50C-407E-A947-70E740481C1C}">
+                <a14:useLocalDpi xmlns:a14="http://schemas.microsoft.com/office/drawing/2010/main" val="0"/>
+              </a:ext>
+              <a:ext uri="{96DAC541-7B7A-43D3-8B79-37D633B846F1}">
+                <asvg:svgBlip xmlns:asvg="http://schemas.microsoft.com/office/drawing/2016/SVG/main" r:embed="rId2"/>
+              </a:ext>
+            </a:extLst>
+          </a:blip>
+          <a:srcRect/>
+          <a:stretch>
+            <a:fillRect/>
+          </a:stretch>
+        </p:blipFill>
+        <p:spPr>
+          <a:xfrm flipH="1">
+            <a:off x="16145912" y="8144912"/>
+            <a:ext cx="2142088" cy="2142088"/>
+          </a:xfrm>
+          <a:prstGeom prst="rect">
+            <a:avLst/>
+          </a:prstGeom>
+        </p:spPr>
+      </p:pic>
+      <p:grpSp>
+        <p:nvGrpSpPr>
+          <p:cNvPr id="4" name="Group 4"/>
+          <p:cNvGrpSpPr/>
+          <p:nvPr/>
+        </p:nvGrpSpPr>
+        <p:grpSpPr>
+          <a:xfrm>
+            <a:off x="17503442" y="0"/>
+            <a:ext cx="784558" cy="1829535"/>
+            <a:chOff x="0" y="0"/>
+            <a:chExt cx="286209" cy="667420"/>
+          </a:xfrm>
+        </p:grpSpPr>
+        <p:sp>
+          <p:nvSpPr>
+            <p:cNvPr id="5" name="Freeform 5"/>
+            <p:cNvSpPr/>
+            <p:nvPr/>
+          </p:nvSpPr>
+          <p:spPr>
+            <a:xfrm>
+              <a:off x="0" y="0"/>
+              <a:ext cx="286209" cy="667419"/>
+            </a:xfrm>
+            <a:custGeom>
+              <a:avLst/>
+              <a:gdLst/>
+              <a:ahLst/>
+              <a:cxnLst/>
+              <a:rect l="l" t="t" r="r" b="b"/>
+              <a:pathLst>
+                <a:path w="286209" h="667419">
+                  <a:moveTo>
+                    <a:pt x="0" y="0"/>
+                  </a:moveTo>
+                  <a:lnTo>
+                    <a:pt x="286209" y="0"/>
+                  </a:lnTo>
+                  <a:lnTo>
+                    <a:pt x="286209" y="667419"/>
+                  </a:lnTo>
+                  <a:lnTo>
+                    <a:pt x="0" y="667419"/>
+                  </a:lnTo>
+                  <a:close/>
+                </a:path>
+              </a:pathLst>
+            </a:custGeom>
+            <a:solidFill>
+              <a:srgbClr val="FF9D8F"/>
+            </a:solidFill>
+          </p:spPr>
+        </p:sp>
+      </p:grpSp>
+      <p:grpSp>
+        <p:nvGrpSpPr>
+          <p:cNvPr id="6" name="Group 6"/>
+          <p:cNvGrpSpPr/>
+          <p:nvPr/>
+        </p:nvGrpSpPr>
+        <p:grpSpPr>
+          <a:xfrm>
+            <a:off x="17503442" y="8909397"/>
+            <a:ext cx="784558" cy="2755206"/>
+            <a:chOff x="0" y="0"/>
+            <a:chExt cx="286209" cy="1005107"/>
+          </a:xfrm>
+        </p:grpSpPr>
+        <p:sp>
+          <p:nvSpPr>
+            <p:cNvPr id="7" name="Freeform 7"/>
+            <p:cNvSpPr/>
+            <p:nvPr/>
+          </p:nvSpPr>
+          <p:spPr>
+            <a:xfrm>
+              <a:off x="0" y="0"/>
+              <a:ext cx="286209" cy="1005107"/>
+            </a:xfrm>
+            <a:custGeom>
+              <a:avLst/>
+              <a:gdLst/>
+              <a:ahLst/>
+              <a:cxnLst/>
+              <a:rect l="l" t="t" r="r" b="b"/>
+              <a:pathLst>
+                <a:path w="286209" h="1005107">
+                  <a:moveTo>
+                    <a:pt x="0" y="0"/>
+                  </a:moveTo>
+                  <a:lnTo>
+                    <a:pt x="286209" y="0"/>
+                  </a:lnTo>
+                  <a:lnTo>
+                    <a:pt x="286209" y="1005107"/>
+                  </a:lnTo>
+                  <a:lnTo>
+                    <a:pt x="0" y="1005107"/>
+                  </a:lnTo>
+                  <a:close/>
+                </a:path>
+              </a:pathLst>
+            </a:custGeom>
+            <a:solidFill>
+              <a:srgbClr val="FFEAEA"/>
+            </a:solidFill>
+          </p:spPr>
+        </p:sp>
+      </p:grpSp>
+      <p:grpSp>
+        <p:nvGrpSpPr>
+          <p:cNvPr id="8" name="Group 8"/>
+          <p:cNvGrpSpPr/>
+          <p:nvPr/>
+        </p:nvGrpSpPr>
+        <p:grpSpPr>
+          <a:xfrm>
+            <a:off x="0" y="8494608"/>
+            <a:ext cx="1795264" cy="1792392"/>
+            <a:chOff x="0" y="0"/>
+            <a:chExt cx="6350000" cy="6339840"/>
+          </a:xfrm>
+        </p:grpSpPr>
+        <p:sp>
+          <p:nvSpPr>
+            <p:cNvPr id="9" name="Freeform 9"/>
+            <p:cNvSpPr/>
+            <p:nvPr/>
+          </p:nvSpPr>
+          <p:spPr>
+            <a:xfrm>
+              <a:off x="0" y="0"/>
+              <a:ext cx="6350000" cy="6339840"/>
+            </a:xfrm>
+            <a:custGeom>
+              <a:avLst/>
+              <a:gdLst/>
+              <a:ahLst/>
+              <a:cxnLst/>
+              <a:rect l="l" t="t" r="r" b="b"/>
+              <a:pathLst>
+                <a:path w="6350000" h="6339840">
+                  <a:moveTo>
+                    <a:pt x="6350000" y="6339840"/>
+                  </a:moveTo>
+                  <a:lnTo>
+                    <a:pt x="0" y="6339840"/>
+                  </a:lnTo>
+                  <a:lnTo>
+                    <a:pt x="0" y="0"/>
+                  </a:lnTo>
+                  <a:lnTo>
+                    <a:pt x="6350000" y="6339840"/>
+                  </a:lnTo>
+                  <a:close/>
+                </a:path>
+              </a:pathLst>
+            </a:custGeom>
+            <a:solidFill>
+              <a:srgbClr val="E6F0FF"/>
+            </a:solidFill>
+          </p:spPr>
+        </p:sp>
+      </p:grpSp>
+      <p:grpSp>
+        <p:nvGrpSpPr>
+          <p:cNvPr id="10" name="Group 10"/>
+          <p:cNvGrpSpPr/>
+          <p:nvPr/>
+        </p:nvGrpSpPr>
+        <p:grpSpPr>
+          <a:xfrm rot="5400000">
+            <a:off x="-21066" y="0"/>
+            <a:ext cx="1795264" cy="1792392"/>
+            <a:chOff x="0" y="0"/>
+            <a:chExt cx="6350000" cy="6339840"/>
+          </a:xfrm>
+        </p:grpSpPr>
+        <p:sp>
+          <p:nvSpPr>
+            <p:cNvPr id="11" name="Freeform 11"/>
+            <p:cNvSpPr/>
+            <p:nvPr/>
+          </p:nvSpPr>
+          <p:spPr>
+            <a:xfrm>
+              <a:off x="0" y="0"/>
+              <a:ext cx="6350000" cy="6339840"/>
+            </a:xfrm>
+            <a:custGeom>
+              <a:avLst/>
+              <a:gdLst/>
+              <a:ahLst/>
+              <a:cxnLst/>
+              <a:rect l="l" t="t" r="r" b="b"/>
+              <a:pathLst>
+                <a:path w="6350000" h="6339840">
+                  <a:moveTo>
+                    <a:pt x="6350000" y="6339840"/>
+                  </a:moveTo>
+                  <a:lnTo>
+                    <a:pt x="0" y="6339840"/>
+                  </a:lnTo>
+                  <a:lnTo>
+                    <a:pt x="0" y="0"/>
+                  </a:lnTo>
+                  <a:lnTo>
+                    <a:pt x="6350000" y="6339840"/>
+                  </a:lnTo>
+                  <a:close/>
+                </a:path>
+              </a:pathLst>
+            </a:custGeom>
+            <a:solidFill>
+              <a:srgbClr val="E6F0FF"/>
+            </a:solidFill>
+          </p:spPr>
+        </p:sp>
+      </p:grpSp>
+      <p:grpSp>
+        <p:nvGrpSpPr>
+          <p:cNvPr id="12" name="Group 12"/>
+          <p:cNvGrpSpPr/>
+          <p:nvPr/>
+        </p:nvGrpSpPr>
+        <p:grpSpPr>
+          <a:xfrm>
+            <a:off x="1028700" y="1363120"/>
+            <a:ext cx="1943100" cy="606300"/>
+            <a:chOff x="0" y="0"/>
+            <a:chExt cx="1876837" cy="166788"/>
+          </a:xfrm>
+        </p:grpSpPr>
+        <p:sp>
+          <p:nvSpPr>
+            <p:cNvPr id="13" name="Freeform 13"/>
+            <p:cNvSpPr/>
+            <p:nvPr/>
+          </p:nvSpPr>
+          <p:spPr>
+            <a:xfrm>
+              <a:off x="0" y="0"/>
+              <a:ext cx="1876837" cy="166788"/>
+            </a:xfrm>
+            <a:custGeom>
+              <a:avLst/>
+              <a:gdLst/>
+              <a:ahLst/>
+              <a:cxnLst/>
+              <a:rect l="l" t="t" r="r" b="b"/>
+              <a:pathLst>
+                <a:path w="1876837" h="166788">
+                  <a:moveTo>
+                    <a:pt x="0" y="0"/>
+                  </a:moveTo>
+                  <a:lnTo>
+                    <a:pt x="1876837" y="0"/>
+                  </a:lnTo>
+                  <a:lnTo>
+                    <a:pt x="1876837" y="166788"/>
+                  </a:lnTo>
+                  <a:lnTo>
+                    <a:pt x="0" y="166788"/>
+                  </a:lnTo>
+                  <a:close/>
+                </a:path>
+              </a:pathLst>
+            </a:custGeom>
+            <a:solidFill>
+              <a:srgbClr val="FFCFCF"/>
+            </a:solidFill>
+          </p:spPr>
+        </p:sp>
+      </p:grpSp>
+      <p:sp>
+        <p:nvSpPr>
+          <p:cNvPr id="16" name="TextBox 15"/>
+          <p:cNvSpPr txBox="1"/>
+          <p:nvPr/>
+        </p:nvSpPr>
+        <p:spPr>
+          <a:xfrm>
+            <a:off x="1060018" y="1245321"/>
+            <a:ext cx="1792392" cy="769441"/>
+          </a:xfrm>
+          <a:prstGeom prst="rect">
+            <a:avLst/>
+          </a:prstGeom>
+          <a:noFill/>
+        </p:spPr>
+        <p:txBody>
+          <a:bodyPr wrap="square" rtlCol="0">
+            <a:spAutoFit/>
+          </a:bodyPr>
+          <a:lstStyle/>
+          <a:p>
+            <a:r>
+              <a:rPr lang="en-US" sz="4400" b="1" dirty="0">
+                <a:solidFill>
+                  <a:schemeClr val="tx1">
+                    <a:lumMod val="95000"/>
+                    <a:lumOff val="5000"/>
+                  </a:schemeClr>
+                </a:solidFill>
+              </a:rPr>
+              <a:t>Q &amp; A</a:t>
+            </a:r>
+            <a:endParaRPr lang="en-IN" sz="4200" b="1" dirty="0">
+              <a:solidFill>
+                <a:schemeClr val="tx1">
+                  <a:lumMod val="95000"/>
+                  <a:lumOff val="5000"/>
+                </a:schemeClr>
+              </a:solidFill>
+            </a:endParaRPr>
+          </a:p>
+        </p:txBody>
+      </p:sp>
+      <p:pic>
+        <p:nvPicPr>
+          <p:cNvPr id="14" name="Picture 13" descr="A drawing of a cartoon character&#10;&#10;Description automatically generated"/>
+          <p:cNvPicPr>
+            <a:picLocks noChangeAspect="1"/>
+          </p:cNvPicPr>
+          <p:nvPr/>
+        </p:nvPicPr>
+        <p:blipFill rotWithShape="1">
+          <a:blip r:embed="rId3">
+            <a:extLst>
+              <a:ext uri="{28A0092B-C50C-407E-A947-70E740481C1C}">
+                <a14:useLocalDpi xmlns:a14="http://schemas.microsoft.com/office/drawing/2010/main" val="0"/>
+              </a:ext>
+            </a:extLst>
+          </a:blip>
+          <a:srcRect l="3457" r="446" b="-1"/>
+          <a:stretch>
+            <a:fillRect/>
+          </a:stretch>
+        </p:blipFill>
+        <p:spPr>
+          <a:xfrm>
+            <a:off x="3695700" y="2037622"/>
+            <a:ext cx="10896600" cy="8249378"/>
+          </a:xfrm>
+          <a:prstGeom prst="rect">
+            <a:avLst/>
+          </a:prstGeom>
+        </p:spPr>
+      </p:pic>
+      <p:pic>
+        <p:nvPicPr>
+          <p:cNvPr id="15" name="Picture 14"/>
+          <p:cNvPicPr>
+            <a:picLocks noChangeAspect="1"/>
+          </p:cNvPicPr>
+          <p:nvPr/>
+        </p:nvPicPr>
+        <p:blipFill>
+          <a:blip r:embed="rId4">
+            <a:extLst>
+              <a:ext uri="{28A0092B-C50C-407E-A947-70E740481C1C}">
+                <a14:useLocalDpi xmlns:a14="http://schemas.microsoft.com/office/drawing/2010/main" val="0"/>
+              </a:ext>
+            </a:extLst>
+          </a:blip>
+          <a:stretch>
+            <a:fillRect/>
+          </a:stretch>
+        </p:blipFill>
+        <p:spPr>
+          <a:xfrm>
+            <a:off x="14325600" y="721160"/>
+            <a:ext cx="2668328" cy="1072668"/>
+          </a:xfrm>
+          <a:prstGeom prst="rect">
+            <a:avLst/>
+          </a:prstGeom>
+        </p:spPr>
+      </p:pic>
+    </p:spTree>
   </p:cSld>
   <p:clrMapOvr>
     <a:masterClrMapping/>
@@ -9392,14 +7410,14 @@
           <p:nvPr/>
         </p:nvPicPr>
         <p:blipFill>
-          <a:blip r:embed="rId2">
+          <a:blip r:embed="rId1">
             <a:alphaModFix amt="6000"/>
             <a:extLst>
               <a:ext uri="{28A0092B-C50C-407E-A947-70E740481C1C}">
                 <a14:useLocalDpi xmlns:a14="http://schemas.microsoft.com/office/drawing/2010/main" val="0"/>
               </a:ext>
               <a:ext uri="{96DAC541-7B7A-43D3-8B79-37D633B846F1}">
-                <asvg:svgBlip xmlns:asvg="http://schemas.microsoft.com/office/drawing/2016/SVG/main" r:embed="rId3"/>
+                <asvg:svgBlip xmlns:asvg="http://schemas.microsoft.com/office/drawing/2016/SVG/main" r:embed="rId2"/>
               </a:ext>
             </a:extLst>
           </a:blip>
@@ -9427,14 +7445,14 @@
           <p:nvPr/>
         </p:nvPicPr>
         <p:blipFill>
-          <a:blip r:embed="rId2" cstate="print">
+          <a:blip r:embed="rId1" cstate="print">
             <a:alphaModFix amt="6000"/>
             <a:extLst>
               <a:ext uri="{28A0092B-C50C-407E-A947-70E740481C1C}">
                 <a14:useLocalDpi xmlns:a14="http://schemas.microsoft.com/office/drawing/2010/main" val="0"/>
               </a:ext>
               <a:ext uri="{96DAC541-7B7A-43D3-8B79-37D633B846F1}">
-                <asvg:svgBlip xmlns:asvg="http://schemas.microsoft.com/office/drawing/2016/SVG/main" r:embed="rId3"/>
+                <asvg:svgBlip xmlns:asvg="http://schemas.microsoft.com/office/drawing/2016/SVG/main" r:embed="rId2"/>
               </a:ext>
             </a:extLst>
           </a:blip>
@@ -9730,13 +7748,7 @@
       </p:grpSp>
       <p:sp>
         <p:nvSpPr>
-          <p:cNvPr id="16" name="TextBox 15">
-            <a:extLst>
-              <a:ext uri="{FF2B5EF4-FFF2-40B4-BE49-F238E27FC236}">
-                <a16:creationId xmlns:a16="http://schemas.microsoft.com/office/drawing/2014/main" id="{07F97D94-3FF9-950A-FFE1-A267F491BF58}"/>
-              </a:ext>
-            </a:extLst>
-          </p:cNvPr>
+          <p:cNvPr id="16" name="TextBox 15"/>
           <p:cNvSpPr txBox="1"/>
           <p:nvPr/>
         </p:nvSpPr>
@@ -9770,25 +7782,20 @@
               <a:rPr lang="en-US" sz="8000" b="1" dirty="0"/>
               <a:t> You </a:t>
             </a:r>
+            <a:endParaRPr lang="en-US" sz="8000" b="1" dirty="0"/>
           </a:p>
         </p:txBody>
       </p:sp>
       <p:pic>
         <p:nvPicPr>
-          <p:cNvPr id="14" name="Picture 13">
-            <a:extLst>
-              <a:ext uri="{FF2B5EF4-FFF2-40B4-BE49-F238E27FC236}">
-                <a16:creationId xmlns:a16="http://schemas.microsoft.com/office/drawing/2014/main" id="{857A4F10-C57D-42AE-8E9C-15A7C7ED5E1D}"/>
-              </a:ext>
-            </a:extLst>
-          </p:cNvPr>
+          <p:cNvPr id="14" name="Picture 13"/>
           <p:cNvPicPr>
             <a:picLocks noChangeAspect="1"/>
           </p:cNvPicPr>
           <p:nvPr/>
         </p:nvPicPr>
         <p:blipFill>
-          <a:blip r:embed="rId4">
+          <a:blip r:embed="rId3">
             <a:extLst>
               <a:ext uri="{28A0092B-C50C-407E-A947-70E740481C1C}">
                 <a14:useLocalDpi xmlns:a14="http://schemas.microsoft.com/office/drawing/2010/main" val="0"/>
@@ -9810,11 +7817,6 @@
         </p:spPr>
       </p:pic>
     </p:spTree>
-    <p:extLst>
-      <p:ext uri="{BB962C8B-B14F-4D97-AF65-F5344CB8AC3E}">
-        <p14:creationId xmlns:p14="http://schemas.microsoft.com/office/powerpoint/2010/main" val="3991798767"/>
-      </p:ext>
-    </p:extLst>
   </p:cSld>
   <p:clrMapOvr>
     <a:masterClrMapping/>
@@ -10100,8 +8102,11 @@
       </a:bgFillStyleLst>
     </a:fmtScheme>
   </a:themeElements>
-  <a:objectDefaults/>
-  <a:extraClrSchemeLst/>
+  <a:extLst>
+    <a:ext uri="{05A4C25C-085E-4340-85A3-A5531E510DB2}">
+      <thm15:themeFamily xmlns:thm15="http://schemas.microsoft.com/office/thememl/2012/main" name="Office Theme" id="{62F939B6-93AF-4DB8-9C6B-D6C7DFDC589F}" vid="{4A3C46E8-61CC-4603-A589-7422A47A8E4A}"/>
+    </a:ext>
+  </a:extLst>
 </a:theme>
 </file>
 
@@ -10383,7 +8388,10 @@
       </a:bgFillStyleLst>
     </a:fmtScheme>
   </a:themeElements>
-  <a:objectDefaults/>
-  <a:extraClrSchemeLst/>
+  <a:extLst>
+    <a:ext uri="{05A4C25C-085E-4340-85A3-A5531E510DB2}">
+      <thm15:themeFamily xmlns:thm15="http://schemas.microsoft.com/office/thememl/2012/main" name="Office Theme" id="{62F939B6-93AF-4DB8-9C6B-D6C7DFDC589F}" vid="{4A3C46E8-61CC-4603-A589-7422A47A8E4A}"/>
+    </a:ext>
+  </a:extLst>
 </a:theme>
 </file>
</xml_diff>